<commit_message>
Finale Version Vortrag PDF + PP
</commit_message>
<xml_diff>
--- a/präsentationen/Abschlusspräsentation_Entwurf.pptx
+++ b/präsentationen/Abschlusspräsentation_Entwurf.pptx
@@ -5,7 +5,7 @@
     <p:sldMasterId id="2147483660" r:id="rId1"/>
   </p:sldMasterIdLst>
   <p:notesMasterIdLst>
-    <p:notesMasterId r:id="rId81"/>
+    <p:notesMasterId r:id="rId80"/>
   </p:notesMasterIdLst>
   <p:sldIdLst>
     <p:sldId id="2582" r:id="rId2"/>
@@ -23,7 +23,7 @@
     <p:sldId id="2633" r:id="rId14"/>
     <p:sldId id="2710" r:id="rId15"/>
     <p:sldId id="2724" r:id="rId16"/>
-    <p:sldId id="2772" r:id="rId17"/>
+    <p:sldId id="2774" r:id="rId17"/>
     <p:sldId id="2773" r:id="rId18"/>
     <p:sldId id="2642" r:id="rId19"/>
     <p:sldId id="2627" r:id="rId20"/>
@@ -42,51 +42,50 @@
     <p:sldId id="2672" r:id="rId33"/>
     <p:sldId id="2670" r:id="rId34"/>
     <p:sldId id="261" r:id="rId35"/>
-    <p:sldId id="262" r:id="rId36"/>
-    <p:sldId id="264" r:id="rId37"/>
-    <p:sldId id="266" r:id="rId38"/>
-    <p:sldId id="268" r:id="rId39"/>
-    <p:sldId id="270" r:id="rId40"/>
-    <p:sldId id="2673" r:id="rId41"/>
-    <p:sldId id="2674" r:id="rId42"/>
-    <p:sldId id="2675" r:id="rId43"/>
-    <p:sldId id="2676" r:id="rId44"/>
-    <p:sldId id="2727" r:id="rId45"/>
-    <p:sldId id="2662" r:id="rId46"/>
-    <p:sldId id="2709" r:id="rId47"/>
-    <p:sldId id="2728" r:id="rId48"/>
-    <p:sldId id="2729" r:id="rId49"/>
-    <p:sldId id="2730" r:id="rId50"/>
-    <p:sldId id="2735" r:id="rId51"/>
-    <p:sldId id="2733" r:id="rId52"/>
-    <p:sldId id="2734" r:id="rId53"/>
-    <p:sldId id="2736" r:id="rId54"/>
-    <p:sldId id="2737" r:id="rId55"/>
-    <p:sldId id="2738" r:id="rId56"/>
-    <p:sldId id="2739" r:id="rId57"/>
-    <p:sldId id="2740" r:id="rId58"/>
-    <p:sldId id="2741" r:id="rId59"/>
-    <p:sldId id="2742" r:id="rId60"/>
-    <p:sldId id="2743" r:id="rId61"/>
-    <p:sldId id="2744" r:id="rId62"/>
-    <p:sldId id="2745" r:id="rId63"/>
-    <p:sldId id="2746" r:id="rId64"/>
-    <p:sldId id="2747" r:id="rId65"/>
-    <p:sldId id="2748" r:id="rId66"/>
-    <p:sldId id="2749" r:id="rId67"/>
-    <p:sldId id="2750" r:id="rId68"/>
-    <p:sldId id="2751" r:id="rId69"/>
-    <p:sldId id="2752" r:id="rId70"/>
-    <p:sldId id="2753" r:id="rId71"/>
-    <p:sldId id="2754" r:id="rId72"/>
-    <p:sldId id="2755" r:id="rId73"/>
-    <p:sldId id="2711" r:id="rId74"/>
-    <p:sldId id="2758" r:id="rId75"/>
-    <p:sldId id="2759" r:id="rId76"/>
-    <p:sldId id="2712" r:id="rId77"/>
-    <p:sldId id="2760" r:id="rId78"/>
-    <p:sldId id="2761" r:id="rId79"/>
-    <p:sldId id="2632" r:id="rId80"/>
+    <p:sldId id="264" r:id="rId36"/>
+    <p:sldId id="266" r:id="rId37"/>
+    <p:sldId id="268" r:id="rId38"/>
+    <p:sldId id="270" r:id="rId39"/>
+    <p:sldId id="2673" r:id="rId40"/>
+    <p:sldId id="2674" r:id="rId41"/>
+    <p:sldId id="2675" r:id="rId42"/>
+    <p:sldId id="2676" r:id="rId43"/>
+    <p:sldId id="2727" r:id="rId44"/>
+    <p:sldId id="2662" r:id="rId45"/>
+    <p:sldId id="2709" r:id="rId46"/>
+    <p:sldId id="2728" r:id="rId47"/>
+    <p:sldId id="2729" r:id="rId48"/>
+    <p:sldId id="2730" r:id="rId49"/>
+    <p:sldId id="2735" r:id="rId50"/>
+    <p:sldId id="2733" r:id="rId51"/>
+    <p:sldId id="2734" r:id="rId52"/>
+    <p:sldId id="2736" r:id="rId53"/>
+    <p:sldId id="2737" r:id="rId54"/>
+    <p:sldId id="2738" r:id="rId55"/>
+    <p:sldId id="2739" r:id="rId56"/>
+    <p:sldId id="2740" r:id="rId57"/>
+    <p:sldId id="2741" r:id="rId58"/>
+    <p:sldId id="2742" r:id="rId59"/>
+    <p:sldId id="2743" r:id="rId60"/>
+    <p:sldId id="2744" r:id="rId61"/>
+    <p:sldId id="2745" r:id="rId62"/>
+    <p:sldId id="2746" r:id="rId63"/>
+    <p:sldId id="2747" r:id="rId64"/>
+    <p:sldId id="2748" r:id="rId65"/>
+    <p:sldId id="2749" r:id="rId66"/>
+    <p:sldId id="2750" r:id="rId67"/>
+    <p:sldId id="2751" r:id="rId68"/>
+    <p:sldId id="2752" r:id="rId69"/>
+    <p:sldId id="2753" r:id="rId70"/>
+    <p:sldId id="2754" r:id="rId71"/>
+    <p:sldId id="2755" r:id="rId72"/>
+    <p:sldId id="2711" r:id="rId73"/>
+    <p:sldId id="2758" r:id="rId74"/>
+    <p:sldId id="2759" r:id="rId75"/>
+    <p:sldId id="2712" r:id="rId76"/>
+    <p:sldId id="2760" r:id="rId77"/>
+    <p:sldId id="2761" r:id="rId78"/>
+    <p:sldId id="2632" r:id="rId79"/>
   </p:sldIdLst>
   <p:sldSz cx="12192000" cy="6858000"/>
   <p:notesSz cx="6858000" cy="9144000"/>
@@ -205,7 +204,7 @@
             <p14:sldId id="2633"/>
             <p14:sldId id="2710"/>
             <p14:sldId id="2724"/>
-            <p14:sldId id="2772"/>
+            <p14:sldId id="2774"/>
             <p14:sldId id="2773"/>
             <p14:sldId id="2642"/>
             <p14:sldId id="2627"/>
@@ -224,7 +223,6 @@
             <p14:sldId id="2672"/>
             <p14:sldId id="2670"/>
             <p14:sldId id="261"/>
-            <p14:sldId id="262"/>
             <p14:sldId id="264"/>
             <p14:sldId id="266"/>
             <p14:sldId id="268"/>
@@ -369,7 +367,7 @@
           </a:lstStyle>
           <a:p>
             <a:fld id="{75BEE995-72F4-482A-B547-037217EEA661}" type="datetimeFigureOut">
-              <a:t>7/8/2025</a:t>
+              <a:t>09.07.2025</a:t>
             </a:fld>
             <a:endParaRPr lang="de-DE"/>
           </a:p>
@@ -526,7 +524,7 @@
           </a:lstStyle>
           <a:p>
             <a:fld id="{02432301-1260-4486-BD0B-BF02A47E29BB}" type="slidenum">
-              <a:t>‹#›</a:t>
+              <a:t>‹Nr.›</a:t>
             </a:fld>
             <a:endParaRPr lang="de-DE"/>
           </a:p>
@@ -1720,7 +1718,7 @@
       </p:grpSpPr>
       <p:sp>
         <p:nvSpPr>
-          <p:cNvPr id="800031963" name="Slide Image Placeholder 1"/>
+          <p:cNvPr id="1096741025" name="Slide Image Placeholder 1"/>
           <p:cNvSpPr>
             <a:spLocks noGrp="1" noRot="1" noChangeAspect="1"/>
           </p:cNvSpPr>
@@ -1732,7 +1730,7 @@
       </p:sp>
       <p:sp>
         <p:nvSpPr>
-          <p:cNvPr id="697860562" name="Notes Placeholder 2"/>
+          <p:cNvPr id="1242635208" name="Notes Placeholder 2"/>
           <p:cNvSpPr>
             <a:spLocks noGrp="1"/>
           </p:cNvSpPr>
@@ -1754,7 +1752,7 @@
       </p:sp>
       <p:sp>
         <p:nvSpPr>
-          <p:cNvPr id="1990806704" name="Slide Number Placeholder 3"/>
+          <p:cNvPr id="1167058418" name="Slide Number Placeholder 3"/>
           <p:cNvSpPr>
             <a:spLocks noGrp="1"/>
           </p:cNvSpPr>
@@ -1784,7 +1782,7 @@
               <a:tabLst/>
               <a:defRPr/>
             </a:pPr>
-            <a:fld id="{2BF21EF0-CA46-8329-535B-391C58F65535}" type="slidenum">
+            <a:fld id="{1883578D-D7EF-0EB1-67C7-597C86465D61}" type="slidenum">
               <a:rPr kumimoji="0" sz="1200" b="0" i="0" u="none" strike="noStrike" kern="0" cap="none" spc="0" normalizeH="0" baseline="0" noProof="0">
                 <a:ln>
                   <a:noFill/>
@@ -1860,7 +1858,7 @@
       </p:grpSpPr>
       <p:sp>
         <p:nvSpPr>
-          <p:cNvPr id="1096741025" name="Slide Image Placeholder 1"/>
+          <p:cNvPr id="1626074993" name="Slide Image Placeholder 1"/>
           <p:cNvSpPr>
             <a:spLocks noGrp="1" noRot="1" noChangeAspect="1"/>
           </p:cNvSpPr>
@@ -1872,7 +1870,7 @@
       </p:sp>
       <p:sp>
         <p:nvSpPr>
-          <p:cNvPr id="1242635208" name="Notes Placeholder 2"/>
+          <p:cNvPr id="293038540" name="Notes Placeholder 2"/>
           <p:cNvSpPr>
             <a:spLocks noGrp="1"/>
           </p:cNvSpPr>
@@ -1894,7 +1892,7 @@
       </p:sp>
       <p:sp>
         <p:nvSpPr>
-          <p:cNvPr id="1167058418" name="Slide Number Placeholder 3"/>
+          <p:cNvPr id="409317531" name="Slide Number Placeholder 3"/>
           <p:cNvSpPr>
             <a:spLocks noGrp="1"/>
           </p:cNvSpPr>
@@ -1924,7 +1922,7 @@
               <a:tabLst/>
               <a:defRPr/>
             </a:pPr>
-            <a:fld id="{1883578D-D7EF-0EB1-67C7-597C86465D61}" type="slidenum">
+            <a:fld id="{85EF197E-AB95-756F-8E75-FB17E1DD3C28}" type="slidenum">
               <a:rPr kumimoji="0" sz="1200" b="0" i="0" u="none" strike="noStrike" kern="0" cap="none" spc="0" normalizeH="0" baseline="0" noProof="0">
                 <a:ln>
                   <a:noFill/>
@@ -2000,7 +1998,7 @@
       </p:grpSpPr>
       <p:sp>
         <p:nvSpPr>
-          <p:cNvPr id="1626074993" name="Slide Image Placeholder 1"/>
+          <p:cNvPr id="250081555" name="Slide Image Placeholder 1"/>
           <p:cNvSpPr>
             <a:spLocks noGrp="1" noRot="1" noChangeAspect="1"/>
           </p:cNvSpPr>
@@ -2012,7 +2010,7 @@
       </p:sp>
       <p:sp>
         <p:nvSpPr>
-          <p:cNvPr id="293038540" name="Notes Placeholder 2"/>
+          <p:cNvPr id="1586636381" name="Notes Placeholder 2"/>
           <p:cNvSpPr>
             <a:spLocks noGrp="1"/>
           </p:cNvSpPr>
@@ -2034,7 +2032,7 @@
       </p:sp>
       <p:sp>
         <p:nvSpPr>
-          <p:cNvPr id="409317531" name="Slide Number Placeholder 3"/>
+          <p:cNvPr id="1083168503" name="Slide Number Placeholder 3"/>
           <p:cNvSpPr>
             <a:spLocks noGrp="1"/>
           </p:cNvSpPr>
@@ -2064,7 +2062,7 @@
               <a:tabLst/>
               <a:defRPr/>
             </a:pPr>
-            <a:fld id="{85EF197E-AB95-756F-8E75-FB17E1DD3C28}" type="slidenum">
+            <a:fld id="{23A23579-5306-9E1D-B92D-9EA1C4EFDDF6}" type="slidenum">
               <a:rPr kumimoji="0" sz="1200" b="0" i="0" u="none" strike="noStrike" kern="0" cap="none" spc="0" normalizeH="0" baseline="0" noProof="0">
                 <a:ln>
                   <a:noFill/>
@@ -2140,7 +2138,7 @@
       </p:grpSpPr>
       <p:sp>
         <p:nvSpPr>
-          <p:cNvPr id="250081555" name="Slide Image Placeholder 1"/>
+          <p:cNvPr id="395415193" name="Slide Image Placeholder 1"/>
           <p:cNvSpPr>
             <a:spLocks noGrp="1" noRot="1" noChangeAspect="1"/>
           </p:cNvSpPr>
@@ -2152,7 +2150,7 @@
       </p:sp>
       <p:sp>
         <p:nvSpPr>
-          <p:cNvPr id="1586636381" name="Notes Placeholder 2"/>
+          <p:cNvPr id="554188817" name="Notes Placeholder 2"/>
           <p:cNvSpPr>
             <a:spLocks noGrp="1"/>
           </p:cNvSpPr>
@@ -2174,7 +2172,7 @@
       </p:sp>
       <p:sp>
         <p:nvSpPr>
-          <p:cNvPr id="1083168503" name="Slide Number Placeholder 3"/>
+          <p:cNvPr id="996353675" name="Slide Number Placeholder 3"/>
           <p:cNvSpPr>
             <a:spLocks noGrp="1"/>
           </p:cNvSpPr>
@@ -2204,7 +2202,7 @@
               <a:tabLst/>
               <a:defRPr/>
             </a:pPr>
-            <a:fld id="{23A23579-5306-9E1D-B92D-9EA1C4EFDDF6}" type="slidenum">
+            <a:fld id="{7AFF9CA6-612E-85B1-3DD0-FE635821360F}" type="slidenum">
               <a:rPr kumimoji="0" sz="1200" b="0" i="0" u="none" strike="noStrike" kern="0" cap="none" spc="0" normalizeH="0" baseline="0" noProof="0">
                 <a:ln>
                   <a:noFill/>
@@ -2376,7 +2374,13 @@
   <p:cSld>
     <p:spTree>
       <p:nvGrpSpPr>
-        <p:cNvPr id="1" name=""/>
+        <p:cNvPr id="1" name="">
+          <a:extLst>
+            <a:ext uri="{FF2B5EF4-FFF2-40B4-BE49-F238E27FC236}">
+              <a16:creationId xmlns:a16="http://schemas.microsoft.com/office/drawing/2014/main" id="{04FB4A46-0DF5-3E79-7271-A42913B15DC9}"/>
+            </a:ext>
+          </a:extLst>
+        </p:cNvPr>
         <p:cNvGrpSpPr/>
         <p:nvPr/>
       </p:nvGrpSpPr>
@@ -2390,7 +2394,13 @@
       </p:grpSpPr>
       <p:sp>
         <p:nvSpPr>
-          <p:cNvPr id="395415193" name="Slide Image Placeholder 1"/>
+          <p:cNvPr id="139090186" name="Slide Image Placeholder 1">
+            <a:extLst>
+              <a:ext uri="{FF2B5EF4-FFF2-40B4-BE49-F238E27FC236}">
+                <a16:creationId xmlns:a16="http://schemas.microsoft.com/office/drawing/2014/main" id="{5E868098-70C3-F5BC-4578-CD69711284C5}"/>
+              </a:ext>
+            </a:extLst>
+          </p:cNvPr>
           <p:cNvSpPr>
             <a:spLocks noGrp="1" noRot="1" noChangeAspect="1"/>
           </p:cNvSpPr>
@@ -2402,7 +2412,13 @@
       </p:sp>
       <p:sp>
         <p:nvSpPr>
-          <p:cNvPr id="554188817" name="Notes Placeholder 2"/>
+          <p:cNvPr id="400293583" name="Notes Placeholder 2">
+            <a:extLst>
+              <a:ext uri="{FF2B5EF4-FFF2-40B4-BE49-F238E27FC236}">
+                <a16:creationId xmlns:a16="http://schemas.microsoft.com/office/drawing/2014/main" id="{4461A64D-04BB-BBC8-94C2-6AC684F3C477}"/>
+              </a:ext>
+            </a:extLst>
+          </p:cNvPr>
           <p:cNvSpPr>
             <a:spLocks noGrp="1"/>
           </p:cNvSpPr>
@@ -2424,7 +2440,13 @@
       </p:sp>
       <p:sp>
         <p:nvSpPr>
-          <p:cNvPr id="996353675" name="Slide Number Placeholder 3"/>
+          <p:cNvPr id="1257388043" name="Slide Number Placeholder 3">
+            <a:extLst>
+              <a:ext uri="{FF2B5EF4-FFF2-40B4-BE49-F238E27FC236}">
+                <a16:creationId xmlns:a16="http://schemas.microsoft.com/office/drawing/2014/main" id="{6A36CF41-EE57-A946-9545-B0ABE619C1B4}"/>
+              </a:ext>
+            </a:extLst>
+          </p:cNvPr>
           <p:cNvSpPr>
             <a:spLocks noGrp="1"/>
           </p:cNvSpPr>
@@ -2454,7 +2476,7 @@
               <a:tabLst/>
               <a:defRPr/>
             </a:pPr>
-            <a:fld id="{7AFF9CA6-612E-85B1-3DD0-FE635821360F}" type="slidenum">
+            <a:fld id="{20073075-213A-DC53-9B24-1C6EF3B6ADAB}" type="slidenum">
               <a:rPr kumimoji="0" sz="1200" b="0" i="0" u="none" strike="noStrike" kern="0" cap="none" spc="0" normalizeH="0" baseline="0" noProof="0">
                 <a:ln>
                   <a:noFill/>
@@ -2504,6 +2526,11 @@
         </p:txBody>
       </p:sp>
     </p:spTree>
+    <p:extLst>
+      <p:ext uri="{BB962C8B-B14F-4D97-AF65-F5344CB8AC3E}">
+        <p14:creationId xmlns:p14="http://schemas.microsoft.com/office/powerpoint/2010/main" val="3265835028"/>
+      </p:ext>
+    </p:extLst>
   </p:cSld>
   <p:clrMapOvr>
     <a:masterClrMapping/>
@@ -2519,7 +2546,7 @@
         <p:cNvPr id="1" name="">
           <a:extLst>
             <a:ext uri="{FF2B5EF4-FFF2-40B4-BE49-F238E27FC236}">
-              <a16:creationId xmlns:a16="http://schemas.microsoft.com/office/drawing/2014/main" id="{04FB4A46-0DF5-3E79-7271-A42913B15DC9}"/>
+              <a16:creationId xmlns:a16="http://schemas.microsoft.com/office/drawing/2014/main" id="{67C3011D-FD27-9E62-A3BF-A9ED2E09A533}"/>
             </a:ext>
           </a:extLst>
         </p:cNvPr>
@@ -2539,7 +2566,7 @@
           <p:cNvPr id="139090186" name="Slide Image Placeholder 1">
             <a:extLst>
               <a:ext uri="{FF2B5EF4-FFF2-40B4-BE49-F238E27FC236}">
-                <a16:creationId xmlns:a16="http://schemas.microsoft.com/office/drawing/2014/main" id="{5E868098-70C3-F5BC-4578-CD69711284C5}"/>
+                <a16:creationId xmlns:a16="http://schemas.microsoft.com/office/drawing/2014/main" id="{67FB106E-1E9C-4BBF-C8EE-8C6117003145}"/>
               </a:ext>
             </a:extLst>
           </p:cNvPr>
@@ -2557,7 +2584,7 @@
           <p:cNvPr id="400293583" name="Notes Placeholder 2">
             <a:extLst>
               <a:ext uri="{FF2B5EF4-FFF2-40B4-BE49-F238E27FC236}">
-                <a16:creationId xmlns:a16="http://schemas.microsoft.com/office/drawing/2014/main" id="{4461A64D-04BB-BBC8-94C2-6AC684F3C477}"/>
+                <a16:creationId xmlns:a16="http://schemas.microsoft.com/office/drawing/2014/main" id="{E213F4A1-9ED0-CC73-F4AF-9CECF744B804}"/>
               </a:ext>
             </a:extLst>
           </p:cNvPr>
@@ -2585,7 +2612,7 @@
           <p:cNvPr id="1257388043" name="Slide Number Placeholder 3">
             <a:extLst>
               <a:ext uri="{FF2B5EF4-FFF2-40B4-BE49-F238E27FC236}">
-                <a16:creationId xmlns:a16="http://schemas.microsoft.com/office/drawing/2014/main" id="{6A36CF41-EE57-A946-9545-B0ABE619C1B4}"/>
+                <a16:creationId xmlns:a16="http://schemas.microsoft.com/office/drawing/2014/main" id="{F188FE56-2E3E-8AF5-D501-22A92B030E00}"/>
               </a:ext>
             </a:extLst>
           </p:cNvPr>
@@ -2670,7 +2697,7 @@
     </p:spTree>
     <p:extLst>
       <p:ext uri="{BB962C8B-B14F-4D97-AF65-F5344CB8AC3E}">
-        <p14:creationId xmlns:p14="http://schemas.microsoft.com/office/powerpoint/2010/main" val="3265835028"/>
+        <p14:creationId xmlns:p14="http://schemas.microsoft.com/office/powerpoint/2010/main" val="2325161535"/>
       </p:ext>
     </p:extLst>
   </p:cSld>
@@ -2688,7 +2715,7 @@
         <p:cNvPr id="1" name="">
           <a:extLst>
             <a:ext uri="{FF2B5EF4-FFF2-40B4-BE49-F238E27FC236}">
-              <a16:creationId xmlns:a16="http://schemas.microsoft.com/office/drawing/2014/main" id="{67C3011D-FD27-9E62-A3BF-A9ED2E09A533}"/>
+              <a16:creationId xmlns:a16="http://schemas.microsoft.com/office/drawing/2014/main" id="{BE17D6BD-3906-1B99-845A-AC3E23D40315}"/>
             </a:ext>
           </a:extLst>
         </p:cNvPr>
@@ -2708,7 +2735,7 @@
           <p:cNvPr id="139090186" name="Slide Image Placeholder 1">
             <a:extLst>
               <a:ext uri="{FF2B5EF4-FFF2-40B4-BE49-F238E27FC236}">
-                <a16:creationId xmlns:a16="http://schemas.microsoft.com/office/drawing/2014/main" id="{67FB106E-1E9C-4BBF-C8EE-8C6117003145}"/>
+                <a16:creationId xmlns:a16="http://schemas.microsoft.com/office/drawing/2014/main" id="{E086599A-0AD8-0A8A-12D2-715AF485E9FE}"/>
               </a:ext>
             </a:extLst>
           </p:cNvPr>
@@ -2726,7 +2753,7 @@
           <p:cNvPr id="400293583" name="Notes Placeholder 2">
             <a:extLst>
               <a:ext uri="{FF2B5EF4-FFF2-40B4-BE49-F238E27FC236}">
-                <a16:creationId xmlns:a16="http://schemas.microsoft.com/office/drawing/2014/main" id="{E213F4A1-9ED0-CC73-F4AF-9CECF744B804}"/>
+                <a16:creationId xmlns:a16="http://schemas.microsoft.com/office/drawing/2014/main" id="{8E352483-FCB4-61D3-79E9-C0D098B900A5}"/>
               </a:ext>
             </a:extLst>
           </p:cNvPr>
@@ -2754,7 +2781,7 @@
           <p:cNvPr id="1257388043" name="Slide Number Placeholder 3">
             <a:extLst>
               <a:ext uri="{FF2B5EF4-FFF2-40B4-BE49-F238E27FC236}">
-                <a16:creationId xmlns:a16="http://schemas.microsoft.com/office/drawing/2014/main" id="{F188FE56-2E3E-8AF5-D501-22A92B030E00}"/>
+                <a16:creationId xmlns:a16="http://schemas.microsoft.com/office/drawing/2014/main" id="{D2A43257-15C4-F4D1-F9C9-5BCAF8CB4E46}"/>
               </a:ext>
             </a:extLst>
           </p:cNvPr>
@@ -2839,7 +2866,7 @@
     </p:spTree>
     <p:extLst>
       <p:ext uri="{BB962C8B-B14F-4D97-AF65-F5344CB8AC3E}">
-        <p14:creationId xmlns:p14="http://schemas.microsoft.com/office/powerpoint/2010/main" val="2325161535"/>
+        <p14:creationId xmlns:p14="http://schemas.microsoft.com/office/powerpoint/2010/main" val="1205264617"/>
       </p:ext>
     </p:extLst>
   </p:cSld>
@@ -2857,7 +2884,7 @@
         <p:cNvPr id="1" name="">
           <a:extLst>
             <a:ext uri="{FF2B5EF4-FFF2-40B4-BE49-F238E27FC236}">
-              <a16:creationId xmlns:a16="http://schemas.microsoft.com/office/drawing/2014/main" id="{BE17D6BD-3906-1B99-845A-AC3E23D40315}"/>
+              <a16:creationId xmlns:a16="http://schemas.microsoft.com/office/drawing/2014/main" id="{89E9AEC5-143A-2C86-D740-9AEC8D0CB2F4}"/>
             </a:ext>
           </a:extLst>
         </p:cNvPr>
@@ -2877,7 +2904,7 @@
           <p:cNvPr id="139090186" name="Slide Image Placeholder 1">
             <a:extLst>
               <a:ext uri="{FF2B5EF4-FFF2-40B4-BE49-F238E27FC236}">
-                <a16:creationId xmlns:a16="http://schemas.microsoft.com/office/drawing/2014/main" id="{E086599A-0AD8-0A8A-12D2-715AF485E9FE}"/>
+                <a16:creationId xmlns:a16="http://schemas.microsoft.com/office/drawing/2014/main" id="{27F5057E-8761-3934-C7C0-704E5DE21DCF}"/>
               </a:ext>
             </a:extLst>
           </p:cNvPr>
@@ -2895,7 +2922,7 @@
           <p:cNvPr id="400293583" name="Notes Placeholder 2">
             <a:extLst>
               <a:ext uri="{FF2B5EF4-FFF2-40B4-BE49-F238E27FC236}">
-                <a16:creationId xmlns:a16="http://schemas.microsoft.com/office/drawing/2014/main" id="{8E352483-FCB4-61D3-79E9-C0D098B900A5}"/>
+                <a16:creationId xmlns:a16="http://schemas.microsoft.com/office/drawing/2014/main" id="{EF4E6EDF-863C-9E03-D57B-7ABA940F87C9}"/>
               </a:ext>
             </a:extLst>
           </p:cNvPr>
@@ -2923,7 +2950,7 @@
           <p:cNvPr id="1257388043" name="Slide Number Placeholder 3">
             <a:extLst>
               <a:ext uri="{FF2B5EF4-FFF2-40B4-BE49-F238E27FC236}">
-                <a16:creationId xmlns:a16="http://schemas.microsoft.com/office/drawing/2014/main" id="{D2A43257-15C4-F4D1-F9C9-5BCAF8CB4E46}"/>
+                <a16:creationId xmlns:a16="http://schemas.microsoft.com/office/drawing/2014/main" id="{BD22D321-9FD1-4EA5-9181-C87EBD9B78E0}"/>
               </a:ext>
             </a:extLst>
           </p:cNvPr>
@@ -3008,7 +3035,7 @@
     </p:spTree>
     <p:extLst>
       <p:ext uri="{BB962C8B-B14F-4D97-AF65-F5344CB8AC3E}">
-        <p14:creationId xmlns:p14="http://schemas.microsoft.com/office/powerpoint/2010/main" val="1205264617"/>
+        <p14:creationId xmlns:p14="http://schemas.microsoft.com/office/powerpoint/2010/main" val="1034013142"/>
       </p:ext>
     </p:extLst>
   </p:cSld>
@@ -3026,10 +3053,114 @@
         <p:cNvPr id="1" name="">
           <a:extLst>
             <a:ext uri="{FF2B5EF4-FFF2-40B4-BE49-F238E27FC236}">
-              <a16:creationId xmlns:a16="http://schemas.microsoft.com/office/drawing/2014/main" id="{89E9AEC5-143A-2C86-D740-9AEC8D0CB2F4}"/>
+              <a16:creationId xmlns:a16="http://schemas.microsoft.com/office/drawing/2014/main" id="{048E5571-9C06-3D9D-0B72-0FB166818A19}"/>
             </a:ext>
           </a:extLst>
         </p:cNvPr>
+        <p:cNvGrpSpPr/>
+        <p:nvPr/>
+      </p:nvGrpSpPr>
+      <p:grpSpPr>
+        <a:xfrm>
+          <a:off x="0" y="0"/>
+          <a:ext cx="0" cy="0"/>
+          <a:chOff x="0" y="0"/>
+          <a:chExt cx="0" cy="0"/>
+        </a:xfrm>
+      </p:grpSpPr>
+      <p:sp>
+        <p:nvSpPr>
+          <p:cNvPr id="2" name="Folienbildplatzhalter 1">
+            <a:extLst>
+              <a:ext uri="{FF2B5EF4-FFF2-40B4-BE49-F238E27FC236}">
+                <a16:creationId xmlns:a16="http://schemas.microsoft.com/office/drawing/2014/main" id="{56E55147-4CC9-4AE6-0084-06F35D3E910C}"/>
+              </a:ext>
+            </a:extLst>
+          </p:cNvPr>
+          <p:cNvSpPr>
+            <a:spLocks noGrp="1" noRot="1" noChangeAspect="1"/>
+          </p:cNvSpPr>
+          <p:nvPr>
+            <p:ph type="sldImg"/>
+          </p:nvPr>
+        </p:nvSpPr>
+        <p:spPr/>
+      </p:sp>
+      <p:sp>
+        <p:nvSpPr>
+          <p:cNvPr id="3" name="Notizenplatzhalter 2">
+            <a:extLst>
+              <a:ext uri="{FF2B5EF4-FFF2-40B4-BE49-F238E27FC236}">
+                <a16:creationId xmlns:a16="http://schemas.microsoft.com/office/drawing/2014/main" id="{9F5A9C58-9585-D677-E106-DC71C9C821FD}"/>
+              </a:ext>
+            </a:extLst>
+          </p:cNvPr>
+          <p:cNvSpPr>
+            <a:spLocks noGrp="1"/>
+          </p:cNvSpPr>
+          <p:nvPr>
+            <p:ph type="body" idx="1"/>
+          </p:nvPr>
+        </p:nvSpPr>
+        <p:spPr/>
+        <p:txBody>
+          <a:bodyPr/>
+          <a:lstStyle/>
+          <a:p>
+            <a:r>
+              <a:rPr lang="de-DE"/>
+              <a:t>Hier beginnen wir mit dem Hintergrund und der Motivation für unser Projekt. Wir geben einen Überblick über die Einzelhandelsbranche und erläutern die Zielsetzung unseres Data Science Projekts, um Prozesse zu optimieren und die Effizienz zu steigern.</a:t>
+            </a:r>
+          </a:p>
+        </p:txBody>
+      </p:sp>
+      <p:sp>
+        <p:nvSpPr>
+          <p:cNvPr id="4" name="Foliennummernplatzhalter 3">
+            <a:extLst>
+              <a:ext uri="{FF2B5EF4-FFF2-40B4-BE49-F238E27FC236}">
+                <a16:creationId xmlns:a16="http://schemas.microsoft.com/office/drawing/2014/main" id="{6848A3CD-E8AC-36DF-8026-29EFCC74EF16}"/>
+              </a:ext>
+            </a:extLst>
+          </p:cNvPr>
+          <p:cNvSpPr>
+            <a:spLocks noGrp="1"/>
+          </p:cNvSpPr>
+          <p:nvPr>
+            <p:ph type="sldNum" sz="quarter" idx="5"/>
+          </p:nvPr>
+        </p:nvSpPr>
+        <p:spPr/>
+        <p:txBody>
+          <a:bodyPr/>
+          <a:lstStyle/>
+          <a:p>
+            <a:fld id="{8C36BA74-7AA1-48ED-B9BC-0F570D47A936}" type="slidenum">
+              <a:t>45</a:t>
+            </a:fld>
+            <a:endParaRPr lang="de-DE"/>
+          </a:p>
+        </p:txBody>
+      </p:sp>
+    </p:spTree>
+    <p:extLst>
+      <p:ext uri="{BB962C8B-B14F-4D97-AF65-F5344CB8AC3E}">
+        <p14:creationId xmlns:p14="http://schemas.microsoft.com/office/powerpoint/2010/main" val="4232742151"/>
+      </p:ext>
+    </p:extLst>
+  </p:cSld>
+  <p:clrMapOvr>
+    <a:masterClrMapping/>
+  </p:clrMapOvr>
+</p:notes>
+</file>
+
+<file path=ppt/notesSlides/notesSlide25.xml><?xml version="1.0" encoding="utf-8"?>
+<p:notes xmlns:a="http://schemas.openxmlformats.org/drawingml/2006/main" xmlns:r="http://schemas.openxmlformats.org/officeDocument/2006/relationships" xmlns:p="http://schemas.openxmlformats.org/presentationml/2006/main">
+  <p:cSld>
+    <p:spTree>
+      <p:nvGrpSpPr>
+        <p:cNvPr id="1" name=""/>
         <p:cNvGrpSpPr/>
         <p:nvPr/>
       </p:nvGrpSpPr>
@@ -3043,13 +3174,7 @@
       </p:grpSpPr>
       <p:sp>
         <p:nvSpPr>
-          <p:cNvPr id="139090186" name="Slide Image Placeholder 1">
-            <a:extLst>
-              <a:ext uri="{FF2B5EF4-FFF2-40B4-BE49-F238E27FC236}">
-                <a16:creationId xmlns:a16="http://schemas.microsoft.com/office/drawing/2014/main" id="{27F5057E-8761-3934-C7C0-704E5DE21DCF}"/>
-              </a:ext>
-            </a:extLst>
-          </p:cNvPr>
+          <p:cNvPr id="1330014680" name="Slide Image Placeholder 1"/>
           <p:cNvSpPr>
             <a:spLocks noGrp="1" noRot="1" noChangeAspect="1"/>
           </p:cNvSpPr>
@@ -3061,13 +3186,7 @@
       </p:sp>
       <p:sp>
         <p:nvSpPr>
-          <p:cNvPr id="400293583" name="Notes Placeholder 2">
-            <a:extLst>
-              <a:ext uri="{FF2B5EF4-FFF2-40B4-BE49-F238E27FC236}">
-                <a16:creationId xmlns:a16="http://schemas.microsoft.com/office/drawing/2014/main" id="{EF4E6EDF-863C-9E03-D57B-7ABA940F87C9}"/>
-              </a:ext>
-            </a:extLst>
-          </p:cNvPr>
+          <p:cNvPr id="1330354815" name="Notes Placeholder 2"/>
           <p:cNvSpPr>
             <a:spLocks noGrp="1"/>
           </p:cNvSpPr>
@@ -3089,13 +3208,7 @@
       </p:sp>
       <p:sp>
         <p:nvSpPr>
-          <p:cNvPr id="1257388043" name="Slide Number Placeholder 3">
-            <a:extLst>
-              <a:ext uri="{FF2B5EF4-FFF2-40B4-BE49-F238E27FC236}">
-                <a16:creationId xmlns:a16="http://schemas.microsoft.com/office/drawing/2014/main" id="{BD22D321-9FD1-4EA5-9181-C87EBD9B78E0}"/>
-              </a:ext>
-            </a:extLst>
-          </p:cNvPr>
+          <p:cNvPr id="1667253447" name="Slide Number Placeholder 3"/>
           <p:cNvSpPr>
             <a:spLocks noGrp="1"/>
           </p:cNvSpPr>
@@ -3125,7 +3238,7 @@
               <a:tabLst/>
               <a:defRPr/>
             </a:pPr>
-            <a:fld id="{20073075-213A-DC53-9B24-1C6EF3B6ADAB}" type="slidenum">
+            <a:fld id="{37F1F184-79D2-F4EC-467F-CF3EF60FA136}" type="slidenum">
               <a:rPr kumimoji="0" sz="1200" b="0" i="0" u="none" strike="noStrike" kern="0" cap="none" spc="0" normalizeH="0" baseline="0" noProof="0">
                 <a:ln>
                   <a:noFill/>
@@ -3156,7 +3269,7 @@
                 <a:tabLst/>
                 <a:defRPr/>
               </a:pPr>
-              <a:t>43</a:t>
+              <a:t>54</a:t>
             </a:fld>
             <a:endParaRPr kumimoji="0" sz="1200" b="0" i="0" u="none" strike="noStrike" kern="0" cap="none" spc="0" normalizeH="0" baseline="0" noProof="0">
               <a:ln>
@@ -3175,121 +3288,6 @@
         </p:txBody>
       </p:sp>
     </p:spTree>
-    <p:extLst>
-      <p:ext uri="{BB962C8B-B14F-4D97-AF65-F5344CB8AC3E}">
-        <p14:creationId xmlns:p14="http://schemas.microsoft.com/office/powerpoint/2010/main" val="1034013142"/>
-      </p:ext>
-    </p:extLst>
-  </p:cSld>
-  <p:clrMapOvr>
-    <a:masterClrMapping/>
-  </p:clrMapOvr>
-</p:notes>
-</file>
-
-<file path=ppt/notesSlides/notesSlide25.xml><?xml version="1.0" encoding="utf-8"?>
-<p:notes xmlns:a="http://schemas.openxmlformats.org/drawingml/2006/main" xmlns:r="http://schemas.openxmlformats.org/officeDocument/2006/relationships" xmlns:p="http://schemas.openxmlformats.org/presentationml/2006/main">
-  <p:cSld>
-    <p:spTree>
-      <p:nvGrpSpPr>
-        <p:cNvPr id="1" name="">
-          <a:extLst>
-            <a:ext uri="{FF2B5EF4-FFF2-40B4-BE49-F238E27FC236}">
-              <a16:creationId xmlns:a16="http://schemas.microsoft.com/office/drawing/2014/main" id="{048E5571-9C06-3D9D-0B72-0FB166818A19}"/>
-            </a:ext>
-          </a:extLst>
-        </p:cNvPr>
-        <p:cNvGrpSpPr/>
-        <p:nvPr/>
-      </p:nvGrpSpPr>
-      <p:grpSpPr>
-        <a:xfrm>
-          <a:off x="0" y="0"/>
-          <a:ext cx="0" cy="0"/>
-          <a:chOff x="0" y="0"/>
-          <a:chExt cx="0" cy="0"/>
-        </a:xfrm>
-      </p:grpSpPr>
-      <p:sp>
-        <p:nvSpPr>
-          <p:cNvPr id="2" name="Folienbildplatzhalter 1">
-            <a:extLst>
-              <a:ext uri="{FF2B5EF4-FFF2-40B4-BE49-F238E27FC236}">
-                <a16:creationId xmlns:a16="http://schemas.microsoft.com/office/drawing/2014/main" id="{56E55147-4CC9-4AE6-0084-06F35D3E910C}"/>
-              </a:ext>
-            </a:extLst>
-          </p:cNvPr>
-          <p:cNvSpPr>
-            <a:spLocks noGrp="1" noRot="1" noChangeAspect="1"/>
-          </p:cNvSpPr>
-          <p:nvPr>
-            <p:ph type="sldImg"/>
-          </p:nvPr>
-        </p:nvSpPr>
-        <p:spPr/>
-      </p:sp>
-      <p:sp>
-        <p:nvSpPr>
-          <p:cNvPr id="3" name="Notizenplatzhalter 2">
-            <a:extLst>
-              <a:ext uri="{FF2B5EF4-FFF2-40B4-BE49-F238E27FC236}">
-                <a16:creationId xmlns:a16="http://schemas.microsoft.com/office/drawing/2014/main" id="{9F5A9C58-9585-D677-E106-DC71C9C821FD}"/>
-              </a:ext>
-            </a:extLst>
-          </p:cNvPr>
-          <p:cNvSpPr>
-            <a:spLocks noGrp="1"/>
-          </p:cNvSpPr>
-          <p:nvPr>
-            <p:ph type="body" idx="1"/>
-          </p:nvPr>
-        </p:nvSpPr>
-        <p:spPr/>
-        <p:txBody>
-          <a:bodyPr/>
-          <a:lstStyle/>
-          <a:p>
-            <a:r>
-              <a:rPr lang="de-DE"/>
-              <a:t>Hier beginnen wir mit dem Hintergrund und der Motivation für unser Projekt. Wir geben einen Überblick über die Einzelhandelsbranche und erläutern die Zielsetzung unseres Data Science Projekts, um Prozesse zu optimieren und die Effizienz zu steigern.</a:t>
-            </a:r>
-          </a:p>
-        </p:txBody>
-      </p:sp>
-      <p:sp>
-        <p:nvSpPr>
-          <p:cNvPr id="4" name="Foliennummernplatzhalter 3">
-            <a:extLst>
-              <a:ext uri="{FF2B5EF4-FFF2-40B4-BE49-F238E27FC236}">
-                <a16:creationId xmlns:a16="http://schemas.microsoft.com/office/drawing/2014/main" id="{6848A3CD-E8AC-36DF-8026-29EFCC74EF16}"/>
-              </a:ext>
-            </a:extLst>
-          </p:cNvPr>
-          <p:cNvSpPr>
-            <a:spLocks noGrp="1"/>
-          </p:cNvSpPr>
-          <p:nvPr>
-            <p:ph type="sldNum" sz="quarter" idx="5"/>
-          </p:nvPr>
-        </p:nvSpPr>
-        <p:spPr/>
-        <p:txBody>
-          <a:bodyPr/>
-          <a:lstStyle/>
-          <a:p>
-            <a:fld id="{8C36BA74-7AA1-48ED-B9BC-0F570D47A936}" type="slidenum">
-              <a:t>46</a:t>
-            </a:fld>
-            <a:endParaRPr lang="de-DE"/>
-          </a:p>
-        </p:txBody>
-      </p:sp>
-    </p:spTree>
-    <p:extLst>
-      <p:ext uri="{BB962C8B-B14F-4D97-AF65-F5344CB8AC3E}">
-        <p14:creationId xmlns:p14="http://schemas.microsoft.com/office/powerpoint/2010/main" val="4232742151"/>
-      </p:ext>
-    </p:extLst>
   </p:cSld>
   <p:clrMapOvr>
     <a:masterClrMapping/>
@@ -3302,7 +3300,13 @@
   <p:cSld>
     <p:spTree>
       <p:nvGrpSpPr>
-        <p:cNvPr id="1" name=""/>
+        <p:cNvPr id="1" name="">
+          <a:extLst>
+            <a:ext uri="{FF2B5EF4-FFF2-40B4-BE49-F238E27FC236}">
+              <a16:creationId xmlns:a16="http://schemas.microsoft.com/office/drawing/2014/main" id="{789B3700-FB22-8ADE-F033-554F027A05E8}"/>
+            </a:ext>
+          </a:extLst>
+        </p:cNvPr>
         <p:cNvGrpSpPr/>
         <p:nvPr/>
       </p:nvGrpSpPr>
@@ -3316,7 +3320,13 @@
       </p:grpSpPr>
       <p:sp>
         <p:nvSpPr>
-          <p:cNvPr id="1330014680" name="Slide Image Placeholder 1"/>
+          <p:cNvPr id="1330014680" name="Slide Image Placeholder 1">
+            <a:extLst>
+              <a:ext uri="{FF2B5EF4-FFF2-40B4-BE49-F238E27FC236}">
+                <a16:creationId xmlns:a16="http://schemas.microsoft.com/office/drawing/2014/main" id="{3F736781-1889-BC5C-FB5F-F94DE5F74C59}"/>
+              </a:ext>
+            </a:extLst>
+          </p:cNvPr>
           <p:cNvSpPr>
             <a:spLocks noGrp="1" noRot="1" noChangeAspect="1"/>
           </p:cNvSpPr>
@@ -3328,7 +3338,13 @@
       </p:sp>
       <p:sp>
         <p:nvSpPr>
-          <p:cNvPr id="1330354815" name="Notes Placeholder 2"/>
+          <p:cNvPr id="1330354815" name="Notes Placeholder 2">
+            <a:extLst>
+              <a:ext uri="{FF2B5EF4-FFF2-40B4-BE49-F238E27FC236}">
+                <a16:creationId xmlns:a16="http://schemas.microsoft.com/office/drawing/2014/main" id="{FF20F60D-7F26-D4A8-74FD-54D044479092}"/>
+              </a:ext>
+            </a:extLst>
+          </p:cNvPr>
           <p:cNvSpPr>
             <a:spLocks noGrp="1"/>
           </p:cNvSpPr>
@@ -3350,7 +3366,13 @@
       </p:sp>
       <p:sp>
         <p:nvSpPr>
-          <p:cNvPr id="1667253447" name="Slide Number Placeholder 3"/>
+          <p:cNvPr id="1667253447" name="Slide Number Placeholder 3">
+            <a:extLst>
+              <a:ext uri="{FF2B5EF4-FFF2-40B4-BE49-F238E27FC236}">
+                <a16:creationId xmlns:a16="http://schemas.microsoft.com/office/drawing/2014/main" id="{FE15B35D-2E42-4F29-CE1E-E7107BA388F4}"/>
+              </a:ext>
+            </a:extLst>
+          </p:cNvPr>
           <p:cNvSpPr>
             <a:spLocks noGrp="1"/>
           </p:cNvSpPr>
@@ -3430,6 +3452,11 @@
         </p:txBody>
       </p:sp>
     </p:spTree>
+    <p:extLst>
+      <p:ext uri="{BB962C8B-B14F-4D97-AF65-F5344CB8AC3E}">
+        <p14:creationId xmlns:p14="http://schemas.microsoft.com/office/powerpoint/2010/main" val="237478640"/>
+      </p:ext>
+    </p:extLst>
   </p:cSld>
   <p:clrMapOvr>
     <a:masterClrMapping/>
@@ -3445,7 +3472,7 @@
         <p:cNvPr id="1" name="">
           <a:extLst>
             <a:ext uri="{FF2B5EF4-FFF2-40B4-BE49-F238E27FC236}">
-              <a16:creationId xmlns:a16="http://schemas.microsoft.com/office/drawing/2014/main" id="{789B3700-FB22-8ADE-F033-554F027A05E8}"/>
+              <a16:creationId xmlns:a16="http://schemas.microsoft.com/office/drawing/2014/main" id="{5FBB5073-8EAD-4DFA-A13D-BA454D6B5EC9}"/>
             </a:ext>
           </a:extLst>
         </p:cNvPr>
@@ -3465,7 +3492,7 @@
           <p:cNvPr id="1330014680" name="Slide Image Placeholder 1">
             <a:extLst>
               <a:ext uri="{FF2B5EF4-FFF2-40B4-BE49-F238E27FC236}">
-                <a16:creationId xmlns:a16="http://schemas.microsoft.com/office/drawing/2014/main" id="{3F736781-1889-BC5C-FB5F-F94DE5F74C59}"/>
+                <a16:creationId xmlns:a16="http://schemas.microsoft.com/office/drawing/2014/main" id="{0F3AAEC4-0330-20A6-7B90-AA189194E4A8}"/>
               </a:ext>
             </a:extLst>
           </p:cNvPr>
@@ -3483,7 +3510,7 @@
           <p:cNvPr id="1330354815" name="Notes Placeholder 2">
             <a:extLst>
               <a:ext uri="{FF2B5EF4-FFF2-40B4-BE49-F238E27FC236}">
-                <a16:creationId xmlns:a16="http://schemas.microsoft.com/office/drawing/2014/main" id="{FF20F60D-7F26-D4A8-74FD-54D044479092}"/>
+                <a16:creationId xmlns:a16="http://schemas.microsoft.com/office/drawing/2014/main" id="{7DD02D89-D38A-E02C-40B2-674E42F84C54}"/>
               </a:ext>
             </a:extLst>
           </p:cNvPr>
@@ -3511,7 +3538,7 @@
           <p:cNvPr id="1667253447" name="Slide Number Placeholder 3">
             <a:extLst>
               <a:ext uri="{FF2B5EF4-FFF2-40B4-BE49-F238E27FC236}">
-                <a16:creationId xmlns:a16="http://schemas.microsoft.com/office/drawing/2014/main" id="{FE15B35D-2E42-4F29-CE1E-E7107BA388F4}"/>
+                <a16:creationId xmlns:a16="http://schemas.microsoft.com/office/drawing/2014/main" id="{07874E8D-BFD4-4A81-8379-BB3DD1B4FCE8}"/>
               </a:ext>
             </a:extLst>
           </p:cNvPr>
@@ -3596,7 +3623,7 @@
     </p:spTree>
     <p:extLst>
       <p:ext uri="{BB962C8B-B14F-4D97-AF65-F5344CB8AC3E}">
-        <p14:creationId xmlns:p14="http://schemas.microsoft.com/office/powerpoint/2010/main" val="237478640"/>
+        <p14:creationId xmlns:p14="http://schemas.microsoft.com/office/powerpoint/2010/main" val="1128678057"/>
       </p:ext>
     </p:extLst>
   </p:cSld>
@@ -3614,7 +3641,7 @@
         <p:cNvPr id="1" name="">
           <a:extLst>
             <a:ext uri="{FF2B5EF4-FFF2-40B4-BE49-F238E27FC236}">
-              <a16:creationId xmlns:a16="http://schemas.microsoft.com/office/drawing/2014/main" id="{5FBB5073-8EAD-4DFA-A13D-BA454D6B5EC9}"/>
+              <a16:creationId xmlns:a16="http://schemas.microsoft.com/office/drawing/2014/main" id="{FA592738-03C1-03C9-8025-30BDA45C610D}"/>
             </a:ext>
           </a:extLst>
         </p:cNvPr>
@@ -3634,7 +3661,7 @@
           <p:cNvPr id="1330014680" name="Slide Image Placeholder 1">
             <a:extLst>
               <a:ext uri="{FF2B5EF4-FFF2-40B4-BE49-F238E27FC236}">
-                <a16:creationId xmlns:a16="http://schemas.microsoft.com/office/drawing/2014/main" id="{0F3AAEC4-0330-20A6-7B90-AA189194E4A8}"/>
+                <a16:creationId xmlns:a16="http://schemas.microsoft.com/office/drawing/2014/main" id="{2EE1E529-DC86-D3B6-49A0-2D65FA11F5A0}"/>
               </a:ext>
             </a:extLst>
           </p:cNvPr>
@@ -3652,7 +3679,7 @@
           <p:cNvPr id="1330354815" name="Notes Placeholder 2">
             <a:extLst>
               <a:ext uri="{FF2B5EF4-FFF2-40B4-BE49-F238E27FC236}">
-                <a16:creationId xmlns:a16="http://schemas.microsoft.com/office/drawing/2014/main" id="{7DD02D89-D38A-E02C-40B2-674E42F84C54}"/>
+                <a16:creationId xmlns:a16="http://schemas.microsoft.com/office/drawing/2014/main" id="{17574C73-F3BE-B80D-02C9-271B05D4D288}"/>
               </a:ext>
             </a:extLst>
           </p:cNvPr>
@@ -3680,7 +3707,7 @@
           <p:cNvPr id="1667253447" name="Slide Number Placeholder 3">
             <a:extLst>
               <a:ext uri="{FF2B5EF4-FFF2-40B4-BE49-F238E27FC236}">
-                <a16:creationId xmlns:a16="http://schemas.microsoft.com/office/drawing/2014/main" id="{07874E8D-BFD4-4A81-8379-BB3DD1B4FCE8}"/>
+                <a16:creationId xmlns:a16="http://schemas.microsoft.com/office/drawing/2014/main" id="{8FB20F0B-AB34-14B8-4963-85EFB34A9B42}"/>
               </a:ext>
             </a:extLst>
           </p:cNvPr>
@@ -3765,7 +3792,7 @@
     </p:spTree>
     <p:extLst>
       <p:ext uri="{BB962C8B-B14F-4D97-AF65-F5344CB8AC3E}">
-        <p14:creationId xmlns:p14="http://schemas.microsoft.com/office/powerpoint/2010/main" val="1128678057"/>
+        <p14:creationId xmlns:p14="http://schemas.microsoft.com/office/powerpoint/2010/main" val="3902437308"/>
       </p:ext>
     </p:extLst>
   </p:cSld>
@@ -3783,7 +3810,7 @@
         <p:cNvPr id="1" name="">
           <a:extLst>
             <a:ext uri="{FF2B5EF4-FFF2-40B4-BE49-F238E27FC236}">
-              <a16:creationId xmlns:a16="http://schemas.microsoft.com/office/drawing/2014/main" id="{FA592738-03C1-03C9-8025-30BDA45C610D}"/>
+              <a16:creationId xmlns:a16="http://schemas.microsoft.com/office/drawing/2014/main" id="{BD5F7901-49F7-F12B-FFA5-DDF2CF4C64DE}"/>
             </a:ext>
           </a:extLst>
         </p:cNvPr>
@@ -3803,7 +3830,7 @@
           <p:cNvPr id="1330014680" name="Slide Image Placeholder 1">
             <a:extLst>
               <a:ext uri="{FF2B5EF4-FFF2-40B4-BE49-F238E27FC236}">
-                <a16:creationId xmlns:a16="http://schemas.microsoft.com/office/drawing/2014/main" id="{2EE1E529-DC86-D3B6-49A0-2D65FA11F5A0}"/>
+                <a16:creationId xmlns:a16="http://schemas.microsoft.com/office/drawing/2014/main" id="{1A0931BC-1901-D7B8-7B73-9665A5A74878}"/>
               </a:ext>
             </a:extLst>
           </p:cNvPr>
@@ -3821,7 +3848,7 @@
           <p:cNvPr id="1330354815" name="Notes Placeholder 2">
             <a:extLst>
               <a:ext uri="{FF2B5EF4-FFF2-40B4-BE49-F238E27FC236}">
-                <a16:creationId xmlns:a16="http://schemas.microsoft.com/office/drawing/2014/main" id="{17574C73-F3BE-B80D-02C9-271B05D4D288}"/>
+                <a16:creationId xmlns:a16="http://schemas.microsoft.com/office/drawing/2014/main" id="{BF382972-7254-CD67-0466-0D32973D79F3}"/>
               </a:ext>
             </a:extLst>
           </p:cNvPr>
@@ -3849,7 +3876,7 @@
           <p:cNvPr id="1667253447" name="Slide Number Placeholder 3">
             <a:extLst>
               <a:ext uri="{FF2B5EF4-FFF2-40B4-BE49-F238E27FC236}">
-                <a16:creationId xmlns:a16="http://schemas.microsoft.com/office/drawing/2014/main" id="{8FB20F0B-AB34-14B8-4963-85EFB34A9B42}"/>
+                <a16:creationId xmlns:a16="http://schemas.microsoft.com/office/drawing/2014/main" id="{BB35E0D4-6A49-C004-8EAD-EC5900E109CA}"/>
               </a:ext>
             </a:extLst>
           </p:cNvPr>
@@ -3934,7 +3961,7 @@
     </p:spTree>
     <p:extLst>
       <p:ext uri="{BB962C8B-B14F-4D97-AF65-F5344CB8AC3E}">
-        <p14:creationId xmlns:p14="http://schemas.microsoft.com/office/powerpoint/2010/main" val="3902437308"/>
+        <p14:creationId xmlns:p14="http://schemas.microsoft.com/office/powerpoint/2010/main" val="599269686"/>
       </p:ext>
     </p:extLst>
   </p:cSld>
@@ -4092,7 +4119,7 @@
         <p:cNvPr id="1" name="">
           <a:extLst>
             <a:ext uri="{FF2B5EF4-FFF2-40B4-BE49-F238E27FC236}">
-              <a16:creationId xmlns:a16="http://schemas.microsoft.com/office/drawing/2014/main" id="{BD5F7901-49F7-F12B-FFA5-DDF2CF4C64DE}"/>
+              <a16:creationId xmlns:a16="http://schemas.microsoft.com/office/drawing/2014/main" id="{17C4D7CD-3D3F-EE5D-2B65-BC744F5F8820}"/>
             </a:ext>
           </a:extLst>
         </p:cNvPr>
@@ -4112,7 +4139,7 @@
           <p:cNvPr id="1330014680" name="Slide Image Placeholder 1">
             <a:extLst>
               <a:ext uri="{FF2B5EF4-FFF2-40B4-BE49-F238E27FC236}">
-                <a16:creationId xmlns:a16="http://schemas.microsoft.com/office/drawing/2014/main" id="{1A0931BC-1901-D7B8-7B73-9665A5A74878}"/>
+                <a16:creationId xmlns:a16="http://schemas.microsoft.com/office/drawing/2014/main" id="{486C0883-F4B1-6F2F-6707-76F6FC09F1B2}"/>
               </a:ext>
             </a:extLst>
           </p:cNvPr>
@@ -4130,7 +4157,7 @@
           <p:cNvPr id="1330354815" name="Notes Placeholder 2">
             <a:extLst>
               <a:ext uri="{FF2B5EF4-FFF2-40B4-BE49-F238E27FC236}">
-                <a16:creationId xmlns:a16="http://schemas.microsoft.com/office/drawing/2014/main" id="{BF382972-7254-CD67-0466-0D32973D79F3}"/>
+                <a16:creationId xmlns:a16="http://schemas.microsoft.com/office/drawing/2014/main" id="{30D83B0C-ECF8-B4E0-A3C5-DCEFE425F2D5}"/>
               </a:ext>
             </a:extLst>
           </p:cNvPr>
@@ -4158,7 +4185,7 @@
           <p:cNvPr id="1667253447" name="Slide Number Placeholder 3">
             <a:extLst>
               <a:ext uri="{FF2B5EF4-FFF2-40B4-BE49-F238E27FC236}">
-                <a16:creationId xmlns:a16="http://schemas.microsoft.com/office/drawing/2014/main" id="{BB35E0D4-6A49-C004-8EAD-EC5900E109CA}"/>
+                <a16:creationId xmlns:a16="http://schemas.microsoft.com/office/drawing/2014/main" id="{3F788EA0-AF0D-CFC7-4010-B5D1234D8D3B}"/>
               </a:ext>
             </a:extLst>
           </p:cNvPr>
@@ -4243,7 +4270,7 @@
     </p:spTree>
     <p:extLst>
       <p:ext uri="{BB962C8B-B14F-4D97-AF65-F5344CB8AC3E}">
-        <p14:creationId xmlns:p14="http://schemas.microsoft.com/office/powerpoint/2010/main" val="599269686"/>
+        <p14:creationId xmlns:p14="http://schemas.microsoft.com/office/powerpoint/2010/main" val="1901101225"/>
       </p:ext>
     </p:extLst>
   </p:cSld>
@@ -4261,7 +4288,7 @@
         <p:cNvPr id="1" name="">
           <a:extLst>
             <a:ext uri="{FF2B5EF4-FFF2-40B4-BE49-F238E27FC236}">
-              <a16:creationId xmlns:a16="http://schemas.microsoft.com/office/drawing/2014/main" id="{17C4D7CD-3D3F-EE5D-2B65-BC744F5F8820}"/>
+              <a16:creationId xmlns:a16="http://schemas.microsoft.com/office/drawing/2014/main" id="{E38C4809-F518-3D7B-0C88-35B6C0FEF890}"/>
             </a:ext>
           </a:extLst>
         </p:cNvPr>
@@ -4281,7 +4308,7 @@
           <p:cNvPr id="1330014680" name="Slide Image Placeholder 1">
             <a:extLst>
               <a:ext uri="{FF2B5EF4-FFF2-40B4-BE49-F238E27FC236}">
-                <a16:creationId xmlns:a16="http://schemas.microsoft.com/office/drawing/2014/main" id="{486C0883-F4B1-6F2F-6707-76F6FC09F1B2}"/>
+                <a16:creationId xmlns:a16="http://schemas.microsoft.com/office/drawing/2014/main" id="{B96B8645-5645-4593-160E-971598332BC5}"/>
               </a:ext>
             </a:extLst>
           </p:cNvPr>
@@ -4299,7 +4326,7 @@
           <p:cNvPr id="1330354815" name="Notes Placeholder 2">
             <a:extLst>
               <a:ext uri="{FF2B5EF4-FFF2-40B4-BE49-F238E27FC236}">
-                <a16:creationId xmlns:a16="http://schemas.microsoft.com/office/drawing/2014/main" id="{30D83B0C-ECF8-B4E0-A3C5-DCEFE425F2D5}"/>
+                <a16:creationId xmlns:a16="http://schemas.microsoft.com/office/drawing/2014/main" id="{0090F4AE-0523-527F-2B4F-FDFD0581F537}"/>
               </a:ext>
             </a:extLst>
           </p:cNvPr>
@@ -4327,7 +4354,7 @@
           <p:cNvPr id="1667253447" name="Slide Number Placeholder 3">
             <a:extLst>
               <a:ext uri="{FF2B5EF4-FFF2-40B4-BE49-F238E27FC236}">
-                <a16:creationId xmlns:a16="http://schemas.microsoft.com/office/drawing/2014/main" id="{3F788EA0-AF0D-CFC7-4010-B5D1234D8D3B}"/>
+                <a16:creationId xmlns:a16="http://schemas.microsoft.com/office/drawing/2014/main" id="{F162A118-2C31-8A95-F2BB-A4149F752131}"/>
               </a:ext>
             </a:extLst>
           </p:cNvPr>
@@ -4412,7 +4439,7 @@
     </p:spTree>
     <p:extLst>
       <p:ext uri="{BB962C8B-B14F-4D97-AF65-F5344CB8AC3E}">
-        <p14:creationId xmlns:p14="http://schemas.microsoft.com/office/powerpoint/2010/main" val="1901101225"/>
+        <p14:creationId xmlns:p14="http://schemas.microsoft.com/office/powerpoint/2010/main" val="1890091100"/>
       </p:ext>
     </p:extLst>
   </p:cSld>
@@ -4430,7 +4457,7 @@
         <p:cNvPr id="1" name="">
           <a:extLst>
             <a:ext uri="{FF2B5EF4-FFF2-40B4-BE49-F238E27FC236}">
-              <a16:creationId xmlns:a16="http://schemas.microsoft.com/office/drawing/2014/main" id="{E38C4809-F518-3D7B-0C88-35B6C0FEF890}"/>
+              <a16:creationId xmlns:a16="http://schemas.microsoft.com/office/drawing/2014/main" id="{CE5B9C85-AE9A-0B4C-3DDF-8F7EE7E7EFF2}"/>
             </a:ext>
           </a:extLst>
         </p:cNvPr>
@@ -4447,10 +4474,10 @@
       </p:grpSpPr>
       <p:sp>
         <p:nvSpPr>
-          <p:cNvPr id="1330014680" name="Slide Image Placeholder 1">
-            <a:extLst>
-              <a:ext uri="{FF2B5EF4-FFF2-40B4-BE49-F238E27FC236}">
-                <a16:creationId xmlns:a16="http://schemas.microsoft.com/office/drawing/2014/main" id="{B96B8645-5645-4593-160E-971598332BC5}"/>
+          <p:cNvPr id="139090186" name="Slide Image Placeholder 1">
+            <a:extLst>
+              <a:ext uri="{FF2B5EF4-FFF2-40B4-BE49-F238E27FC236}">
+                <a16:creationId xmlns:a16="http://schemas.microsoft.com/office/drawing/2014/main" id="{CA1EF806-6ADD-CD61-14D0-542D519DF096}"/>
               </a:ext>
             </a:extLst>
           </p:cNvPr>
@@ -4465,10 +4492,10 @@
       </p:sp>
       <p:sp>
         <p:nvSpPr>
-          <p:cNvPr id="1330354815" name="Notes Placeholder 2">
-            <a:extLst>
-              <a:ext uri="{FF2B5EF4-FFF2-40B4-BE49-F238E27FC236}">
-                <a16:creationId xmlns:a16="http://schemas.microsoft.com/office/drawing/2014/main" id="{0090F4AE-0523-527F-2B4F-FDFD0581F537}"/>
+          <p:cNvPr id="400293583" name="Notes Placeholder 2">
+            <a:extLst>
+              <a:ext uri="{FF2B5EF4-FFF2-40B4-BE49-F238E27FC236}">
+                <a16:creationId xmlns:a16="http://schemas.microsoft.com/office/drawing/2014/main" id="{A6E83C72-87D0-BB0F-CBF3-E614CE7ADC67}"/>
               </a:ext>
             </a:extLst>
           </p:cNvPr>
@@ -4493,10 +4520,10 @@
       </p:sp>
       <p:sp>
         <p:nvSpPr>
-          <p:cNvPr id="1667253447" name="Slide Number Placeholder 3">
-            <a:extLst>
-              <a:ext uri="{FF2B5EF4-FFF2-40B4-BE49-F238E27FC236}">
-                <a16:creationId xmlns:a16="http://schemas.microsoft.com/office/drawing/2014/main" id="{F162A118-2C31-8A95-F2BB-A4149F752131}"/>
+          <p:cNvPr id="1257388043" name="Slide Number Placeholder 3">
+            <a:extLst>
+              <a:ext uri="{FF2B5EF4-FFF2-40B4-BE49-F238E27FC236}">
+                <a16:creationId xmlns:a16="http://schemas.microsoft.com/office/drawing/2014/main" id="{BF9D2FA0-9A97-B5BB-2C32-0C999D597651}"/>
               </a:ext>
             </a:extLst>
           </p:cNvPr>
@@ -4529,7 +4556,7 @@
               <a:tabLst/>
               <a:defRPr/>
             </a:pPr>
-            <a:fld id="{37F1F184-79D2-F4EC-467F-CF3EF60FA136}" type="slidenum">
+            <a:fld id="{20073075-213A-DC53-9B24-1C6EF3B6ADAB}" type="slidenum">
               <a:rPr kumimoji="0" sz="1200" b="0" i="0" u="none" strike="noStrike" kern="0" cap="none" spc="0" normalizeH="0" baseline="0" noProof="0">
                 <a:ln>
                   <a:noFill/>
@@ -4581,7 +4608,7 @@
     </p:spTree>
     <p:extLst>
       <p:ext uri="{BB962C8B-B14F-4D97-AF65-F5344CB8AC3E}">
-        <p14:creationId xmlns:p14="http://schemas.microsoft.com/office/powerpoint/2010/main" val="1890091100"/>
+        <p14:creationId xmlns:p14="http://schemas.microsoft.com/office/powerpoint/2010/main" val="3523433093"/>
       </p:ext>
     </p:extLst>
   </p:cSld>
@@ -4599,7 +4626,7 @@
         <p:cNvPr id="1" name="">
           <a:extLst>
             <a:ext uri="{FF2B5EF4-FFF2-40B4-BE49-F238E27FC236}">
-              <a16:creationId xmlns:a16="http://schemas.microsoft.com/office/drawing/2014/main" id="{CE5B9C85-AE9A-0B4C-3DDF-8F7EE7E7EFF2}"/>
+              <a16:creationId xmlns:a16="http://schemas.microsoft.com/office/drawing/2014/main" id="{3DDADE42-1D1F-CA82-7701-4EF6DAAB2343}"/>
             </a:ext>
           </a:extLst>
         </p:cNvPr>
@@ -4619,7 +4646,7 @@
           <p:cNvPr id="139090186" name="Slide Image Placeholder 1">
             <a:extLst>
               <a:ext uri="{FF2B5EF4-FFF2-40B4-BE49-F238E27FC236}">
-                <a16:creationId xmlns:a16="http://schemas.microsoft.com/office/drawing/2014/main" id="{CA1EF806-6ADD-CD61-14D0-542D519DF096}"/>
+                <a16:creationId xmlns:a16="http://schemas.microsoft.com/office/drawing/2014/main" id="{35147794-95D5-3EBE-B29E-0F301F254631}"/>
               </a:ext>
             </a:extLst>
           </p:cNvPr>
@@ -4637,7 +4664,7 @@
           <p:cNvPr id="400293583" name="Notes Placeholder 2">
             <a:extLst>
               <a:ext uri="{FF2B5EF4-FFF2-40B4-BE49-F238E27FC236}">
-                <a16:creationId xmlns:a16="http://schemas.microsoft.com/office/drawing/2014/main" id="{A6E83C72-87D0-BB0F-CBF3-E614CE7ADC67}"/>
+                <a16:creationId xmlns:a16="http://schemas.microsoft.com/office/drawing/2014/main" id="{DCF11677-E798-0730-353F-2C3485653D38}"/>
               </a:ext>
             </a:extLst>
           </p:cNvPr>
@@ -4665,7 +4692,7 @@
           <p:cNvPr id="1257388043" name="Slide Number Placeholder 3">
             <a:extLst>
               <a:ext uri="{FF2B5EF4-FFF2-40B4-BE49-F238E27FC236}">
-                <a16:creationId xmlns:a16="http://schemas.microsoft.com/office/drawing/2014/main" id="{BF9D2FA0-9A97-B5BB-2C32-0C999D597651}"/>
+                <a16:creationId xmlns:a16="http://schemas.microsoft.com/office/drawing/2014/main" id="{EC38EF4C-01D8-D704-EC75-8DB8FF1E8139}"/>
               </a:ext>
             </a:extLst>
           </p:cNvPr>
@@ -4750,7 +4777,7 @@
     </p:spTree>
     <p:extLst>
       <p:ext uri="{BB962C8B-B14F-4D97-AF65-F5344CB8AC3E}">
-        <p14:creationId xmlns:p14="http://schemas.microsoft.com/office/powerpoint/2010/main" val="3523433093"/>
+        <p14:creationId xmlns:p14="http://schemas.microsoft.com/office/powerpoint/2010/main" val="1986518323"/>
       </p:ext>
     </p:extLst>
   </p:cSld>
@@ -4768,7 +4795,7 @@
         <p:cNvPr id="1" name="">
           <a:extLst>
             <a:ext uri="{FF2B5EF4-FFF2-40B4-BE49-F238E27FC236}">
-              <a16:creationId xmlns:a16="http://schemas.microsoft.com/office/drawing/2014/main" id="{3DDADE42-1D1F-CA82-7701-4EF6DAAB2343}"/>
+              <a16:creationId xmlns:a16="http://schemas.microsoft.com/office/drawing/2014/main" id="{54E4B3FB-A8BF-FE78-1355-F0237D106B7D}"/>
             </a:ext>
           </a:extLst>
         </p:cNvPr>
@@ -4788,7 +4815,7 @@
           <p:cNvPr id="139090186" name="Slide Image Placeholder 1">
             <a:extLst>
               <a:ext uri="{FF2B5EF4-FFF2-40B4-BE49-F238E27FC236}">
-                <a16:creationId xmlns:a16="http://schemas.microsoft.com/office/drawing/2014/main" id="{35147794-95D5-3EBE-B29E-0F301F254631}"/>
+                <a16:creationId xmlns:a16="http://schemas.microsoft.com/office/drawing/2014/main" id="{47572DA5-4A1F-FDD5-94BF-76FCF0F44D4D}"/>
               </a:ext>
             </a:extLst>
           </p:cNvPr>
@@ -4806,7 +4833,7 @@
           <p:cNvPr id="400293583" name="Notes Placeholder 2">
             <a:extLst>
               <a:ext uri="{FF2B5EF4-FFF2-40B4-BE49-F238E27FC236}">
-                <a16:creationId xmlns:a16="http://schemas.microsoft.com/office/drawing/2014/main" id="{DCF11677-E798-0730-353F-2C3485653D38}"/>
+                <a16:creationId xmlns:a16="http://schemas.microsoft.com/office/drawing/2014/main" id="{3AEFB35F-C11C-29BC-11FA-83AE8EED3E2C}"/>
               </a:ext>
             </a:extLst>
           </p:cNvPr>
@@ -4834,7 +4861,7 @@
           <p:cNvPr id="1257388043" name="Slide Number Placeholder 3">
             <a:extLst>
               <a:ext uri="{FF2B5EF4-FFF2-40B4-BE49-F238E27FC236}">
-                <a16:creationId xmlns:a16="http://schemas.microsoft.com/office/drawing/2014/main" id="{EC38EF4C-01D8-D704-EC75-8DB8FF1E8139}"/>
+                <a16:creationId xmlns:a16="http://schemas.microsoft.com/office/drawing/2014/main" id="{0DAC04F4-D0EA-1515-2C5E-3ADDCF840E5B}"/>
               </a:ext>
             </a:extLst>
           </p:cNvPr>
@@ -4919,7 +4946,7 @@
     </p:spTree>
     <p:extLst>
       <p:ext uri="{BB962C8B-B14F-4D97-AF65-F5344CB8AC3E}">
-        <p14:creationId xmlns:p14="http://schemas.microsoft.com/office/powerpoint/2010/main" val="1986518323"/>
+        <p14:creationId xmlns:p14="http://schemas.microsoft.com/office/powerpoint/2010/main" val="4222852445"/>
       </p:ext>
     </p:extLst>
   </p:cSld>
@@ -4937,7 +4964,7 @@
         <p:cNvPr id="1" name="">
           <a:extLst>
             <a:ext uri="{FF2B5EF4-FFF2-40B4-BE49-F238E27FC236}">
-              <a16:creationId xmlns:a16="http://schemas.microsoft.com/office/drawing/2014/main" id="{54E4B3FB-A8BF-FE78-1355-F0237D106B7D}"/>
+              <a16:creationId xmlns:a16="http://schemas.microsoft.com/office/drawing/2014/main" id="{C472848F-AB5D-8100-D4FC-B0369624D857}"/>
             </a:ext>
           </a:extLst>
         </p:cNvPr>
@@ -4957,7 +4984,7 @@
           <p:cNvPr id="139090186" name="Slide Image Placeholder 1">
             <a:extLst>
               <a:ext uri="{FF2B5EF4-FFF2-40B4-BE49-F238E27FC236}">
-                <a16:creationId xmlns:a16="http://schemas.microsoft.com/office/drawing/2014/main" id="{47572DA5-4A1F-FDD5-94BF-76FCF0F44D4D}"/>
+                <a16:creationId xmlns:a16="http://schemas.microsoft.com/office/drawing/2014/main" id="{EA4F9FA6-0ABA-72AD-8931-02FFAE41E5B6}"/>
               </a:ext>
             </a:extLst>
           </p:cNvPr>
@@ -4975,7 +5002,7 @@
           <p:cNvPr id="400293583" name="Notes Placeholder 2">
             <a:extLst>
               <a:ext uri="{FF2B5EF4-FFF2-40B4-BE49-F238E27FC236}">
-                <a16:creationId xmlns:a16="http://schemas.microsoft.com/office/drawing/2014/main" id="{3AEFB35F-C11C-29BC-11FA-83AE8EED3E2C}"/>
+                <a16:creationId xmlns:a16="http://schemas.microsoft.com/office/drawing/2014/main" id="{1DB8AF28-8DB2-BBA8-1427-E61A79BFC192}"/>
               </a:ext>
             </a:extLst>
           </p:cNvPr>
@@ -5003,7 +5030,7 @@
           <p:cNvPr id="1257388043" name="Slide Number Placeholder 3">
             <a:extLst>
               <a:ext uri="{FF2B5EF4-FFF2-40B4-BE49-F238E27FC236}">
-                <a16:creationId xmlns:a16="http://schemas.microsoft.com/office/drawing/2014/main" id="{0DAC04F4-D0EA-1515-2C5E-3ADDCF840E5B}"/>
+                <a16:creationId xmlns:a16="http://schemas.microsoft.com/office/drawing/2014/main" id="{313F6753-B0A3-302F-A04C-03A379CE9458}"/>
               </a:ext>
             </a:extLst>
           </p:cNvPr>
@@ -5088,7 +5115,7 @@
     </p:spTree>
     <p:extLst>
       <p:ext uri="{BB962C8B-B14F-4D97-AF65-F5344CB8AC3E}">
-        <p14:creationId xmlns:p14="http://schemas.microsoft.com/office/powerpoint/2010/main" val="4222852445"/>
+        <p14:creationId xmlns:p14="http://schemas.microsoft.com/office/powerpoint/2010/main" val="1209080239"/>
       </p:ext>
     </p:extLst>
   </p:cSld>
@@ -5106,7 +5133,7 @@
         <p:cNvPr id="1" name="">
           <a:extLst>
             <a:ext uri="{FF2B5EF4-FFF2-40B4-BE49-F238E27FC236}">
-              <a16:creationId xmlns:a16="http://schemas.microsoft.com/office/drawing/2014/main" id="{C472848F-AB5D-8100-D4FC-B0369624D857}"/>
+              <a16:creationId xmlns:a16="http://schemas.microsoft.com/office/drawing/2014/main" id="{3B1FF912-D4B6-1CEC-3109-5A46A657F9A8}"/>
             </a:ext>
           </a:extLst>
         </p:cNvPr>
@@ -5126,7 +5153,7 @@
           <p:cNvPr id="139090186" name="Slide Image Placeholder 1">
             <a:extLst>
               <a:ext uri="{FF2B5EF4-FFF2-40B4-BE49-F238E27FC236}">
-                <a16:creationId xmlns:a16="http://schemas.microsoft.com/office/drawing/2014/main" id="{EA4F9FA6-0ABA-72AD-8931-02FFAE41E5B6}"/>
+                <a16:creationId xmlns:a16="http://schemas.microsoft.com/office/drawing/2014/main" id="{2C804D89-D859-90B1-FA99-F2C6E3C8554F}"/>
               </a:ext>
             </a:extLst>
           </p:cNvPr>
@@ -5144,7 +5171,7 @@
           <p:cNvPr id="400293583" name="Notes Placeholder 2">
             <a:extLst>
               <a:ext uri="{FF2B5EF4-FFF2-40B4-BE49-F238E27FC236}">
-                <a16:creationId xmlns:a16="http://schemas.microsoft.com/office/drawing/2014/main" id="{1DB8AF28-8DB2-BBA8-1427-E61A79BFC192}"/>
+                <a16:creationId xmlns:a16="http://schemas.microsoft.com/office/drawing/2014/main" id="{63F06931-B822-4E01-8732-EF7B8505423D}"/>
               </a:ext>
             </a:extLst>
           </p:cNvPr>
@@ -5172,7 +5199,7 @@
           <p:cNvPr id="1257388043" name="Slide Number Placeholder 3">
             <a:extLst>
               <a:ext uri="{FF2B5EF4-FFF2-40B4-BE49-F238E27FC236}">
-                <a16:creationId xmlns:a16="http://schemas.microsoft.com/office/drawing/2014/main" id="{313F6753-B0A3-302F-A04C-03A379CE9458}"/>
+                <a16:creationId xmlns:a16="http://schemas.microsoft.com/office/drawing/2014/main" id="{4BBF9850-A72A-ACFD-7968-08C6DB530A1B}"/>
               </a:ext>
             </a:extLst>
           </p:cNvPr>
@@ -5257,7 +5284,7 @@
     </p:spTree>
     <p:extLst>
       <p:ext uri="{BB962C8B-B14F-4D97-AF65-F5344CB8AC3E}">
-        <p14:creationId xmlns:p14="http://schemas.microsoft.com/office/powerpoint/2010/main" val="1209080239"/>
+        <p14:creationId xmlns:p14="http://schemas.microsoft.com/office/powerpoint/2010/main" val="2928311505"/>
       </p:ext>
     </p:extLst>
   </p:cSld>
@@ -5275,7 +5302,7 @@
         <p:cNvPr id="1" name="">
           <a:extLst>
             <a:ext uri="{FF2B5EF4-FFF2-40B4-BE49-F238E27FC236}">
-              <a16:creationId xmlns:a16="http://schemas.microsoft.com/office/drawing/2014/main" id="{3B1FF912-D4B6-1CEC-3109-5A46A657F9A8}"/>
+              <a16:creationId xmlns:a16="http://schemas.microsoft.com/office/drawing/2014/main" id="{D54197A9-3A08-8138-3B9E-2BB85FA21840}"/>
             </a:ext>
           </a:extLst>
         </p:cNvPr>
@@ -5295,7 +5322,7 @@
           <p:cNvPr id="139090186" name="Slide Image Placeholder 1">
             <a:extLst>
               <a:ext uri="{FF2B5EF4-FFF2-40B4-BE49-F238E27FC236}">
-                <a16:creationId xmlns:a16="http://schemas.microsoft.com/office/drawing/2014/main" id="{2C804D89-D859-90B1-FA99-F2C6E3C8554F}"/>
+                <a16:creationId xmlns:a16="http://schemas.microsoft.com/office/drawing/2014/main" id="{8AA4346E-9454-E11B-994F-C04C794218AC}"/>
               </a:ext>
             </a:extLst>
           </p:cNvPr>
@@ -5313,7 +5340,7 @@
           <p:cNvPr id="400293583" name="Notes Placeholder 2">
             <a:extLst>
               <a:ext uri="{FF2B5EF4-FFF2-40B4-BE49-F238E27FC236}">
-                <a16:creationId xmlns:a16="http://schemas.microsoft.com/office/drawing/2014/main" id="{63F06931-B822-4E01-8732-EF7B8505423D}"/>
+                <a16:creationId xmlns:a16="http://schemas.microsoft.com/office/drawing/2014/main" id="{CC09FF6F-C58C-896A-5D0B-3D139EC960CC}"/>
               </a:ext>
             </a:extLst>
           </p:cNvPr>
@@ -5341,7 +5368,7 @@
           <p:cNvPr id="1257388043" name="Slide Number Placeholder 3">
             <a:extLst>
               <a:ext uri="{FF2B5EF4-FFF2-40B4-BE49-F238E27FC236}">
-                <a16:creationId xmlns:a16="http://schemas.microsoft.com/office/drawing/2014/main" id="{4BBF9850-A72A-ACFD-7968-08C6DB530A1B}"/>
+                <a16:creationId xmlns:a16="http://schemas.microsoft.com/office/drawing/2014/main" id="{6F4E5B97-2792-0614-BD4C-B57075754CE8}"/>
               </a:ext>
             </a:extLst>
           </p:cNvPr>
@@ -5426,7 +5453,7 @@
     </p:spTree>
     <p:extLst>
       <p:ext uri="{BB962C8B-B14F-4D97-AF65-F5344CB8AC3E}">
-        <p14:creationId xmlns:p14="http://schemas.microsoft.com/office/powerpoint/2010/main" val="2928311505"/>
+        <p14:creationId xmlns:p14="http://schemas.microsoft.com/office/powerpoint/2010/main" val="1724071367"/>
       </p:ext>
     </p:extLst>
   </p:cSld>
@@ -5444,7 +5471,7 @@
         <p:cNvPr id="1" name="">
           <a:extLst>
             <a:ext uri="{FF2B5EF4-FFF2-40B4-BE49-F238E27FC236}">
-              <a16:creationId xmlns:a16="http://schemas.microsoft.com/office/drawing/2014/main" id="{D54197A9-3A08-8138-3B9E-2BB85FA21840}"/>
+              <a16:creationId xmlns:a16="http://schemas.microsoft.com/office/drawing/2014/main" id="{A2E9F3D3-D5A2-453D-4054-1B6ABEA6DF19}"/>
             </a:ext>
           </a:extLst>
         </p:cNvPr>
@@ -5464,7 +5491,7 @@
           <p:cNvPr id="139090186" name="Slide Image Placeholder 1">
             <a:extLst>
               <a:ext uri="{FF2B5EF4-FFF2-40B4-BE49-F238E27FC236}">
-                <a16:creationId xmlns:a16="http://schemas.microsoft.com/office/drawing/2014/main" id="{8AA4346E-9454-E11B-994F-C04C794218AC}"/>
+                <a16:creationId xmlns:a16="http://schemas.microsoft.com/office/drawing/2014/main" id="{13F44863-AC7B-8ABD-AAA9-D819BC1D70C8}"/>
               </a:ext>
             </a:extLst>
           </p:cNvPr>
@@ -5482,7 +5509,7 @@
           <p:cNvPr id="400293583" name="Notes Placeholder 2">
             <a:extLst>
               <a:ext uri="{FF2B5EF4-FFF2-40B4-BE49-F238E27FC236}">
-                <a16:creationId xmlns:a16="http://schemas.microsoft.com/office/drawing/2014/main" id="{CC09FF6F-C58C-896A-5D0B-3D139EC960CC}"/>
+                <a16:creationId xmlns:a16="http://schemas.microsoft.com/office/drawing/2014/main" id="{13B76D12-19FF-91AA-4941-782F0B7996F1}"/>
               </a:ext>
             </a:extLst>
           </p:cNvPr>
@@ -5510,7 +5537,7 @@
           <p:cNvPr id="1257388043" name="Slide Number Placeholder 3">
             <a:extLst>
               <a:ext uri="{FF2B5EF4-FFF2-40B4-BE49-F238E27FC236}">
-                <a16:creationId xmlns:a16="http://schemas.microsoft.com/office/drawing/2014/main" id="{6F4E5B97-2792-0614-BD4C-B57075754CE8}"/>
+                <a16:creationId xmlns:a16="http://schemas.microsoft.com/office/drawing/2014/main" id="{2DB14216-72B6-587D-8E1A-5F4B7D7AA16C}"/>
               </a:ext>
             </a:extLst>
           </p:cNvPr>
@@ -5595,7 +5622,7 @@
     </p:spTree>
     <p:extLst>
       <p:ext uri="{BB962C8B-B14F-4D97-AF65-F5344CB8AC3E}">
-        <p14:creationId xmlns:p14="http://schemas.microsoft.com/office/powerpoint/2010/main" val="1724071367"/>
+        <p14:creationId xmlns:p14="http://schemas.microsoft.com/office/powerpoint/2010/main" val="3871987960"/>
       </p:ext>
     </p:extLst>
   </p:cSld>
@@ -5613,7 +5640,7 @@
         <p:cNvPr id="1" name="">
           <a:extLst>
             <a:ext uri="{FF2B5EF4-FFF2-40B4-BE49-F238E27FC236}">
-              <a16:creationId xmlns:a16="http://schemas.microsoft.com/office/drawing/2014/main" id="{A2E9F3D3-D5A2-453D-4054-1B6ABEA6DF19}"/>
+              <a16:creationId xmlns:a16="http://schemas.microsoft.com/office/drawing/2014/main" id="{83E06739-1567-B389-27EB-96890F9ECD30}"/>
             </a:ext>
           </a:extLst>
         </p:cNvPr>
@@ -5633,7 +5660,7 @@
           <p:cNvPr id="139090186" name="Slide Image Placeholder 1">
             <a:extLst>
               <a:ext uri="{FF2B5EF4-FFF2-40B4-BE49-F238E27FC236}">
-                <a16:creationId xmlns:a16="http://schemas.microsoft.com/office/drawing/2014/main" id="{13F44863-AC7B-8ABD-AAA9-D819BC1D70C8}"/>
+                <a16:creationId xmlns:a16="http://schemas.microsoft.com/office/drawing/2014/main" id="{932D7566-9A6D-225F-EA98-70101BF44016}"/>
               </a:ext>
             </a:extLst>
           </p:cNvPr>
@@ -5651,7 +5678,7 @@
           <p:cNvPr id="400293583" name="Notes Placeholder 2">
             <a:extLst>
               <a:ext uri="{FF2B5EF4-FFF2-40B4-BE49-F238E27FC236}">
-                <a16:creationId xmlns:a16="http://schemas.microsoft.com/office/drawing/2014/main" id="{13B76D12-19FF-91AA-4941-782F0B7996F1}"/>
+                <a16:creationId xmlns:a16="http://schemas.microsoft.com/office/drawing/2014/main" id="{F2073CA3-EE16-2C99-C6C6-07A0340AA00B}"/>
               </a:ext>
             </a:extLst>
           </p:cNvPr>
@@ -5679,7 +5706,7 @@
           <p:cNvPr id="1257388043" name="Slide Number Placeholder 3">
             <a:extLst>
               <a:ext uri="{FF2B5EF4-FFF2-40B4-BE49-F238E27FC236}">
-                <a16:creationId xmlns:a16="http://schemas.microsoft.com/office/drawing/2014/main" id="{2DB14216-72B6-587D-8E1A-5F4B7D7AA16C}"/>
+                <a16:creationId xmlns:a16="http://schemas.microsoft.com/office/drawing/2014/main" id="{C8578FD1-B651-4D44-4A9A-EAAF684110CF}"/>
               </a:ext>
             </a:extLst>
           </p:cNvPr>
@@ -5764,7 +5791,7 @@
     </p:spTree>
     <p:extLst>
       <p:ext uri="{BB962C8B-B14F-4D97-AF65-F5344CB8AC3E}">
-        <p14:creationId xmlns:p14="http://schemas.microsoft.com/office/powerpoint/2010/main" val="3871987960"/>
+        <p14:creationId xmlns:p14="http://schemas.microsoft.com/office/powerpoint/2010/main" val="1821547892"/>
       </p:ext>
     </p:extLst>
   </p:cSld>
@@ -5922,7 +5949,7 @@
         <p:cNvPr id="1" name="">
           <a:extLst>
             <a:ext uri="{FF2B5EF4-FFF2-40B4-BE49-F238E27FC236}">
-              <a16:creationId xmlns:a16="http://schemas.microsoft.com/office/drawing/2014/main" id="{83E06739-1567-B389-27EB-96890F9ECD30}"/>
+              <a16:creationId xmlns:a16="http://schemas.microsoft.com/office/drawing/2014/main" id="{071F79CF-CD17-6033-1FEF-05B17707F01A}"/>
             </a:ext>
           </a:extLst>
         </p:cNvPr>
@@ -5942,7 +5969,7 @@
           <p:cNvPr id="139090186" name="Slide Image Placeholder 1">
             <a:extLst>
               <a:ext uri="{FF2B5EF4-FFF2-40B4-BE49-F238E27FC236}">
-                <a16:creationId xmlns:a16="http://schemas.microsoft.com/office/drawing/2014/main" id="{932D7566-9A6D-225F-EA98-70101BF44016}"/>
+                <a16:creationId xmlns:a16="http://schemas.microsoft.com/office/drawing/2014/main" id="{EE683B9E-A0DE-86F4-BD95-319D8EBFE26F}"/>
               </a:ext>
             </a:extLst>
           </p:cNvPr>
@@ -5960,7 +5987,7 @@
           <p:cNvPr id="400293583" name="Notes Placeholder 2">
             <a:extLst>
               <a:ext uri="{FF2B5EF4-FFF2-40B4-BE49-F238E27FC236}">
-                <a16:creationId xmlns:a16="http://schemas.microsoft.com/office/drawing/2014/main" id="{F2073CA3-EE16-2C99-C6C6-07A0340AA00B}"/>
+                <a16:creationId xmlns:a16="http://schemas.microsoft.com/office/drawing/2014/main" id="{364C980E-94DA-1FD5-935B-F531D86CBDD4}"/>
               </a:ext>
             </a:extLst>
           </p:cNvPr>
@@ -5988,7 +6015,7 @@
           <p:cNvPr id="1257388043" name="Slide Number Placeholder 3">
             <a:extLst>
               <a:ext uri="{FF2B5EF4-FFF2-40B4-BE49-F238E27FC236}">
-                <a16:creationId xmlns:a16="http://schemas.microsoft.com/office/drawing/2014/main" id="{C8578FD1-B651-4D44-4A9A-EAAF684110CF}"/>
+                <a16:creationId xmlns:a16="http://schemas.microsoft.com/office/drawing/2014/main" id="{FFBE7416-06B8-8F75-A9EF-A9895DF8107A}"/>
               </a:ext>
             </a:extLst>
           </p:cNvPr>
@@ -6073,7 +6100,7 @@
     </p:spTree>
     <p:extLst>
       <p:ext uri="{BB962C8B-B14F-4D97-AF65-F5344CB8AC3E}">
-        <p14:creationId xmlns:p14="http://schemas.microsoft.com/office/powerpoint/2010/main" val="1821547892"/>
+        <p14:creationId xmlns:p14="http://schemas.microsoft.com/office/powerpoint/2010/main" val="2318382485"/>
       </p:ext>
     </p:extLst>
   </p:cSld>
@@ -6091,7 +6118,7 @@
         <p:cNvPr id="1" name="">
           <a:extLst>
             <a:ext uri="{FF2B5EF4-FFF2-40B4-BE49-F238E27FC236}">
-              <a16:creationId xmlns:a16="http://schemas.microsoft.com/office/drawing/2014/main" id="{071F79CF-CD17-6033-1FEF-05B17707F01A}"/>
+              <a16:creationId xmlns:a16="http://schemas.microsoft.com/office/drawing/2014/main" id="{DA3283D2-DBF6-D5A5-0A46-10E5E73BF7F5}"/>
             </a:ext>
           </a:extLst>
         </p:cNvPr>
@@ -6111,7 +6138,7 @@
           <p:cNvPr id="139090186" name="Slide Image Placeholder 1">
             <a:extLst>
               <a:ext uri="{FF2B5EF4-FFF2-40B4-BE49-F238E27FC236}">
-                <a16:creationId xmlns:a16="http://schemas.microsoft.com/office/drawing/2014/main" id="{EE683B9E-A0DE-86F4-BD95-319D8EBFE26F}"/>
+                <a16:creationId xmlns:a16="http://schemas.microsoft.com/office/drawing/2014/main" id="{0A1192E9-FB02-CB2D-DBEF-1A1C4CFD871D}"/>
               </a:ext>
             </a:extLst>
           </p:cNvPr>
@@ -6129,7 +6156,7 @@
           <p:cNvPr id="400293583" name="Notes Placeholder 2">
             <a:extLst>
               <a:ext uri="{FF2B5EF4-FFF2-40B4-BE49-F238E27FC236}">
-                <a16:creationId xmlns:a16="http://schemas.microsoft.com/office/drawing/2014/main" id="{364C980E-94DA-1FD5-935B-F531D86CBDD4}"/>
+                <a16:creationId xmlns:a16="http://schemas.microsoft.com/office/drawing/2014/main" id="{9A9D6D79-C617-A95F-CB9A-C7E9C3EEACA9}"/>
               </a:ext>
             </a:extLst>
           </p:cNvPr>
@@ -6157,7 +6184,7 @@
           <p:cNvPr id="1257388043" name="Slide Number Placeholder 3">
             <a:extLst>
               <a:ext uri="{FF2B5EF4-FFF2-40B4-BE49-F238E27FC236}">
-                <a16:creationId xmlns:a16="http://schemas.microsoft.com/office/drawing/2014/main" id="{FFBE7416-06B8-8F75-A9EF-A9895DF8107A}"/>
+                <a16:creationId xmlns:a16="http://schemas.microsoft.com/office/drawing/2014/main" id="{2E5FC565-6F52-C6E6-2CE6-21A3593D4DDC}"/>
               </a:ext>
             </a:extLst>
           </p:cNvPr>
@@ -6242,7 +6269,7 @@
     </p:spTree>
     <p:extLst>
       <p:ext uri="{BB962C8B-B14F-4D97-AF65-F5344CB8AC3E}">
-        <p14:creationId xmlns:p14="http://schemas.microsoft.com/office/powerpoint/2010/main" val="2318382485"/>
+        <p14:creationId xmlns:p14="http://schemas.microsoft.com/office/powerpoint/2010/main" val="284837936"/>
       </p:ext>
     </p:extLst>
   </p:cSld>
@@ -6260,7 +6287,7 @@
         <p:cNvPr id="1" name="">
           <a:extLst>
             <a:ext uri="{FF2B5EF4-FFF2-40B4-BE49-F238E27FC236}">
-              <a16:creationId xmlns:a16="http://schemas.microsoft.com/office/drawing/2014/main" id="{DA3283D2-DBF6-D5A5-0A46-10E5E73BF7F5}"/>
+              <a16:creationId xmlns:a16="http://schemas.microsoft.com/office/drawing/2014/main" id="{69F313CF-1FEC-98D5-3C31-CE6F4B8F6ABF}"/>
             </a:ext>
           </a:extLst>
         </p:cNvPr>
@@ -6280,7 +6307,7 @@
           <p:cNvPr id="139090186" name="Slide Image Placeholder 1">
             <a:extLst>
               <a:ext uri="{FF2B5EF4-FFF2-40B4-BE49-F238E27FC236}">
-                <a16:creationId xmlns:a16="http://schemas.microsoft.com/office/drawing/2014/main" id="{0A1192E9-FB02-CB2D-DBEF-1A1C4CFD871D}"/>
+                <a16:creationId xmlns:a16="http://schemas.microsoft.com/office/drawing/2014/main" id="{3E126841-CF9B-8112-14DF-EF343B2B21B4}"/>
               </a:ext>
             </a:extLst>
           </p:cNvPr>
@@ -6298,7 +6325,7 @@
           <p:cNvPr id="400293583" name="Notes Placeholder 2">
             <a:extLst>
               <a:ext uri="{FF2B5EF4-FFF2-40B4-BE49-F238E27FC236}">
-                <a16:creationId xmlns:a16="http://schemas.microsoft.com/office/drawing/2014/main" id="{9A9D6D79-C617-A95F-CB9A-C7E9C3EEACA9}"/>
+                <a16:creationId xmlns:a16="http://schemas.microsoft.com/office/drawing/2014/main" id="{BA1A9BCC-D8A0-8BD2-7F2A-D5FDE80127E6}"/>
               </a:ext>
             </a:extLst>
           </p:cNvPr>
@@ -6326,7 +6353,7 @@
           <p:cNvPr id="1257388043" name="Slide Number Placeholder 3">
             <a:extLst>
               <a:ext uri="{FF2B5EF4-FFF2-40B4-BE49-F238E27FC236}">
-                <a16:creationId xmlns:a16="http://schemas.microsoft.com/office/drawing/2014/main" id="{2E5FC565-6F52-C6E6-2CE6-21A3593D4DDC}"/>
+                <a16:creationId xmlns:a16="http://schemas.microsoft.com/office/drawing/2014/main" id="{258DFE2D-F19D-0F43-B42D-F1713DB9637F}"/>
               </a:ext>
             </a:extLst>
           </p:cNvPr>
@@ -6411,7 +6438,7 @@
     </p:spTree>
     <p:extLst>
       <p:ext uri="{BB962C8B-B14F-4D97-AF65-F5344CB8AC3E}">
-        <p14:creationId xmlns:p14="http://schemas.microsoft.com/office/powerpoint/2010/main" val="284837936"/>
+        <p14:creationId xmlns:p14="http://schemas.microsoft.com/office/powerpoint/2010/main" val="785065613"/>
       </p:ext>
     </p:extLst>
   </p:cSld>
@@ -6422,175 +6449,6 @@
 </file>
 
 <file path=ppt/notesSlides/notesSlide43.xml><?xml version="1.0" encoding="utf-8"?>
-<p:notes xmlns:a="http://schemas.openxmlformats.org/drawingml/2006/main" xmlns:r="http://schemas.openxmlformats.org/officeDocument/2006/relationships" xmlns:p="http://schemas.openxmlformats.org/presentationml/2006/main">
-  <p:cSld>
-    <p:spTree>
-      <p:nvGrpSpPr>
-        <p:cNvPr id="1" name="">
-          <a:extLst>
-            <a:ext uri="{FF2B5EF4-FFF2-40B4-BE49-F238E27FC236}">
-              <a16:creationId xmlns:a16="http://schemas.microsoft.com/office/drawing/2014/main" id="{69F313CF-1FEC-98D5-3C31-CE6F4B8F6ABF}"/>
-            </a:ext>
-          </a:extLst>
-        </p:cNvPr>
-        <p:cNvGrpSpPr/>
-        <p:nvPr/>
-      </p:nvGrpSpPr>
-      <p:grpSpPr bwMode="auto">
-        <a:xfrm>
-          <a:off x="0" y="0"/>
-          <a:ext cx="0" cy="0"/>
-          <a:chOff x="0" y="0"/>
-          <a:chExt cx="0" cy="0"/>
-        </a:xfrm>
-      </p:grpSpPr>
-      <p:sp>
-        <p:nvSpPr>
-          <p:cNvPr id="139090186" name="Slide Image Placeholder 1">
-            <a:extLst>
-              <a:ext uri="{FF2B5EF4-FFF2-40B4-BE49-F238E27FC236}">
-                <a16:creationId xmlns:a16="http://schemas.microsoft.com/office/drawing/2014/main" id="{3E126841-CF9B-8112-14DF-EF343B2B21B4}"/>
-              </a:ext>
-            </a:extLst>
-          </p:cNvPr>
-          <p:cNvSpPr>
-            <a:spLocks noGrp="1" noRot="1" noChangeAspect="1"/>
-          </p:cNvSpPr>
-          <p:nvPr>
-            <p:ph type="sldImg"/>
-          </p:nvPr>
-        </p:nvSpPr>
-        <p:spPr bwMode="auto"/>
-      </p:sp>
-      <p:sp>
-        <p:nvSpPr>
-          <p:cNvPr id="400293583" name="Notes Placeholder 2">
-            <a:extLst>
-              <a:ext uri="{FF2B5EF4-FFF2-40B4-BE49-F238E27FC236}">
-                <a16:creationId xmlns:a16="http://schemas.microsoft.com/office/drawing/2014/main" id="{BA1A9BCC-D8A0-8BD2-7F2A-D5FDE80127E6}"/>
-              </a:ext>
-            </a:extLst>
-          </p:cNvPr>
-          <p:cNvSpPr>
-            <a:spLocks noGrp="1"/>
-          </p:cNvSpPr>
-          <p:nvPr>
-            <p:ph type="body" idx="1"/>
-          </p:nvPr>
-        </p:nvSpPr>
-        <p:spPr bwMode="auto"/>
-        <p:txBody>
-          <a:bodyPr/>
-          <a:lstStyle/>
-          <a:p>
-            <a:pPr>
-              <a:defRPr/>
-            </a:pPr>
-            <a:endParaRPr/>
-          </a:p>
-        </p:txBody>
-      </p:sp>
-      <p:sp>
-        <p:nvSpPr>
-          <p:cNvPr id="1257388043" name="Slide Number Placeholder 3">
-            <a:extLst>
-              <a:ext uri="{FF2B5EF4-FFF2-40B4-BE49-F238E27FC236}">
-                <a16:creationId xmlns:a16="http://schemas.microsoft.com/office/drawing/2014/main" id="{258DFE2D-F19D-0F43-B42D-F1713DB9637F}"/>
-              </a:ext>
-            </a:extLst>
-          </p:cNvPr>
-          <p:cNvSpPr>
-            <a:spLocks noGrp="1"/>
-          </p:cNvSpPr>
-          <p:nvPr>
-            <p:ph type="sldNum" sz="quarter" idx="10"/>
-          </p:nvPr>
-        </p:nvSpPr>
-        <p:spPr bwMode="auto"/>
-        <p:txBody>
-          <a:bodyPr/>
-          <a:lstStyle/>
-          <a:p>
-            <a:pPr marL="0" marR="0" lvl="0" indent="0" algn="r" defTabSz="914400" eaLnBrk="1" fontAlgn="auto" latinLnBrk="0" hangingPunct="1">
-              <a:lnSpc>
-                <a:spcPct val="100000"/>
-              </a:lnSpc>
-              <a:spcBef>
-                <a:spcPts val="0"/>
-              </a:spcBef>
-              <a:spcAft>
-                <a:spcPts val="0"/>
-              </a:spcAft>
-              <a:buClrTx/>
-              <a:buSzTx/>
-              <a:buFontTx/>
-              <a:buNone/>
-              <a:tabLst/>
-              <a:defRPr/>
-            </a:pPr>
-            <a:fld id="{20073075-213A-DC53-9B24-1C6EF3B6ADAB}" type="slidenum">
-              <a:rPr kumimoji="0" sz="1200" b="0" i="0" u="none" strike="noStrike" kern="0" cap="none" spc="0" normalizeH="0" baseline="0" noProof="0">
-                <a:ln>
-                  <a:noFill/>
-                </a:ln>
-                <a:solidFill>
-                  <a:prstClr val="black"/>
-                </a:solidFill>
-                <a:effectLst/>
-                <a:uLnTx/>
-                <a:uFillTx/>
-                <a:latin typeface="Calibri"/>
-                <a:cs typeface="Arial"/>
-              </a:rPr>
-              <a:pPr marL="0" marR="0" lvl="0" indent="0" algn="r" defTabSz="914400" eaLnBrk="1" fontAlgn="auto" latinLnBrk="0" hangingPunct="1">
-                <a:lnSpc>
-                  <a:spcPct val="100000"/>
-                </a:lnSpc>
-                <a:spcBef>
-                  <a:spcPts val="0"/>
-                </a:spcBef>
-                <a:spcAft>
-                  <a:spcPts val="0"/>
-                </a:spcAft>
-                <a:buClrTx/>
-                <a:buSzTx/>
-                <a:buFontTx/>
-                <a:buNone/>
-                <a:tabLst/>
-                <a:defRPr/>
-              </a:pPr>
-              <a:t>72</a:t>
-            </a:fld>
-            <a:endParaRPr kumimoji="0" sz="1200" b="0" i="0" u="none" strike="noStrike" kern="0" cap="none" spc="0" normalizeH="0" baseline="0" noProof="0">
-              <a:ln>
-                <a:noFill/>
-              </a:ln>
-              <a:solidFill>
-                <a:prstClr val="black"/>
-              </a:solidFill>
-              <a:effectLst/>
-              <a:uLnTx/>
-              <a:uFillTx/>
-              <a:latin typeface="Calibri"/>
-              <a:cs typeface="Arial"/>
-            </a:endParaRPr>
-          </a:p>
-        </p:txBody>
-      </p:sp>
-    </p:spTree>
-    <p:extLst>
-      <p:ext uri="{BB962C8B-B14F-4D97-AF65-F5344CB8AC3E}">
-        <p14:creationId xmlns:p14="http://schemas.microsoft.com/office/powerpoint/2010/main" val="785065613"/>
-      </p:ext>
-    </p:extLst>
-  </p:cSld>
-  <p:clrMapOvr>
-    <a:masterClrMapping/>
-  </p:clrMapOvr>
-</p:notes>
-</file>
-
-<file path=ppt/notesSlides/notesSlide44.xml><?xml version="1.0" encoding="utf-8"?>
 <p:notes xmlns:a="http://schemas.openxmlformats.org/drawingml/2006/main" xmlns:r="http://schemas.openxmlformats.org/officeDocument/2006/relationships" xmlns:p="http://schemas.openxmlformats.org/presentationml/2006/main">
   <p:cSld>
     <p:spTree>
@@ -6681,7 +6539,7 @@
           <a:lstStyle/>
           <a:p>
             <a:fld id="{8C36BA74-7AA1-48ED-B9BC-0F570D47A936}" type="slidenum">
-              <a:t>73</a:t>
+              <a:t>72</a:t>
             </a:fld>
             <a:endParaRPr lang="de-DE"/>
           </a:p>
@@ -6700,7 +6558,7 @@
 </p:notes>
 </file>
 
-<file path=ppt/notesSlides/notesSlide45.xml><?xml version="1.0" encoding="utf-8"?>
+<file path=ppt/notesSlides/notesSlide44.xml><?xml version="1.0" encoding="utf-8"?>
 <p:notes xmlns:a="http://schemas.openxmlformats.org/drawingml/2006/main" xmlns:r="http://schemas.openxmlformats.org/officeDocument/2006/relationships" xmlns:p="http://schemas.openxmlformats.org/presentationml/2006/main">
   <p:cSld>
     <p:spTree>
@@ -6791,7 +6649,7 @@
           <a:lstStyle/>
           <a:p>
             <a:fld id="{8C36BA74-7AA1-48ED-B9BC-0F570D47A936}" type="slidenum">
-              <a:t>76</a:t>
+              <a:t>75</a:t>
             </a:fld>
             <a:endParaRPr lang="de-DE"/>
           </a:p>
@@ -7909,7 +7767,7 @@
           <a:p>
             <a:fld id="{4E96B16B-3D02-421E-9A22-E7AF4889F0FE}" type="datetime1">
               <a:rPr lang="en-US" smtClean="0"/>
-              <a:t>7/8/2025</a:t>
+              <a:t>7/9/2025</a:t>
             </a:fld>
             <a:endParaRPr lang="en-US"/>
           </a:p>
@@ -7967,7 +7825,7 @@
           <a:p>
             <a:fld id="{148CC95F-0247-41B6-91CF-DC97C76A7088}" type="slidenum">
               <a:rPr lang="en-US" smtClean="0"/>
-              <a:t>‹#›</a:t>
+              <a:t>‹Nr.›</a:t>
             </a:fld>
             <a:endParaRPr lang="en-US"/>
           </a:p>
@@ -8111,7 +7969,7 @@
           <a:p>
             <a:fld id="{DB775AC6-EFC6-47B7-8612-9DA8DD25D955}" type="datetime1">
               <a:rPr lang="en-US" smtClean="0"/>
-              <a:t>7/8/2025</a:t>
+              <a:t>7/9/2025</a:t>
             </a:fld>
             <a:endParaRPr lang="en-US"/>
           </a:p>
@@ -8169,7 +8027,7 @@
           <a:p>
             <a:fld id="{148CC95F-0247-41B6-91CF-DC97C76A7088}" type="slidenum">
               <a:rPr lang="en-US" smtClean="0"/>
-              <a:t>‹#›</a:t>
+              <a:t>‹Nr.›</a:t>
             </a:fld>
             <a:endParaRPr lang="en-US"/>
           </a:p>
@@ -8455,7 +8313,7 @@
           <a:p>
             <a:fld id="{6AA36526-50D6-4421-A203-614B20CF2703}" type="datetime1">
               <a:rPr lang="en-US" smtClean="0"/>
-              <a:t>7/8/2025</a:t>
+              <a:t>7/9/2025</a:t>
             </a:fld>
             <a:endParaRPr lang="en-US"/>
           </a:p>
@@ -8513,7 +8371,7 @@
           <a:p>
             <a:fld id="{148CC95F-0247-41B6-91CF-DC97C76A7088}" type="slidenum">
               <a:rPr lang="en-US" smtClean="0"/>
-              <a:t>‹#›</a:t>
+              <a:t>‹Nr.›</a:t>
             </a:fld>
             <a:endParaRPr lang="en-US"/>
           </a:p>
@@ -8714,7 +8572,7 @@
           <a:p>
             <a:fld id="{75E84928-FE16-43B9-BC25-2859501720EA}" type="datetime1">
               <a:rPr lang="en-US" smtClean="0"/>
-              <a:t>7/8/2025</a:t>
+              <a:t>7/9/2025</a:t>
             </a:fld>
             <a:endParaRPr lang="en-US"/>
           </a:p>
@@ -8777,7 +8635,7 @@
           <a:p>
             <a:fld id="{148CC95F-0247-41B6-91CF-DC97C76A7088}" type="slidenum">
               <a:rPr lang="en-US" smtClean="0"/>
-              <a:t>‹#›</a:t>
+              <a:t>‹Nr.›</a:t>
             </a:fld>
             <a:endParaRPr lang="en-US"/>
           </a:p>
@@ -9134,7 +8992,7 @@
           <a:p>
             <a:fld id="{52B94D21-0962-4C08-BB57-BC7507DEE084}" type="datetime1">
               <a:rPr lang="en-US" smtClean="0"/>
-              <a:t>7/8/2025</a:t>
+              <a:t>7/9/2025</a:t>
             </a:fld>
             <a:endParaRPr lang="en-US"/>
           </a:p>
@@ -9192,7 +9050,7 @@
           <a:p>
             <a:fld id="{148CC95F-0247-41B6-91CF-DC97C76A7088}" type="slidenum">
               <a:rPr lang="en-US" smtClean="0"/>
-              <a:t>‹#›</a:t>
+              <a:t>‹Nr.›</a:t>
             </a:fld>
             <a:endParaRPr lang="en-US"/>
           </a:p>
@@ -9587,7 +9445,7 @@
           <a:p>
             <a:fld id="{EF075700-B54E-437C-8A31-0CC21845C39D}" type="datetime1">
               <a:rPr lang="en-US" smtClean="0"/>
-              <a:t>7/8/2025</a:t>
+              <a:t>7/9/2025</a:t>
             </a:fld>
             <a:endParaRPr lang="en-US"/>
           </a:p>
@@ -9645,7 +9503,7 @@
           <a:p>
             <a:fld id="{148CC95F-0247-41B6-91CF-DC97C76A7088}" type="slidenum">
               <a:rPr lang="en-US" smtClean="0"/>
-              <a:t>‹#›</a:t>
+              <a:t>‹Nr.›</a:t>
             </a:fld>
             <a:endParaRPr lang="en-US"/>
           </a:p>
@@ -10139,7 +9997,7 @@
           <a:p>
             <a:fld id="{A7472505-C2E4-4560-87BD-F72139D98800}" type="datetime1">
               <a:rPr lang="en-US" smtClean="0"/>
-              <a:t>7/8/2025</a:t>
+              <a:t>7/9/2025</a:t>
             </a:fld>
             <a:endParaRPr lang="en-US"/>
           </a:p>
@@ -10197,7 +10055,7 @@
           <a:p>
             <a:fld id="{148CC95F-0247-41B6-91CF-DC97C76A7088}" type="slidenum">
               <a:rPr lang="en-US" smtClean="0"/>
-              <a:t>‹#›</a:t>
+              <a:t>‹Nr.›</a:t>
             </a:fld>
             <a:endParaRPr lang="en-US"/>
           </a:p>
@@ -10416,7 +10274,7 @@
           <a:p>
             <a:fld id="{688C6202-6C0C-4936-9181-C3BAC183F367}" type="datetime1">
               <a:rPr lang="en-US" smtClean="0"/>
-              <a:t>7/8/2025</a:t>
+              <a:t>7/9/2025</a:t>
             </a:fld>
             <a:endParaRPr lang="en-US"/>
           </a:p>
@@ -10474,7 +10332,7 @@
           <a:p>
             <a:fld id="{148CC95F-0247-41B6-91CF-DC97C76A7088}" type="slidenum">
               <a:rPr lang="en-US" smtClean="0"/>
-              <a:t>‹#›</a:t>
+              <a:t>‹Nr.›</a:t>
             </a:fld>
             <a:endParaRPr lang="en-US"/>
           </a:p>
@@ -10665,7 +10523,7 @@
           <a:p>
             <a:fld id="{B9C3A1C5-5A4D-40F5-AA30-2E2FA551A28A}" type="datetime1">
               <a:rPr lang="en-US" smtClean="0"/>
-              <a:t>7/8/2025</a:t>
+              <a:t>7/9/2025</a:t>
             </a:fld>
             <a:endParaRPr lang="en-US"/>
           </a:p>
@@ -10723,7 +10581,7 @@
           <a:p>
             <a:fld id="{148CC95F-0247-41B6-91CF-DC97C76A7088}" type="slidenum">
               <a:rPr lang="en-US" smtClean="0"/>
-              <a:t>‹#›</a:t>
+              <a:t>‹Nr.›</a:t>
             </a:fld>
             <a:endParaRPr lang="en-US"/>
           </a:p>
@@ -11118,7 +10976,7 @@
           <a:p>
             <a:fld id="{A3AFC84A-6073-47BB-AA17-B11F88B48FFC}" type="datetime1">
               <a:rPr lang="en-US" smtClean="0"/>
-              <a:t>7/8/2025</a:t>
+              <a:t>7/9/2025</a:t>
             </a:fld>
             <a:endParaRPr lang="en-US"/>
           </a:p>
@@ -11176,7 +11034,7 @@
           <a:p>
             <a:fld id="{148CC95F-0247-41B6-91CF-DC97C76A7088}" type="slidenum">
               <a:rPr lang="en-US" smtClean="0"/>
-              <a:t>‹#›</a:t>
+              <a:t>‹Nr.›</a:t>
             </a:fld>
             <a:endParaRPr lang="en-US"/>
           </a:p>
@@ -11546,7 +11404,7 @@
           <a:p>
             <a:fld id="{049970C6-98BD-4B9C-9DB4-A09FCA6FDD64}" type="datetime1">
               <a:rPr lang="en-US" smtClean="0"/>
-              <a:t>7/8/2025</a:t>
+              <a:t>7/9/2025</a:t>
             </a:fld>
             <a:endParaRPr lang="en-US"/>
           </a:p>
@@ -11604,7 +11462,7 @@
           <a:p>
             <a:fld id="{148CC95F-0247-41B6-91CF-DC97C76A7088}" type="slidenum">
               <a:rPr lang="en-US" smtClean="0"/>
-              <a:t>‹#›</a:t>
+              <a:t>‹Nr.›</a:t>
             </a:fld>
             <a:endParaRPr lang="en-US"/>
           </a:p>
@@ -11979,7 +11837,7 @@
             <a:fld id="{148CC95F-0247-41B6-91CF-DC97C76A7088}" type="slidenum">
               <a:rPr lang="en-US" smtClean="0"/>
               <a:pPr/>
-              <a:t>‹#›</a:t>
+              <a:t>‹Nr.›</a:t>
             </a:fld>
             <a:endParaRPr lang="en-US"/>
           </a:p>
@@ -12124,7 +11982,7 @@
           <a:p>
             <a:fld id="{F21DBC69-2876-4ACB-95B6-39F77D4C7E0D}" type="datetime1">
               <a:rPr lang="en-US" smtClean="0"/>
-              <a:t>7/8/2025</a:t>
+              <a:t>7/9/2025</a:t>
             </a:fld>
             <a:r>
               <a:rPr lang="en-US"/>
@@ -14430,22 +14288,57 @@
           <a:p>
             <a:r>
               <a:rPr lang="de-DE" dirty="0"/>
-              <a:t> 8.120 Produkte mit Eigenschaften </a:t>
+              <a:t> 8.120 Produkte aus 14 Kategorien</a:t>
             </a:r>
           </a:p>
           <a:p>
             <a:r>
               <a:rPr lang="de-DE" dirty="0"/>
-              <a:t>Kategorie, Preis, Gewicht, Beliebtheit, Altersfreigabe </a:t>
-            </a:r>
+              <a:t> Preis, Gewicht, Beliebtheit, </a:t>
+            </a:r>
+            <a:r>
+              <a:rPr lang="de-DE"/>
+              <a:t>Altersfreigabe …</a:t>
+            </a:r>
+            <a:endParaRPr lang="de-DE" dirty="0"/>
           </a:p>
           <a:p>
             <a:pPr marL="0" indent="0">
               <a:buNone/>
             </a:pPr>
             <a:r>
+              <a:rPr lang="de-DE" b="1" dirty="0"/>
+              <a:t>„stores.csv“</a:t>
+            </a:r>
+          </a:p>
+          <a:p>
+            <a:r>
               <a:rPr lang="de-DE" dirty="0"/>
-              <a:t> </a:t>
+              <a:t>  18 Filialen mit Standortinfos, Bundesland, Urbanisierungsgrad                           </a:t>
+            </a:r>
+            <a:r>
+              <a:rPr lang="de-DE" b="1" dirty="0"/>
+              <a:t>Unsere Gruppe:</a:t>
+            </a:r>
+            <a:r>
+              <a:rPr lang="de-DE" dirty="0"/>
+              <a:t>										          </a:t>
+            </a:r>
+            <a:r>
+              <a:rPr lang="de-DE" dirty="0" err="1"/>
+              <a:t>labeled</a:t>
+            </a:r>
+            <a:r>
+              <a:rPr lang="de-DE" dirty="0"/>
+              <a:t>:	      </a:t>
+            </a:r>
+            <a:r>
+              <a:rPr lang="de-DE" dirty="0" err="1"/>
+              <a:t>unlabeled</a:t>
+            </a:r>
+            <a:r>
+              <a:rPr lang="de-DE" dirty="0"/>
+              <a:t>:</a:t>
             </a:r>
           </a:p>
           <a:p>
@@ -14453,20 +14346,8 @@
               <a:buNone/>
             </a:pPr>
             <a:r>
-              <a:rPr lang="de-DE" b="1" dirty="0"/>
-              <a:t>„stores.csv“</a:t>
-            </a:r>
-          </a:p>
-          <a:p>
-            <a:r>
               <a:rPr lang="de-DE" dirty="0"/>
-              <a:t>  18 Filialen </a:t>
-            </a:r>
-          </a:p>
-          <a:p>
-            <a:r>
-              <a:rPr lang="de-DE" dirty="0"/>
-              <a:t>Standortinformationen, Bundesland, Urbanisierungsgrad 	</a:t>
+              <a:t> 	</a:t>
             </a:r>
           </a:p>
           <a:p>
@@ -14503,10 +14384,10 @@
       </p:sp>
       <p:pic>
         <p:nvPicPr>
-          <p:cNvPr id="4" name="Grafik 3">
-            <a:extLst>
-              <a:ext uri="{FF2B5EF4-FFF2-40B4-BE49-F238E27FC236}">
-                <a16:creationId xmlns:a16="http://schemas.microsoft.com/office/drawing/2014/main" id="{3731CF15-955E-C6AF-A125-33E9A23C1979}"/>
+          <p:cNvPr id="11" name="Grafik 10">
+            <a:extLst>
+              <a:ext uri="{FF2B5EF4-FFF2-40B4-BE49-F238E27FC236}">
+                <a16:creationId xmlns:a16="http://schemas.microsoft.com/office/drawing/2014/main" id="{3C583B48-F85D-4ED9-BA98-4716503A7519}"/>
               </a:ext>
             </a:extLst>
           </p:cNvPr>
@@ -14523,8 +14404,8 @@
         </p:blipFill>
         <p:spPr>
           <a:xfrm>
-            <a:off x="7030279" y="2357288"/>
-            <a:ext cx="2133898" cy="2143424"/>
+            <a:off x="8409592" y="4840483"/>
+            <a:ext cx="1324160" cy="733527"/>
           </a:xfrm>
           <a:prstGeom prst="rect">
             <a:avLst/>
@@ -14533,10 +14414,10 @@
       </p:pic>
       <p:pic>
         <p:nvPicPr>
-          <p:cNvPr id="6" name="Grafik 5">
-            <a:extLst>
-              <a:ext uri="{FF2B5EF4-FFF2-40B4-BE49-F238E27FC236}">
-                <a16:creationId xmlns:a16="http://schemas.microsoft.com/office/drawing/2014/main" id="{41FBF9FE-ABA3-C103-4DF1-930616DBA271}"/>
+          <p:cNvPr id="5" name="Grafik 4">
+            <a:extLst>
+              <a:ext uri="{FF2B5EF4-FFF2-40B4-BE49-F238E27FC236}">
+                <a16:creationId xmlns:a16="http://schemas.microsoft.com/office/drawing/2014/main" id="{0EE31664-24D8-0833-5DB5-FC1801BFDE4D}"/>
               </a:ext>
             </a:extLst>
           </p:cNvPr>
@@ -14553,8 +14434,68 @@
         </p:blipFill>
         <p:spPr>
           <a:xfrm>
-            <a:off x="7053469" y="4959753"/>
-            <a:ext cx="1524213" cy="1152686"/>
+            <a:off x="10112267" y="4840483"/>
+            <a:ext cx="1400370" cy="733527"/>
+          </a:xfrm>
+          <a:prstGeom prst="rect">
+            <a:avLst/>
+          </a:prstGeom>
+        </p:spPr>
+      </p:pic>
+      <p:pic>
+        <p:nvPicPr>
+          <p:cNvPr id="10" name="Grafik 9">
+            <a:extLst>
+              <a:ext uri="{FF2B5EF4-FFF2-40B4-BE49-F238E27FC236}">
+                <a16:creationId xmlns:a16="http://schemas.microsoft.com/office/drawing/2014/main" id="{A4CA30DC-606D-A5FE-25F1-EFC237375C85}"/>
+              </a:ext>
+            </a:extLst>
+          </p:cNvPr>
+          <p:cNvPicPr>
+            <a:picLocks noChangeAspect="1"/>
+          </p:cNvPicPr>
+          <p:nvPr/>
+        </p:nvPicPr>
+        <p:blipFill>
+          <a:blip r:embed="rId4"/>
+          <a:stretch>
+            <a:fillRect/>
+          </a:stretch>
+        </p:blipFill>
+        <p:spPr>
+          <a:xfrm>
+            <a:off x="934415" y="4649955"/>
+            <a:ext cx="1000265" cy="1114581"/>
+          </a:xfrm>
+          <a:prstGeom prst="rect">
+            <a:avLst/>
+          </a:prstGeom>
+        </p:spPr>
+      </p:pic>
+      <p:pic>
+        <p:nvPicPr>
+          <p:cNvPr id="14" name="Grafik 13">
+            <a:extLst>
+              <a:ext uri="{FF2B5EF4-FFF2-40B4-BE49-F238E27FC236}">
+                <a16:creationId xmlns:a16="http://schemas.microsoft.com/office/drawing/2014/main" id="{E857EFFD-F6E7-300F-674E-6B8BACCD4BA1}"/>
+              </a:ext>
+            </a:extLst>
+          </p:cNvPr>
+          <p:cNvPicPr>
+            <a:picLocks noChangeAspect="1"/>
+          </p:cNvPicPr>
+          <p:nvPr/>
+        </p:nvPicPr>
+        <p:blipFill>
+          <a:blip r:embed="rId5"/>
+          <a:stretch>
+            <a:fillRect/>
+          </a:stretch>
+        </p:blipFill>
+        <p:spPr>
+          <a:xfrm>
+            <a:off x="2471044" y="4649955"/>
+            <a:ext cx="1047896" cy="1009791"/>
           </a:xfrm>
           <a:prstGeom prst="rect">
             <a:avLst/>
@@ -14564,7 +14505,7 @@
     </p:spTree>
     <p:extLst>
       <p:ext uri="{BB962C8B-B14F-4D97-AF65-F5344CB8AC3E}">
-        <p14:creationId xmlns:p14="http://schemas.microsoft.com/office/powerpoint/2010/main" val="690359582"/>
+        <p14:creationId xmlns:p14="http://schemas.microsoft.com/office/powerpoint/2010/main" val="4217823414"/>
       </p:ext>
     </p:extLst>
   </p:cSld>
@@ -19982,7 +19923,7 @@
             </a:pPr>
             <a:r>
               <a:rPr lang="de-DE" sz="1900" dirty="0"/>
-              <a:t>enthalten häufiger </a:t>
+              <a:t>enthalten leicht häufiger </a:t>
             </a:r>
             <a:r>
               <a:rPr lang="de-DE" sz="1900" b="1" dirty="0"/>
@@ -20212,7 +20153,7 @@
         </p:spPr>
         <p:txBody>
           <a:bodyPr vertOverflow="overflow" horzOverflow="overflow" vert="horz" wrap="square" lIns="91440" tIns="45720" rIns="91440" bIns="45720" numCol="1" spcCol="0" rtlCol="0" fromWordArt="0" anchor="t" anchorCtr="0" forceAA="0" compatLnSpc="0">
-            <a:normAutofit fontScale="95000" lnSpcReduction="1000"/>
+            <a:normAutofit fontScale="95000" lnSpcReduction="11000"/>
           </a:bodyPr>
           <a:lstStyle>
             <a:lvl1pPr marL="228600" indent="-228600" algn="l" defTabSz="914400">
@@ -20486,6 +20427,35 @@
             <a:r>
               <a:rPr lang="de-DE" dirty="0"/>
               <a:t> anzusehen</a:t>
+            </a:r>
+          </a:p>
+          <a:p>
+            <a:pPr lvl="0">
+              <a:lnSpc>
+                <a:spcPct val="111000"/>
+              </a:lnSpc>
+              <a:defRPr/>
+            </a:pPr>
+            <a:endParaRPr lang="de-DE" dirty="0"/>
+          </a:p>
+          <a:p>
+            <a:pPr lvl="0">
+              <a:lnSpc>
+                <a:spcPct val="111000"/>
+              </a:lnSpc>
+              <a:defRPr/>
+            </a:pPr>
+            <a:r>
+              <a:rPr lang="de-DE" dirty="0"/>
+              <a:t>Aber: Extremwerte </a:t>
+            </a:r>
+            <a:r>
+              <a:rPr lang="de-DE" b="1" dirty="0"/>
+              <a:t>nicht systematisch häufiger </a:t>
+            </a:r>
+            <a:r>
+              <a:rPr lang="de-DE" dirty="0"/>
+              <a:t>bei FRAUD als bei NORMAL</a:t>
             </a:r>
           </a:p>
           <a:p>
@@ -20617,8 +20587,8 @@
         </p:nvSpPr>
         <p:spPr bwMode="auto">
           <a:xfrm>
-            <a:off x="592205" y="1842988"/>
-            <a:ext cx="7076956" cy="3767328"/>
+            <a:off x="592204" y="1842988"/>
+            <a:ext cx="10901705" cy="3767328"/>
           </a:xfrm>
         </p:spPr>
         <p:txBody>
@@ -20834,7 +20804,7 @@
             </a:pPr>
             <a:r>
               <a:rPr lang="de-DE" dirty="0"/>
-              <a:t>t-Test als Entscheidungskriterium, welche Prädiktoren signifikant sind</a:t>
+              <a:t>t-Test als Entscheidungskriterium, welche Prädiktoren signifikant sind </a:t>
             </a:r>
           </a:p>
           <a:p>
@@ -21515,83 +21485,6 @@
       </p:grpSpPr>
       <p:sp>
         <p:nvSpPr>
-          <p:cNvPr id="1861776648" name="Title 1"/>
-          <p:cNvSpPr>
-            <a:spLocks noGrp="1"/>
-          </p:cNvSpPr>
-          <p:nvPr>
-            <p:ph type="title"/>
-          </p:nvPr>
-        </p:nvSpPr>
-        <p:spPr bwMode="auto"/>
-        <p:txBody>
-          <a:bodyPr/>
-          <a:lstStyle/>
-          <a:p>
-            <a:pPr>
-              <a:defRPr/>
-            </a:pPr>
-            <a:r>
-              <a:rPr lang="de-DE" dirty="0"/>
-              <a:t>Kategoriale Merkmale: </a:t>
-            </a:r>
-            <a:r>
-              <a:rPr lang="de-CH" dirty="0"/>
-              <a:t>Wochentag</a:t>
-            </a:r>
-            <a:endParaRPr dirty="0"/>
-          </a:p>
-        </p:txBody>
-      </p:sp>
-      <p:pic>
-        <p:nvPicPr>
-          <p:cNvPr id="750932172" name="Grafik 750932171"/>
-          <p:cNvPicPr>
-            <a:picLocks noChangeAspect="1"/>
-          </p:cNvPicPr>
-          <p:nvPr/>
-        </p:nvPicPr>
-        <p:blipFill>
-          <a:blip r:embed="rId3"/>
-          <a:stretch/>
-        </p:blipFill>
-        <p:spPr bwMode="auto">
-          <a:xfrm>
-            <a:off x="2183204" y="2368093"/>
-            <a:ext cx="7620000" cy="3809999"/>
-          </a:xfrm>
-          <a:prstGeom prst="rect">
-            <a:avLst/>
-          </a:prstGeom>
-        </p:spPr>
-      </p:pic>
-    </p:spTree>
-  </p:cSld>
-  <p:clrMapOvr>
-    <a:masterClrMapping/>
-  </p:clrMapOvr>
-</p:sld>
-</file>
-
-<file path=ppt/slides/slide36.xml><?xml version="1.0" encoding="utf-8"?>
-<p:sld xmlns:a="http://schemas.openxmlformats.org/drawingml/2006/main" xmlns:r="http://schemas.openxmlformats.org/officeDocument/2006/relationships" xmlns:p="http://schemas.openxmlformats.org/presentationml/2006/main" showMasterPhAnim="0">
-  <p:cSld>
-    <p:spTree>
-      <p:nvGrpSpPr>
-        <p:cNvPr id="1" name=""/>
-        <p:cNvGrpSpPr/>
-        <p:nvPr/>
-      </p:nvGrpSpPr>
-      <p:grpSpPr bwMode="auto">
-        <a:xfrm>
-          <a:off x="0" y="0"/>
-          <a:ext cx="0" cy="0"/>
-          <a:chOff x="0" y="0"/>
-          <a:chExt cx="0" cy="0"/>
-        </a:xfrm>
-      </p:grpSpPr>
-      <p:sp>
-        <p:nvSpPr>
           <p:cNvPr id="1123850493" name="Title 1"/>
           <p:cNvSpPr>
             <a:spLocks noGrp="1"/>
@@ -21672,7 +21565,7 @@
 </p:sld>
 </file>
 
-<file path=ppt/slides/slide37.xml><?xml version="1.0" encoding="utf-8"?>
+<file path=ppt/slides/slide36.xml><?xml version="1.0" encoding="utf-8"?>
 <p:sld xmlns:a="http://schemas.openxmlformats.org/drawingml/2006/main" xmlns:r="http://schemas.openxmlformats.org/officeDocument/2006/relationships" xmlns:p="http://schemas.openxmlformats.org/presentationml/2006/main" showMasterPhAnim="0">
   <p:cSld>
     <p:spTree>
@@ -21772,7 +21665,7 @@
 </p:sld>
 </file>
 
-<file path=ppt/slides/slide38.xml><?xml version="1.0" encoding="utf-8"?>
+<file path=ppt/slides/slide37.xml><?xml version="1.0" encoding="utf-8"?>
 <p:sld xmlns:a="http://schemas.openxmlformats.org/drawingml/2006/main" xmlns:r="http://schemas.openxmlformats.org/officeDocument/2006/relationships" xmlns:p="http://schemas.openxmlformats.org/presentationml/2006/main" showMasterPhAnim="0">
   <p:cSld>
     <p:spTree>
@@ -21871,7 +21764,7 @@
 </p:sld>
 </file>
 
-<file path=ppt/slides/slide39.xml><?xml version="1.0" encoding="utf-8"?>
+<file path=ppt/slides/slide38.xml><?xml version="1.0" encoding="utf-8"?>
 <p:sld xmlns:a="http://schemas.openxmlformats.org/drawingml/2006/main" xmlns:r="http://schemas.openxmlformats.org/officeDocument/2006/relationships" xmlns:p="http://schemas.openxmlformats.org/presentationml/2006/main" showMasterPhAnim="0">
   <p:cSld>
     <p:spTree>
@@ -21948,201 +21841,7 @@
 </p:sld>
 </file>
 
-<file path=ppt/slides/slide4.xml><?xml version="1.0" encoding="utf-8"?>
-<p:sld xmlns:a="http://schemas.openxmlformats.org/drawingml/2006/main" xmlns:r="http://schemas.openxmlformats.org/officeDocument/2006/relationships" xmlns:p="http://schemas.openxmlformats.org/presentationml/2006/main">
-  <p:cSld>
-    <p:spTree>
-      <p:nvGrpSpPr>
-        <p:cNvPr id="1" name="">
-          <a:extLst>
-            <a:ext uri="{FF2B5EF4-FFF2-40B4-BE49-F238E27FC236}">
-              <a16:creationId xmlns:a16="http://schemas.microsoft.com/office/drawing/2014/main" id="{A45C9AA8-D6D3-0F24-D824-7EDA36AF2861}"/>
-            </a:ext>
-          </a:extLst>
-        </p:cNvPr>
-        <p:cNvGrpSpPr/>
-        <p:nvPr/>
-      </p:nvGrpSpPr>
-      <p:grpSpPr>
-        <a:xfrm>
-          <a:off x="0" y="0"/>
-          <a:ext cx="0" cy="0"/>
-          <a:chOff x="0" y="0"/>
-          <a:chExt cx="0" cy="0"/>
-        </a:xfrm>
-      </p:grpSpPr>
-      <p:sp>
-        <p:nvSpPr>
-          <p:cNvPr id="2" name="Titel 1">
-            <a:extLst>
-              <a:ext uri="{FF2B5EF4-FFF2-40B4-BE49-F238E27FC236}">
-                <a16:creationId xmlns:a16="http://schemas.microsoft.com/office/drawing/2014/main" id="{13EAFF2C-B7EA-B20C-EBAE-D27CC4198C7B}"/>
-              </a:ext>
-            </a:extLst>
-          </p:cNvPr>
-          <p:cNvSpPr>
-            <a:spLocks noGrp="1"/>
-          </p:cNvSpPr>
-          <p:nvPr>
-            <p:ph type="title"/>
-          </p:nvPr>
-        </p:nvSpPr>
-        <p:spPr/>
-        <p:txBody>
-          <a:bodyPr/>
-          <a:lstStyle/>
-          <a:p>
-            <a:r>
-              <a:rPr lang="de-DE" dirty="0"/>
-              <a:t>Meilenstein1: Projektauftrag</a:t>
-            </a:r>
-          </a:p>
-        </p:txBody>
-      </p:sp>
-      <p:sp>
-        <p:nvSpPr>
-          <p:cNvPr id="3" name="Inhaltsplatzhalter 2">
-            <a:extLst>
-              <a:ext uri="{FF2B5EF4-FFF2-40B4-BE49-F238E27FC236}">
-                <a16:creationId xmlns:a16="http://schemas.microsoft.com/office/drawing/2014/main" id="{C2B04436-9192-84A0-7E5E-8463FEAC08F3}"/>
-              </a:ext>
-            </a:extLst>
-          </p:cNvPr>
-          <p:cNvSpPr>
-            <a:spLocks noGrp="1"/>
-          </p:cNvSpPr>
-          <p:nvPr>
-            <p:ph idx="1"/>
-          </p:nvPr>
-        </p:nvSpPr>
-        <p:spPr>
-          <a:xfrm>
-            <a:off x="521208" y="2054103"/>
-            <a:ext cx="11155680" cy="3767328"/>
-          </a:xfrm>
-        </p:spPr>
-        <p:txBody>
-          <a:bodyPr>
-            <a:normAutofit/>
-          </a:bodyPr>
-          <a:lstStyle/>
-          <a:p>
-            <a:r>
-              <a:rPr lang="de-DE" b="1" dirty="0"/>
-              <a:t>Ziel des Projekts: Reduktion betriebswirtschaftlicher Schäden</a:t>
-            </a:r>
-          </a:p>
-          <a:p>
-            <a:pPr lvl="1"/>
-            <a:r>
-              <a:rPr lang="de-DE" b="1" dirty="0"/>
-              <a:t>Modell</a:t>
-            </a:r>
-            <a:r>
-              <a:rPr lang="de-DE" dirty="0"/>
-              <a:t> zur Erkennung </a:t>
-            </a:r>
-            <a:r>
-              <a:rPr lang="de-DE" b="1" dirty="0"/>
-              <a:t>auffälliger Muster/fehlerhafter Abläufe </a:t>
-            </a:r>
-            <a:endParaRPr lang="de-DE" dirty="0"/>
-          </a:p>
-          <a:p>
-            <a:pPr lvl="1"/>
-            <a:r>
-              <a:rPr lang="de-DE" dirty="0"/>
-              <a:t>Algorithmus zur </a:t>
-            </a:r>
-            <a:r>
-              <a:rPr lang="de-DE" b="1" dirty="0"/>
-              <a:t>Kennzeichnung verdächtiger Transaktionen</a:t>
-            </a:r>
-          </a:p>
-          <a:p>
-            <a:pPr lvl="1"/>
-            <a:r>
-              <a:rPr lang="de-DE" b="1" dirty="0"/>
-              <a:t>Konkreten Handlungsempfehlungen</a:t>
-            </a:r>
-          </a:p>
-          <a:p>
-            <a:pPr lvl="1"/>
-            <a:endParaRPr lang="de-DE" b="1" dirty="0"/>
-          </a:p>
-          <a:p>
-            <a:r>
-              <a:rPr lang="de-DE" b="1" dirty="0"/>
-              <a:t>Nebenbedingungen</a:t>
-            </a:r>
-            <a:r>
-              <a:rPr lang="de-DE" dirty="0"/>
-              <a:t>:</a:t>
-            </a:r>
-            <a:endParaRPr lang="de-DE" b="1" dirty="0"/>
-          </a:p>
-          <a:p>
-            <a:pPr lvl="1"/>
-            <a:r>
-              <a:rPr lang="de-DE" b="1" dirty="0"/>
-              <a:t>Technische Machbarkeit</a:t>
-            </a:r>
-          </a:p>
-          <a:p>
-            <a:pPr lvl="1"/>
-            <a:r>
-              <a:rPr lang="de-DE" b="1" dirty="0"/>
-              <a:t>Echtzeitbetrieb &amp; Skalierbarkeit</a:t>
-            </a:r>
-            <a:endParaRPr lang="de-DE" dirty="0"/>
-          </a:p>
-          <a:p>
-            <a:pPr lvl="1"/>
-            <a:r>
-              <a:rPr lang="de-DE" b="1" dirty="0"/>
-              <a:t>Betriebswirtschaftliche Sinnhaftigkeit </a:t>
-            </a:r>
-            <a:r>
-              <a:rPr lang="de-DE" dirty="0"/>
-              <a:t>der Lösung</a:t>
-            </a:r>
-          </a:p>
-          <a:p>
-            <a:pPr lvl="1"/>
-            <a:r>
-              <a:rPr lang="de-DE" b="1" dirty="0"/>
-              <a:t>Bewertungsfunktion</a:t>
-            </a:r>
-            <a:r>
-              <a:rPr lang="de-DE" dirty="0"/>
-              <a:t> zur wirtschaftlichen Bewertung von Kontrollentscheidungen</a:t>
-            </a:r>
-            <a:endParaRPr lang="de-DE" b="1" dirty="0"/>
-          </a:p>
-          <a:p>
-            <a:pPr lvl="1"/>
-            <a:endParaRPr lang="de-DE" b="1" dirty="0"/>
-          </a:p>
-          <a:p>
-            <a:pPr lvl="1"/>
-            <a:endParaRPr lang="de-DE" dirty="0"/>
-          </a:p>
-        </p:txBody>
-      </p:sp>
-    </p:spTree>
-    <p:extLst>
-      <p:ext uri="{BB962C8B-B14F-4D97-AF65-F5344CB8AC3E}">
-        <p14:creationId xmlns:p14="http://schemas.microsoft.com/office/powerpoint/2010/main" val="4126987183"/>
-      </p:ext>
-    </p:extLst>
-  </p:cSld>
-  <p:clrMapOvr>
-    <a:masterClrMapping/>
-  </p:clrMapOvr>
-</p:sld>
-</file>
-
-<file path=ppt/slides/slide40.xml><?xml version="1.0" encoding="utf-8"?>
+<file path=ppt/slides/slide39.xml><?xml version="1.0" encoding="utf-8"?>
 <p:sld xmlns:a="http://schemas.openxmlformats.org/drawingml/2006/main" xmlns:r="http://schemas.openxmlformats.org/officeDocument/2006/relationships" xmlns:p="http://schemas.openxmlformats.org/presentationml/2006/main" showMasterPhAnim="0">
   <p:cSld>
     <p:spTree>
@@ -22573,7 +22272,201 @@
 </p:sld>
 </file>
 
-<file path=ppt/slides/slide41.xml><?xml version="1.0" encoding="utf-8"?>
+<file path=ppt/slides/slide4.xml><?xml version="1.0" encoding="utf-8"?>
+<p:sld xmlns:a="http://schemas.openxmlformats.org/drawingml/2006/main" xmlns:r="http://schemas.openxmlformats.org/officeDocument/2006/relationships" xmlns:p="http://schemas.openxmlformats.org/presentationml/2006/main">
+  <p:cSld>
+    <p:spTree>
+      <p:nvGrpSpPr>
+        <p:cNvPr id="1" name="">
+          <a:extLst>
+            <a:ext uri="{FF2B5EF4-FFF2-40B4-BE49-F238E27FC236}">
+              <a16:creationId xmlns:a16="http://schemas.microsoft.com/office/drawing/2014/main" id="{A45C9AA8-D6D3-0F24-D824-7EDA36AF2861}"/>
+            </a:ext>
+          </a:extLst>
+        </p:cNvPr>
+        <p:cNvGrpSpPr/>
+        <p:nvPr/>
+      </p:nvGrpSpPr>
+      <p:grpSpPr>
+        <a:xfrm>
+          <a:off x="0" y="0"/>
+          <a:ext cx="0" cy="0"/>
+          <a:chOff x="0" y="0"/>
+          <a:chExt cx="0" cy="0"/>
+        </a:xfrm>
+      </p:grpSpPr>
+      <p:sp>
+        <p:nvSpPr>
+          <p:cNvPr id="2" name="Titel 1">
+            <a:extLst>
+              <a:ext uri="{FF2B5EF4-FFF2-40B4-BE49-F238E27FC236}">
+                <a16:creationId xmlns:a16="http://schemas.microsoft.com/office/drawing/2014/main" id="{13EAFF2C-B7EA-B20C-EBAE-D27CC4198C7B}"/>
+              </a:ext>
+            </a:extLst>
+          </p:cNvPr>
+          <p:cNvSpPr>
+            <a:spLocks noGrp="1"/>
+          </p:cNvSpPr>
+          <p:nvPr>
+            <p:ph type="title"/>
+          </p:nvPr>
+        </p:nvSpPr>
+        <p:spPr/>
+        <p:txBody>
+          <a:bodyPr/>
+          <a:lstStyle/>
+          <a:p>
+            <a:r>
+              <a:rPr lang="de-DE" dirty="0"/>
+              <a:t>Meilenstein1: Projektauftrag</a:t>
+            </a:r>
+          </a:p>
+        </p:txBody>
+      </p:sp>
+      <p:sp>
+        <p:nvSpPr>
+          <p:cNvPr id="3" name="Inhaltsplatzhalter 2">
+            <a:extLst>
+              <a:ext uri="{FF2B5EF4-FFF2-40B4-BE49-F238E27FC236}">
+                <a16:creationId xmlns:a16="http://schemas.microsoft.com/office/drawing/2014/main" id="{C2B04436-9192-84A0-7E5E-8463FEAC08F3}"/>
+              </a:ext>
+            </a:extLst>
+          </p:cNvPr>
+          <p:cNvSpPr>
+            <a:spLocks noGrp="1"/>
+          </p:cNvSpPr>
+          <p:nvPr>
+            <p:ph idx="1"/>
+          </p:nvPr>
+        </p:nvSpPr>
+        <p:spPr>
+          <a:xfrm>
+            <a:off x="521208" y="2054103"/>
+            <a:ext cx="11155680" cy="3767328"/>
+          </a:xfrm>
+        </p:spPr>
+        <p:txBody>
+          <a:bodyPr>
+            <a:normAutofit/>
+          </a:bodyPr>
+          <a:lstStyle/>
+          <a:p>
+            <a:r>
+              <a:rPr lang="de-DE" b="1" dirty="0"/>
+              <a:t>Ziel des Projekts: Reduktion betriebswirtschaftlicher Schäden</a:t>
+            </a:r>
+          </a:p>
+          <a:p>
+            <a:pPr lvl="1"/>
+            <a:r>
+              <a:rPr lang="de-DE" b="1" dirty="0"/>
+              <a:t>Modell</a:t>
+            </a:r>
+            <a:r>
+              <a:rPr lang="de-DE" dirty="0"/>
+              <a:t> zur Erkennung </a:t>
+            </a:r>
+            <a:r>
+              <a:rPr lang="de-DE" b="1" dirty="0"/>
+              <a:t>auffälliger Muster/fehlerhafter Abläufe </a:t>
+            </a:r>
+            <a:endParaRPr lang="de-DE" dirty="0"/>
+          </a:p>
+          <a:p>
+            <a:pPr lvl="1"/>
+            <a:r>
+              <a:rPr lang="de-DE" dirty="0"/>
+              <a:t>Algorithmus zur </a:t>
+            </a:r>
+            <a:r>
+              <a:rPr lang="de-DE" b="1" dirty="0"/>
+              <a:t>Kennzeichnung verdächtiger Transaktionen</a:t>
+            </a:r>
+          </a:p>
+          <a:p>
+            <a:pPr lvl="1"/>
+            <a:r>
+              <a:rPr lang="de-DE" b="1" dirty="0"/>
+              <a:t>Konkreten Handlungsempfehlungen</a:t>
+            </a:r>
+          </a:p>
+          <a:p>
+            <a:pPr lvl="1"/>
+            <a:endParaRPr lang="de-DE" b="1" dirty="0"/>
+          </a:p>
+          <a:p>
+            <a:r>
+              <a:rPr lang="de-DE" b="1" dirty="0"/>
+              <a:t>Nebenbedingungen</a:t>
+            </a:r>
+            <a:r>
+              <a:rPr lang="de-DE" dirty="0"/>
+              <a:t>:</a:t>
+            </a:r>
+            <a:endParaRPr lang="de-DE" b="1" dirty="0"/>
+          </a:p>
+          <a:p>
+            <a:pPr lvl="1"/>
+            <a:r>
+              <a:rPr lang="de-DE" b="1" dirty="0"/>
+              <a:t>Technische Machbarkeit</a:t>
+            </a:r>
+          </a:p>
+          <a:p>
+            <a:pPr lvl="1"/>
+            <a:r>
+              <a:rPr lang="de-DE" b="1" dirty="0"/>
+              <a:t>Echtzeitbetrieb &amp; Skalierbarkeit</a:t>
+            </a:r>
+            <a:endParaRPr lang="de-DE" dirty="0"/>
+          </a:p>
+          <a:p>
+            <a:pPr lvl="1"/>
+            <a:r>
+              <a:rPr lang="de-DE" b="1" dirty="0"/>
+              <a:t>Betriebswirtschaftliche Sinnhaftigkeit </a:t>
+            </a:r>
+            <a:r>
+              <a:rPr lang="de-DE" dirty="0"/>
+              <a:t>der Lösung</a:t>
+            </a:r>
+          </a:p>
+          <a:p>
+            <a:pPr lvl="1"/>
+            <a:r>
+              <a:rPr lang="de-DE" b="1" dirty="0"/>
+              <a:t>Bewertungsfunktion</a:t>
+            </a:r>
+            <a:r>
+              <a:rPr lang="de-DE" dirty="0"/>
+              <a:t> zur wirtschaftlichen Bewertung von Kontrollentscheidungen</a:t>
+            </a:r>
+            <a:endParaRPr lang="de-DE" b="1" dirty="0"/>
+          </a:p>
+          <a:p>
+            <a:pPr lvl="1"/>
+            <a:endParaRPr lang="de-DE" b="1" dirty="0"/>
+          </a:p>
+          <a:p>
+            <a:pPr lvl="1"/>
+            <a:endParaRPr lang="de-DE" dirty="0"/>
+          </a:p>
+        </p:txBody>
+      </p:sp>
+    </p:spTree>
+    <p:extLst>
+      <p:ext uri="{BB962C8B-B14F-4D97-AF65-F5344CB8AC3E}">
+        <p14:creationId xmlns:p14="http://schemas.microsoft.com/office/powerpoint/2010/main" val="4126987183"/>
+      </p:ext>
+    </p:extLst>
+  </p:cSld>
+  <p:clrMapOvr>
+    <a:masterClrMapping/>
+  </p:clrMapOvr>
+</p:sld>
+</file>
+
+<file path=ppt/slides/slide40.xml><?xml version="1.0" encoding="utf-8"?>
 <p:sld xmlns:a="http://schemas.openxmlformats.org/drawingml/2006/main" xmlns:r="http://schemas.openxmlformats.org/officeDocument/2006/relationships" xmlns:p="http://schemas.openxmlformats.org/presentationml/2006/main" showMasterPhAnim="0">
   <p:cSld>
     <p:spTree>
@@ -23043,7 +22936,7 @@
 </p:sld>
 </file>
 
-<file path=ppt/slides/slide42.xml><?xml version="1.0" encoding="utf-8"?>
+<file path=ppt/slides/slide41.xml><?xml version="1.0" encoding="utf-8"?>
 <p:sld xmlns:a="http://schemas.openxmlformats.org/drawingml/2006/main" xmlns:r="http://schemas.openxmlformats.org/officeDocument/2006/relationships" xmlns:p="http://schemas.openxmlformats.org/presentationml/2006/main" showMasterPhAnim="0">
   <p:cSld>
     <p:spTree>
@@ -23426,7 +23319,7 @@
 </p:sld>
 </file>
 
-<file path=ppt/slides/slide43.xml><?xml version="1.0" encoding="utf-8"?>
+<file path=ppt/slides/slide42.xml><?xml version="1.0" encoding="utf-8"?>
 <p:sld xmlns:a="http://schemas.openxmlformats.org/drawingml/2006/main" xmlns:r="http://schemas.openxmlformats.org/officeDocument/2006/relationships" xmlns:p="http://schemas.openxmlformats.org/presentationml/2006/main" showMasterPhAnim="0">
   <p:cSld>
     <p:spTree>
@@ -23973,7 +23866,7 @@
 </p:sld>
 </file>
 
-<file path=ppt/slides/slide44.xml><?xml version="1.0" encoding="utf-8"?>
+<file path=ppt/slides/slide43.xml><?xml version="1.0" encoding="utf-8"?>
 <p:sld xmlns:a="http://schemas.openxmlformats.org/drawingml/2006/main" xmlns:r="http://schemas.openxmlformats.org/officeDocument/2006/relationships" xmlns:p="http://schemas.openxmlformats.org/presentationml/2006/main">
   <p:cSld>
     <p:spTree>
@@ -24170,7 +24063,7 @@
 </p:sld>
 </file>
 
-<file path=ppt/slides/slide45.xml><?xml version="1.0" encoding="utf-8"?>
+<file path=ppt/slides/slide44.xml><?xml version="1.0" encoding="utf-8"?>
 <p:sld xmlns:a="http://schemas.openxmlformats.org/drawingml/2006/main" xmlns:r="http://schemas.openxmlformats.org/officeDocument/2006/relationships" xmlns:p="http://schemas.openxmlformats.org/presentationml/2006/main">
   <p:cSld>
     <p:spTree>
@@ -24390,7 +24283,7 @@
 </p:sld>
 </file>
 
-<file path=ppt/slides/slide46.xml><?xml version="1.0" encoding="utf-8"?>
+<file path=ppt/slides/slide45.xml><?xml version="1.0" encoding="utf-8"?>
 <p:sld xmlns:a="http://schemas.openxmlformats.org/drawingml/2006/main" xmlns:r="http://schemas.openxmlformats.org/officeDocument/2006/relationships" xmlns:p="http://schemas.openxmlformats.org/presentationml/2006/main">
   <p:cSld>
     <p:bg>
@@ -24793,7 +24686,7 @@
 </p:sld>
 </file>
 
-<file path=ppt/slides/slide47.xml><?xml version="1.0" encoding="utf-8"?>
+<file path=ppt/slides/slide46.xml><?xml version="1.0" encoding="utf-8"?>
 <p:sld xmlns:a="http://schemas.openxmlformats.org/drawingml/2006/main" xmlns:r="http://schemas.openxmlformats.org/officeDocument/2006/relationships" xmlns:p="http://schemas.openxmlformats.org/presentationml/2006/main">
   <p:cSld>
     <p:spTree>
@@ -25019,7 +24912,7 @@
 </p:sld>
 </file>
 
-<file path=ppt/slides/slide48.xml><?xml version="1.0" encoding="utf-8"?>
+<file path=ppt/slides/slide47.xml><?xml version="1.0" encoding="utf-8"?>
 <p:sld xmlns:a="http://schemas.openxmlformats.org/drawingml/2006/main" xmlns:r="http://schemas.openxmlformats.org/officeDocument/2006/relationships" xmlns:p="http://schemas.openxmlformats.org/presentationml/2006/main">
   <p:cSld>
     <p:spTree>
@@ -25192,7 +25085,7 @@
 </p:sld>
 </file>
 
-<file path=ppt/slides/slide49.xml><?xml version="1.0" encoding="utf-8"?>
+<file path=ppt/slides/slide48.xml><?xml version="1.0" encoding="utf-8"?>
 <p:sld xmlns:a="http://schemas.openxmlformats.org/drawingml/2006/main" xmlns:r="http://schemas.openxmlformats.org/officeDocument/2006/relationships" xmlns:p="http://schemas.openxmlformats.org/presentationml/2006/main">
   <p:cSld>
     <p:spTree>
@@ -25353,6 +25246,145 @@
     <p:extLst>
       <p:ext uri="{BB962C8B-B14F-4D97-AF65-F5344CB8AC3E}">
         <p14:creationId xmlns:p14="http://schemas.microsoft.com/office/powerpoint/2010/main" val="1901667240"/>
+      </p:ext>
+    </p:extLst>
+  </p:cSld>
+  <p:clrMapOvr>
+    <a:masterClrMapping/>
+  </p:clrMapOvr>
+</p:sld>
+</file>
+
+<file path=ppt/slides/slide49.xml><?xml version="1.0" encoding="utf-8"?>
+<p:sld xmlns:a="http://schemas.openxmlformats.org/drawingml/2006/main" xmlns:r="http://schemas.openxmlformats.org/officeDocument/2006/relationships" xmlns:p="http://schemas.openxmlformats.org/presentationml/2006/main">
+  <p:cSld>
+    <p:spTree>
+      <p:nvGrpSpPr>
+        <p:cNvPr id="1" name="">
+          <a:extLst>
+            <a:ext uri="{FF2B5EF4-FFF2-40B4-BE49-F238E27FC236}">
+              <a16:creationId xmlns:a16="http://schemas.microsoft.com/office/drawing/2014/main" id="{590D3595-CBCE-FDBD-4C2E-A73997F272D8}"/>
+            </a:ext>
+          </a:extLst>
+        </p:cNvPr>
+        <p:cNvGrpSpPr/>
+        <p:nvPr/>
+      </p:nvGrpSpPr>
+      <p:grpSpPr>
+        <a:xfrm>
+          <a:off x="0" y="0"/>
+          <a:ext cx="0" cy="0"/>
+          <a:chOff x="0" y="0"/>
+          <a:chExt cx="0" cy="0"/>
+        </a:xfrm>
+      </p:grpSpPr>
+      <p:sp>
+        <p:nvSpPr>
+          <p:cNvPr id="2" name="Title 1">
+            <a:extLst>
+              <a:ext uri="{FF2B5EF4-FFF2-40B4-BE49-F238E27FC236}">
+                <a16:creationId xmlns:a16="http://schemas.microsoft.com/office/drawing/2014/main" id="{88878CCE-922B-7070-D2C8-65B631686703}"/>
+              </a:ext>
+            </a:extLst>
+          </p:cNvPr>
+          <p:cNvSpPr>
+            <a:spLocks noGrp="1"/>
+          </p:cNvSpPr>
+          <p:nvPr>
+            <p:ph type="title"/>
+          </p:nvPr>
+        </p:nvSpPr>
+        <p:spPr/>
+        <p:txBody>
+          <a:bodyPr/>
+          <a:lstStyle/>
+          <a:p>
+            <a:r>
+              <a:rPr lang="de-DE" dirty="0"/>
+              <a:t>Stufe 1: Statische Regeln zur Vorfilterung</a:t>
+            </a:r>
+          </a:p>
+        </p:txBody>
+      </p:sp>
+      <p:sp>
+        <p:nvSpPr>
+          <p:cNvPr id="3" name="Content Placeholder 2">
+            <a:extLst>
+              <a:ext uri="{FF2B5EF4-FFF2-40B4-BE49-F238E27FC236}">
+                <a16:creationId xmlns:a16="http://schemas.microsoft.com/office/drawing/2014/main" id="{F8A14773-5DD0-4524-B1F5-DAA6ED939A26}"/>
+              </a:ext>
+            </a:extLst>
+          </p:cNvPr>
+          <p:cNvSpPr>
+            <a:spLocks noGrp="1"/>
+          </p:cNvSpPr>
+          <p:nvPr>
+            <p:ph idx="1"/>
+          </p:nvPr>
+        </p:nvSpPr>
+        <p:spPr>
+          <a:xfrm>
+            <a:off x="521208" y="2140527"/>
+            <a:ext cx="11155680" cy="4222082"/>
+          </a:xfrm>
+        </p:spPr>
+        <p:txBody>
+          <a:bodyPr>
+            <a:normAutofit/>
+          </a:bodyPr>
+          <a:lstStyle/>
+          <a:p>
+            <a:pPr marL="0" indent="0">
+              <a:buNone/>
+            </a:pPr>
+            <a:endParaRPr lang="de-DE" b="1" dirty="0"/>
+          </a:p>
+          <a:p>
+            <a:r>
+              <a:rPr lang="de-DE" dirty="0"/>
+              <a:t>Ziel: einfache, </a:t>
+            </a:r>
+            <a:r>
+              <a:rPr lang="de-DE" b="1" dirty="0"/>
+              <a:t>interpretierbare Regeln mit hoher Präzision bei minimaler Komplexität</a:t>
+            </a:r>
+          </a:p>
+          <a:p>
+            <a:endParaRPr lang="de-DE" dirty="0"/>
+          </a:p>
+          <a:p>
+            <a:r>
+              <a:rPr lang="de-DE" b="1" dirty="0"/>
+              <a:t>Methodik:</a:t>
+            </a:r>
+          </a:p>
+          <a:p>
+            <a:pPr lvl="1"/>
+            <a:r>
+              <a:rPr lang="de-DE" dirty="0"/>
+              <a:t>Daten kategorial / binär kodiert</a:t>
+            </a:r>
+          </a:p>
+          <a:p>
+            <a:pPr lvl="1"/>
+            <a:r>
+              <a:rPr lang="de-DE" dirty="0"/>
+              <a:t>Analyse von Regeln mit ein bis zwei Merkmalen, um Überanpassung zu vermeiden und Interpretierbarkeit zu gewährleisten</a:t>
+            </a:r>
+          </a:p>
+          <a:p>
+            <a:pPr lvl="1"/>
+            <a:r>
+              <a:rPr lang="de-DE" dirty="0"/>
+              <a:t>Bewertung: Güte der Vorhersage höher als bei dem anschließenden Klassifikationsmodell</a:t>
+            </a:r>
+          </a:p>
+        </p:txBody>
+      </p:sp>
+    </p:spTree>
+    <p:extLst>
+      <p:ext uri="{BB962C8B-B14F-4D97-AF65-F5344CB8AC3E}">
+        <p14:creationId xmlns:p14="http://schemas.microsoft.com/office/powerpoint/2010/main" val="1947142025"/>
       </p:ext>
     </p:extLst>
   </p:cSld>
@@ -25535,145 +25567,6 @@
 </file>
 
 <file path=ppt/slides/slide50.xml><?xml version="1.0" encoding="utf-8"?>
-<p:sld xmlns:a="http://schemas.openxmlformats.org/drawingml/2006/main" xmlns:r="http://schemas.openxmlformats.org/officeDocument/2006/relationships" xmlns:p="http://schemas.openxmlformats.org/presentationml/2006/main">
-  <p:cSld>
-    <p:spTree>
-      <p:nvGrpSpPr>
-        <p:cNvPr id="1" name="">
-          <a:extLst>
-            <a:ext uri="{FF2B5EF4-FFF2-40B4-BE49-F238E27FC236}">
-              <a16:creationId xmlns:a16="http://schemas.microsoft.com/office/drawing/2014/main" id="{590D3595-CBCE-FDBD-4C2E-A73997F272D8}"/>
-            </a:ext>
-          </a:extLst>
-        </p:cNvPr>
-        <p:cNvGrpSpPr/>
-        <p:nvPr/>
-      </p:nvGrpSpPr>
-      <p:grpSpPr>
-        <a:xfrm>
-          <a:off x="0" y="0"/>
-          <a:ext cx="0" cy="0"/>
-          <a:chOff x="0" y="0"/>
-          <a:chExt cx="0" cy="0"/>
-        </a:xfrm>
-      </p:grpSpPr>
-      <p:sp>
-        <p:nvSpPr>
-          <p:cNvPr id="2" name="Title 1">
-            <a:extLst>
-              <a:ext uri="{FF2B5EF4-FFF2-40B4-BE49-F238E27FC236}">
-                <a16:creationId xmlns:a16="http://schemas.microsoft.com/office/drawing/2014/main" id="{88878CCE-922B-7070-D2C8-65B631686703}"/>
-              </a:ext>
-            </a:extLst>
-          </p:cNvPr>
-          <p:cNvSpPr>
-            <a:spLocks noGrp="1"/>
-          </p:cNvSpPr>
-          <p:nvPr>
-            <p:ph type="title"/>
-          </p:nvPr>
-        </p:nvSpPr>
-        <p:spPr/>
-        <p:txBody>
-          <a:bodyPr/>
-          <a:lstStyle/>
-          <a:p>
-            <a:r>
-              <a:rPr lang="de-DE" dirty="0"/>
-              <a:t>Stufe 1: Statische Regeln zur Vorfilterung</a:t>
-            </a:r>
-          </a:p>
-        </p:txBody>
-      </p:sp>
-      <p:sp>
-        <p:nvSpPr>
-          <p:cNvPr id="3" name="Content Placeholder 2">
-            <a:extLst>
-              <a:ext uri="{FF2B5EF4-FFF2-40B4-BE49-F238E27FC236}">
-                <a16:creationId xmlns:a16="http://schemas.microsoft.com/office/drawing/2014/main" id="{F8A14773-5DD0-4524-B1F5-DAA6ED939A26}"/>
-              </a:ext>
-            </a:extLst>
-          </p:cNvPr>
-          <p:cNvSpPr>
-            <a:spLocks noGrp="1"/>
-          </p:cNvSpPr>
-          <p:nvPr>
-            <p:ph idx="1"/>
-          </p:nvPr>
-        </p:nvSpPr>
-        <p:spPr>
-          <a:xfrm>
-            <a:off x="521208" y="2140527"/>
-            <a:ext cx="11155680" cy="4222082"/>
-          </a:xfrm>
-        </p:spPr>
-        <p:txBody>
-          <a:bodyPr>
-            <a:normAutofit/>
-          </a:bodyPr>
-          <a:lstStyle/>
-          <a:p>
-            <a:pPr marL="0" indent="0">
-              <a:buNone/>
-            </a:pPr>
-            <a:endParaRPr lang="de-DE" b="1" dirty="0"/>
-          </a:p>
-          <a:p>
-            <a:r>
-              <a:rPr lang="de-DE" dirty="0"/>
-              <a:t>Ziel: einfache, </a:t>
-            </a:r>
-            <a:r>
-              <a:rPr lang="de-DE" b="1" dirty="0"/>
-              <a:t>interpretierbare Regeln mit hoher Präzision bei minimaler Komplexität</a:t>
-            </a:r>
-          </a:p>
-          <a:p>
-            <a:endParaRPr lang="de-DE" dirty="0"/>
-          </a:p>
-          <a:p>
-            <a:r>
-              <a:rPr lang="de-DE" b="1" dirty="0"/>
-              <a:t>Methodik:</a:t>
-            </a:r>
-          </a:p>
-          <a:p>
-            <a:pPr lvl="1"/>
-            <a:r>
-              <a:rPr lang="de-DE" dirty="0"/>
-              <a:t>Daten kategorial / binär kodiert</a:t>
-            </a:r>
-          </a:p>
-          <a:p>
-            <a:pPr lvl="1"/>
-            <a:r>
-              <a:rPr lang="de-DE" dirty="0"/>
-              <a:t>Analyse von Regeln mit ein bis zwei Merkmalen, um Überanpassung zu vermeiden und Interpretierbarkeit zu gewährleisten</a:t>
-            </a:r>
-          </a:p>
-          <a:p>
-            <a:pPr lvl="1"/>
-            <a:r>
-              <a:rPr lang="de-DE" dirty="0"/>
-              <a:t>Bewertung: Güte der Vorhersage höher als bei dem anschließenden Klassifikationsmodell</a:t>
-            </a:r>
-          </a:p>
-        </p:txBody>
-      </p:sp>
-    </p:spTree>
-    <p:extLst>
-      <p:ext uri="{BB962C8B-B14F-4D97-AF65-F5344CB8AC3E}">
-        <p14:creationId xmlns:p14="http://schemas.microsoft.com/office/powerpoint/2010/main" val="1947142025"/>
-      </p:ext>
-    </p:extLst>
-  </p:cSld>
-  <p:clrMapOvr>
-    <a:masterClrMapping/>
-  </p:clrMapOvr>
-</p:sld>
-</file>
-
-<file path=ppt/slides/slide51.xml><?xml version="1.0" encoding="utf-8"?>
 <p:sld xmlns:a="http://schemas.openxmlformats.org/drawingml/2006/main" xmlns:r="http://schemas.openxmlformats.org/officeDocument/2006/relationships" xmlns:p="http://schemas.openxmlformats.org/presentationml/2006/main">
   <p:cSld>
     <p:spTree>
@@ -25810,7 +25703,7 @@
 </p:sld>
 </file>
 
-<file path=ppt/slides/slide52.xml><?xml version="1.0" encoding="utf-8"?>
+<file path=ppt/slides/slide51.xml><?xml version="1.0" encoding="utf-8"?>
 <p:sld xmlns:a="http://schemas.openxmlformats.org/drawingml/2006/main" xmlns:r="http://schemas.openxmlformats.org/officeDocument/2006/relationships" xmlns:p="http://schemas.openxmlformats.org/presentationml/2006/main">
   <p:cSld>
     <p:spTree>
@@ -25985,7 +25878,7 @@
 </p:sld>
 </file>
 
-<file path=ppt/slides/slide53.xml><?xml version="1.0" encoding="utf-8"?>
+<file path=ppt/slides/slide52.xml><?xml version="1.0" encoding="utf-8"?>
 <p:sld xmlns:a="http://schemas.openxmlformats.org/drawingml/2006/main" xmlns:r="http://schemas.openxmlformats.org/officeDocument/2006/relationships" xmlns:p="http://schemas.openxmlformats.org/presentationml/2006/main">
   <p:cSld>
     <p:spTree>
@@ -26182,7 +26075,7 @@
 </p:sld>
 </file>
 
-<file path=ppt/slides/slide54.xml><?xml version="1.0" encoding="utf-8"?>
+<file path=ppt/slides/slide53.xml><?xml version="1.0" encoding="utf-8"?>
 <p:sld xmlns:a="http://schemas.openxmlformats.org/drawingml/2006/main" xmlns:r="http://schemas.openxmlformats.org/officeDocument/2006/relationships" xmlns:p="http://schemas.openxmlformats.org/presentationml/2006/main">
   <p:cSld>
     <p:spTree>
@@ -26369,7 +26262,7 @@
 </p:sld>
 </file>
 
-<file path=ppt/slides/slide55.xml><?xml version="1.0" encoding="utf-8"?>
+<file path=ppt/slides/slide54.xml><?xml version="1.0" encoding="utf-8"?>
 <p:sld xmlns:a="http://schemas.openxmlformats.org/drawingml/2006/main" xmlns:r="http://schemas.openxmlformats.org/officeDocument/2006/relationships" xmlns:p="http://schemas.openxmlformats.org/presentationml/2006/main" showMasterPhAnim="0">
   <p:cSld>
     <p:spTree>
@@ -26569,7 +26462,7 @@
 </p:sld>
 </file>
 
-<file path=ppt/slides/slide56.xml><?xml version="1.0" encoding="utf-8"?>
+<file path=ppt/slides/slide55.xml><?xml version="1.0" encoding="utf-8"?>
 <p:sld xmlns:a="http://schemas.openxmlformats.org/drawingml/2006/main" xmlns:r="http://schemas.openxmlformats.org/officeDocument/2006/relationships" xmlns:p="http://schemas.openxmlformats.org/presentationml/2006/main" showMasterPhAnim="0">
   <p:cSld>
     <p:spTree>
@@ -26837,7 +26730,7 @@
 </p:sld>
 </file>
 
-<file path=ppt/slides/slide57.xml><?xml version="1.0" encoding="utf-8"?>
+<file path=ppt/slides/slide56.xml><?xml version="1.0" encoding="utf-8"?>
 <p:sld xmlns:a="http://schemas.openxmlformats.org/drawingml/2006/main" xmlns:r="http://schemas.openxmlformats.org/officeDocument/2006/relationships" xmlns:p="http://schemas.openxmlformats.org/presentationml/2006/main" showMasterPhAnim="0">
   <p:cSld>
     <p:spTree>
@@ -27141,7 +27034,7 @@
 </p:sld>
 </file>
 
-<file path=ppt/slides/slide58.xml><?xml version="1.0" encoding="utf-8"?>
+<file path=ppt/slides/slide57.xml><?xml version="1.0" encoding="utf-8"?>
 <p:sld xmlns:a="http://schemas.openxmlformats.org/drawingml/2006/main" xmlns:r="http://schemas.openxmlformats.org/officeDocument/2006/relationships" xmlns:p="http://schemas.openxmlformats.org/presentationml/2006/main" showMasterPhAnim="0">
   <p:cSld>
     <p:spTree>
@@ -27442,7 +27335,7 @@
 </p:sld>
 </file>
 
-<file path=ppt/slides/slide59.xml><?xml version="1.0" encoding="utf-8"?>
+<file path=ppt/slides/slide58.xml><?xml version="1.0" encoding="utf-8"?>
 <p:sld xmlns:a="http://schemas.openxmlformats.org/drawingml/2006/main" xmlns:r="http://schemas.openxmlformats.org/officeDocument/2006/relationships" xmlns:p="http://schemas.openxmlformats.org/presentationml/2006/main" showMasterPhAnim="0">
   <p:cSld>
     <p:spTree>
@@ -27740,6 +27633,291 @@
 </p:sld>
 </file>
 
+<file path=ppt/slides/slide59.xml><?xml version="1.0" encoding="utf-8"?>
+<p:sld xmlns:a="http://schemas.openxmlformats.org/drawingml/2006/main" xmlns:r="http://schemas.openxmlformats.org/officeDocument/2006/relationships" xmlns:p="http://schemas.openxmlformats.org/presentationml/2006/main" showMasterPhAnim="0">
+  <p:cSld>
+    <p:spTree>
+      <p:nvGrpSpPr>
+        <p:cNvPr id="1" name="">
+          <a:extLst>
+            <a:ext uri="{FF2B5EF4-FFF2-40B4-BE49-F238E27FC236}">
+              <a16:creationId xmlns:a16="http://schemas.microsoft.com/office/drawing/2014/main" id="{C0C35550-AC60-B43F-8F4D-23F64BC83CB8}"/>
+            </a:ext>
+          </a:extLst>
+        </p:cNvPr>
+        <p:cNvGrpSpPr/>
+        <p:nvPr/>
+      </p:nvGrpSpPr>
+      <p:grpSpPr bwMode="auto">
+        <a:xfrm>
+          <a:off x="0" y="0"/>
+          <a:ext cx="0" cy="0"/>
+          <a:chOff x="0" y="0"/>
+          <a:chExt cx="0" cy="0"/>
+        </a:xfrm>
+      </p:grpSpPr>
+      <p:sp>
+        <p:nvSpPr>
+          <p:cNvPr id="1119884738" name="Title 1">
+            <a:extLst>
+              <a:ext uri="{FF2B5EF4-FFF2-40B4-BE49-F238E27FC236}">
+                <a16:creationId xmlns:a16="http://schemas.microsoft.com/office/drawing/2014/main" id="{A321F676-5C37-945E-4381-325236D9A646}"/>
+              </a:ext>
+            </a:extLst>
+          </p:cNvPr>
+          <p:cNvSpPr>
+            <a:spLocks noGrp="1"/>
+          </p:cNvSpPr>
+          <p:nvPr>
+            <p:ph type="title"/>
+          </p:nvPr>
+        </p:nvSpPr>
+        <p:spPr bwMode="auto"/>
+        <p:txBody>
+          <a:bodyPr/>
+          <a:lstStyle/>
+          <a:p>
+            <a:pPr>
+              <a:defRPr/>
+            </a:pPr>
+            <a:r>
+              <a:rPr lang="de-DE" dirty="0"/>
+              <a:t>Modellvergleich (3)</a:t>
+            </a:r>
+            <a:endParaRPr dirty="0"/>
+          </a:p>
+        </p:txBody>
+      </p:sp>
+      <p:sp>
+        <p:nvSpPr>
+          <p:cNvPr id="701458849" name="Content Placeholder 2">
+            <a:extLst>
+              <a:ext uri="{FF2B5EF4-FFF2-40B4-BE49-F238E27FC236}">
+                <a16:creationId xmlns:a16="http://schemas.microsoft.com/office/drawing/2014/main" id="{904FA809-3187-12C0-ECAF-888E7E7CFB90}"/>
+              </a:ext>
+            </a:extLst>
+          </p:cNvPr>
+          <p:cNvSpPr>
+            <a:spLocks noGrp="1"/>
+          </p:cNvSpPr>
+          <p:nvPr>
+            <p:ph idx="1"/>
+          </p:nvPr>
+        </p:nvSpPr>
+        <p:spPr bwMode="auto">
+          <a:xfrm>
+            <a:off x="518160" y="2161310"/>
+            <a:ext cx="11155680" cy="3927764"/>
+          </a:xfrm>
+        </p:spPr>
+        <p:txBody>
+          <a:bodyPr>
+            <a:normAutofit fontScale="85000" lnSpcReduction="10000"/>
+          </a:bodyPr>
+          <a:lstStyle/>
+          <a:p>
+            <a:pPr>
+              <a:defRPr/>
+            </a:pPr>
+            <a:r>
+              <a:rPr lang="de-DE" sz="1800" b="1" i="0" u="none" strike="noStrike" cap="none" spc="0" dirty="0" err="1">
+                <a:solidFill>
+                  <a:schemeClr val="tx1"/>
+                </a:solidFill>
+                <a:latin typeface="Bierstadt"/>
+                <a:cs typeface="Bierstadt"/>
+              </a:rPr>
+              <a:t>XGBoost</a:t>
+            </a:r>
+            <a:r>
+              <a:rPr lang="de-DE" sz="1800" b="1" i="0" u="none" strike="noStrike" cap="none" spc="0" dirty="0">
+                <a:solidFill>
+                  <a:schemeClr val="tx1"/>
+                </a:solidFill>
+                <a:latin typeface="Bierstadt"/>
+                <a:cs typeface="Bierstadt"/>
+              </a:rPr>
+              <a:t> mit besserem Recall, </a:t>
+            </a:r>
+            <a:r>
+              <a:rPr lang="de-DE" sz="1800" b="1" i="0" u="none" strike="noStrike" cap="none" spc="0" dirty="0" err="1">
+                <a:solidFill>
+                  <a:schemeClr val="tx1"/>
+                </a:solidFill>
+                <a:latin typeface="Bierstadt"/>
+                <a:cs typeface="Bierstadt"/>
+              </a:rPr>
+              <a:t>CatBoost</a:t>
+            </a:r>
+            <a:r>
+              <a:rPr lang="de-DE" sz="1800" b="1" i="0" u="none" strike="noStrike" cap="none" spc="0" dirty="0">
+                <a:solidFill>
+                  <a:schemeClr val="tx1"/>
+                </a:solidFill>
+                <a:latin typeface="Bierstadt"/>
+                <a:cs typeface="Bierstadt"/>
+              </a:rPr>
+              <a:t> mit höherer Präzision </a:t>
+            </a:r>
+            <a:r>
+              <a:rPr lang="de-DE" sz="1800" i="0" u="none" strike="noStrike" cap="none" spc="0" dirty="0">
+                <a:solidFill>
+                  <a:schemeClr val="tx1"/>
+                </a:solidFill>
+                <a:latin typeface="Bierstadt"/>
+                <a:cs typeface="Bierstadt"/>
+              </a:rPr>
+              <a:t>→ Trade-off zwischen Entdeckungsrate und Kontrollkosten</a:t>
+            </a:r>
+          </a:p>
+          <a:p>
+            <a:pPr>
+              <a:defRPr/>
+            </a:pPr>
+            <a:endParaRPr lang="de-DE" sz="1800" i="0" u="none" strike="noStrike" cap="none" spc="0" dirty="0">
+              <a:solidFill>
+                <a:schemeClr val="tx1"/>
+              </a:solidFill>
+              <a:latin typeface="Bierstadt"/>
+              <a:cs typeface="Bierstadt"/>
+            </a:endParaRPr>
+          </a:p>
+          <a:p>
+            <a:pPr>
+              <a:defRPr/>
+            </a:pPr>
+            <a:r>
+              <a:rPr lang="de-DE" sz="1800" i="0" u="none" strike="noStrike" cap="none" spc="0" dirty="0">
+                <a:solidFill>
+                  <a:schemeClr val="tx1"/>
+                </a:solidFill>
+                <a:latin typeface="Bierstadt"/>
+                <a:cs typeface="Bierstadt"/>
+              </a:rPr>
+              <a:t>Random Forest unterliegt dem Einzelbaum – trotz Theorievorteil</a:t>
+            </a:r>
+          </a:p>
+          <a:p>
+            <a:pPr lvl="1">
+              <a:defRPr/>
+            </a:pPr>
+            <a:r>
+              <a:rPr lang="de-DE" i="0" u="none" strike="noStrike" cap="none" spc="0" dirty="0">
+                <a:solidFill>
+                  <a:schemeClr val="tx1"/>
+                </a:solidFill>
+                <a:latin typeface="Bierstadt"/>
+                <a:cs typeface="Bierstadt"/>
+              </a:rPr>
+              <a:t>Ursache: fehlende Hyperparameter-Optimierung</a:t>
+            </a:r>
+          </a:p>
+          <a:p>
+            <a:pPr lvl="1">
+              <a:defRPr/>
+            </a:pPr>
+            <a:endParaRPr lang="de-DE" dirty="0"/>
+          </a:p>
+          <a:p>
+            <a:pPr>
+              <a:defRPr/>
+            </a:pPr>
+            <a:r>
+              <a:rPr lang="de-DE" dirty="0" err="1"/>
+              <a:t>CatBoost</a:t>
+            </a:r>
+            <a:r>
+              <a:rPr lang="de-DE" dirty="0"/>
+              <a:t> leicht besser, aber </a:t>
+            </a:r>
+            <a:r>
+              <a:rPr lang="de-DE" b="1" dirty="0"/>
+              <a:t>Entscheidung zugunsten </a:t>
+            </a:r>
+            <a:r>
+              <a:rPr lang="de-DE" b="1" dirty="0" err="1"/>
+              <a:t>XGBoost</a:t>
+            </a:r>
+            <a:r>
+              <a:rPr lang="de-DE" b="1" dirty="0"/>
+              <a:t> </a:t>
+            </a:r>
+            <a:r>
+              <a:rPr lang="de-DE" dirty="0"/>
+              <a:t>aus praktischen Gründen:</a:t>
+            </a:r>
+          </a:p>
+          <a:p>
+            <a:pPr lvl="1">
+              <a:defRPr/>
+            </a:pPr>
+            <a:r>
+              <a:rPr lang="de-DE" dirty="0"/>
+              <a:t>Starke Verbreitung</a:t>
+            </a:r>
+          </a:p>
+          <a:p>
+            <a:pPr lvl="1">
+              <a:defRPr/>
+            </a:pPr>
+            <a:r>
+              <a:rPr lang="de-DE" dirty="0"/>
+              <a:t>Gute Dokumentation</a:t>
+            </a:r>
+          </a:p>
+          <a:p>
+            <a:pPr lvl="1">
+              <a:defRPr/>
+            </a:pPr>
+            <a:r>
+              <a:rPr lang="de-DE" dirty="0"/>
+              <a:t>Effizientes Training</a:t>
+            </a:r>
+          </a:p>
+          <a:p>
+            <a:pPr lvl="1">
+              <a:defRPr/>
+            </a:pPr>
+            <a:r>
+              <a:rPr lang="de-DE" dirty="0"/>
+              <a:t>Besser wart- &amp; erweiterbar im operativen Einsatz</a:t>
+            </a:r>
+          </a:p>
+          <a:p>
+            <a:pPr>
+              <a:defRPr/>
+            </a:pPr>
+            <a:endParaRPr lang="de-DE" dirty="0"/>
+          </a:p>
+          <a:p>
+            <a:pPr>
+              <a:defRPr/>
+            </a:pPr>
+            <a:r>
+              <a:rPr lang="de-DE" b="1" dirty="0"/>
+              <a:t>Erfüllt alle Anforderungen</a:t>
+            </a:r>
+            <a:r>
+              <a:rPr lang="de-DE" dirty="0"/>
+              <a:t>: Verständlichkeit, Skalierbarkeit, Robustheit, Reproduzierbarkeit</a:t>
+            </a:r>
+            <a:endParaRPr dirty="0"/>
+          </a:p>
+        </p:txBody>
+      </p:sp>
+    </p:spTree>
+    <p:extLst>
+      <p:ext uri="{BB962C8B-B14F-4D97-AF65-F5344CB8AC3E}">
+        <p14:creationId xmlns:p14="http://schemas.microsoft.com/office/powerpoint/2010/main" val="3850368565"/>
+      </p:ext>
+    </p:extLst>
+  </p:cSld>
+  <p:clrMapOvr>
+    <a:masterClrMapping/>
+  </p:clrMapOvr>
+</p:sld>
+</file>
+
 <file path=ppt/slides/slide6.xml><?xml version="1.0" encoding="utf-8"?>
 <p:sld xmlns:a="http://schemas.openxmlformats.org/drawingml/2006/main" xmlns:r="http://schemas.openxmlformats.org/officeDocument/2006/relationships" xmlns:p="http://schemas.openxmlformats.org/presentationml/2006/main">
   <p:cSld>
@@ -27905,291 +28083,6 @@
 </file>
 
 <file path=ppt/slides/slide60.xml><?xml version="1.0" encoding="utf-8"?>
-<p:sld xmlns:a="http://schemas.openxmlformats.org/drawingml/2006/main" xmlns:r="http://schemas.openxmlformats.org/officeDocument/2006/relationships" xmlns:p="http://schemas.openxmlformats.org/presentationml/2006/main" showMasterPhAnim="0">
-  <p:cSld>
-    <p:spTree>
-      <p:nvGrpSpPr>
-        <p:cNvPr id="1" name="">
-          <a:extLst>
-            <a:ext uri="{FF2B5EF4-FFF2-40B4-BE49-F238E27FC236}">
-              <a16:creationId xmlns:a16="http://schemas.microsoft.com/office/drawing/2014/main" id="{C0C35550-AC60-B43F-8F4D-23F64BC83CB8}"/>
-            </a:ext>
-          </a:extLst>
-        </p:cNvPr>
-        <p:cNvGrpSpPr/>
-        <p:nvPr/>
-      </p:nvGrpSpPr>
-      <p:grpSpPr bwMode="auto">
-        <a:xfrm>
-          <a:off x="0" y="0"/>
-          <a:ext cx="0" cy="0"/>
-          <a:chOff x="0" y="0"/>
-          <a:chExt cx="0" cy="0"/>
-        </a:xfrm>
-      </p:grpSpPr>
-      <p:sp>
-        <p:nvSpPr>
-          <p:cNvPr id="1119884738" name="Title 1">
-            <a:extLst>
-              <a:ext uri="{FF2B5EF4-FFF2-40B4-BE49-F238E27FC236}">
-                <a16:creationId xmlns:a16="http://schemas.microsoft.com/office/drawing/2014/main" id="{A321F676-5C37-945E-4381-325236D9A646}"/>
-              </a:ext>
-            </a:extLst>
-          </p:cNvPr>
-          <p:cNvSpPr>
-            <a:spLocks noGrp="1"/>
-          </p:cNvSpPr>
-          <p:nvPr>
-            <p:ph type="title"/>
-          </p:nvPr>
-        </p:nvSpPr>
-        <p:spPr bwMode="auto"/>
-        <p:txBody>
-          <a:bodyPr/>
-          <a:lstStyle/>
-          <a:p>
-            <a:pPr>
-              <a:defRPr/>
-            </a:pPr>
-            <a:r>
-              <a:rPr lang="de-DE" dirty="0"/>
-              <a:t>Modellvergleich (3)</a:t>
-            </a:r>
-            <a:endParaRPr dirty="0"/>
-          </a:p>
-        </p:txBody>
-      </p:sp>
-      <p:sp>
-        <p:nvSpPr>
-          <p:cNvPr id="701458849" name="Content Placeholder 2">
-            <a:extLst>
-              <a:ext uri="{FF2B5EF4-FFF2-40B4-BE49-F238E27FC236}">
-                <a16:creationId xmlns:a16="http://schemas.microsoft.com/office/drawing/2014/main" id="{904FA809-3187-12C0-ECAF-888E7E7CFB90}"/>
-              </a:ext>
-            </a:extLst>
-          </p:cNvPr>
-          <p:cNvSpPr>
-            <a:spLocks noGrp="1"/>
-          </p:cNvSpPr>
-          <p:nvPr>
-            <p:ph idx="1"/>
-          </p:nvPr>
-        </p:nvSpPr>
-        <p:spPr bwMode="auto">
-          <a:xfrm>
-            <a:off x="518160" y="2161310"/>
-            <a:ext cx="11155680" cy="3927764"/>
-          </a:xfrm>
-        </p:spPr>
-        <p:txBody>
-          <a:bodyPr>
-            <a:normAutofit fontScale="85000" lnSpcReduction="10000"/>
-          </a:bodyPr>
-          <a:lstStyle/>
-          <a:p>
-            <a:pPr>
-              <a:defRPr/>
-            </a:pPr>
-            <a:r>
-              <a:rPr lang="de-DE" sz="1800" b="1" i="0" u="none" strike="noStrike" cap="none" spc="0" dirty="0" err="1">
-                <a:solidFill>
-                  <a:schemeClr val="tx1"/>
-                </a:solidFill>
-                <a:latin typeface="Bierstadt"/>
-                <a:cs typeface="Bierstadt"/>
-              </a:rPr>
-              <a:t>XGBoost</a:t>
-            </a:r>
-            <a:r>
-              <a:rPr lang="de-DE" sz="1800" b="1" i="0" u="none" strike="noStrike" cap="none" spc="0" dirty="0">
-                <a:solidFill>
-                  <a:schemeClr val="tx1"/>
-                </a:solidFill>
-                <a:latin typeface="Bierstadt"/>
-                <a:cs typeface="Bierstadt"/>
-              </a:rPr>
-              <a:t> mit besserem Recall, </a:t>
-            </a:r>
-            <a:r>
-              <a:rPr lang="de-DE" sz="1800" b="1" i="0" u="none" strike="noStrike" cap="none" spc="0" dirty="0" err="1">
-                <a:solidFill>
-                  <a:schemeClr val="tx1"/>
-                </a:solidFill>
-                <a:latin typeface="Bierstadt"/>
-                <a:cs typeface="Bierstadt"/>
-              </a:rPr>
-              <a:t>CatBoost</a:t>
-            </a:r>
-            <a:r>
-              <a:rPr lang="de-DE" sz="1800" b="1" i="0" u="none" strike="noStrike" cap="none" spc="0" dirty="0">
-                <a:solidFill>
-                  <a:schemeClr val="tx1"/>
-                </a:solidFill>
-                <a:latin typeface="Bierstadt"/>
-                <a:cs typeface="Bierstadt"/>
-              </a:rPr>
-              <a:t> mit höherer Präzision </a:t>
-            </a:r>
-            <a:r>
-              <a:rPr lang="de-DE" sz="1800" i="0" u="none" strike="noStrike" cap="none" spc="0" dirty="0">
-                <a:solidFill>
-                  <a:schemeClr val="tx1"/>
-                </a:solidFill>
-                <a:latin typeface="Bierstadt"/>
-                <a:cs typeface="Bierstadt"/>
-              </a:rPr>
-              <a:t>→ Trade-off zwischen Entdeckungsrate und Kontrollkosten</a:t>
-            </a:r>
-          </a:p>
-          <a:p>
-            <a:pPr>
-              <a:defRPr/>
-            </a:pPr>
-            <a:endParaRPr lang="de-DE" sz="1800" i="0" u="none" strike="noStrike" cap="none" spc="0" dirty="0">
-              <a:solidFill>
-                <a:schemeClr val="tx1"/>
-              </a:solidFill>
-              <a:latin typeface="Bierstadt"/>
-              <a:cs typeface="Bierstadt"/>
-            </a:endParaRPr>
-          </a:p>
-          <a:p>
-            <a:pPr>
-              <a:defRPr/>
-            </a:pPr>
-            <a:r>
-              <a:rPr lang="de-DE" sz="1800" i="0" u="none" strike="noStrike" cap="none" spc="0" dirty="0">
-                <a:solidFill>
-                  <a:schemeClr val="tx1"/>
-                </a:solidFill>
-                <a:latin typeface="Bierstadt"/>
-                <a:cs typeface="Bierstadt"/>
-              </a:rPr>
-              <a:t>Random Forest unterliegt dem Einzelbaum – trotz Theorievorteil</a:t>
-            </a:r>
-          </a:p>
-          <a:p>
-            <a:pPr lvl="1">
-              <a:defRPr/>
-            </a:pPr>
-            <a:r>
-              <a:rPr lang="de-DE" i="0" u="none" strike="noStrike" cap="none" spc="0" dirty="0">
-                <a:solidFill>
-                  <a:schemeClr val="tx1"/>
-                </a:solidFill>
-                <a:latin typeface="Bierstadt"/>
-                <a:cs typeface="Bierstadt"/>
-              </a:rPr>
-              <a:t>Ursache: fehlende Hyperparameter-Optimierung</a:t>
-            </a:r>
-          </a:p>
-          <a:p>
-            <a:pPr lvl="1">
-              <a:defRPr/>
-            </a:pPr>
-            <a:endParaRPr lang="de-DE" dirty="0"/>
-          </a:p>
-          <a:p>
-            <a:pPr>
-              <a:defRPr/>
-            </a:pPr>
-            <a:r>
-              <a:rPr lang="de-DE" dirty="0" err="1"/>
-              <a:t>CatBoost</a:t>
-            </a:r>
-            <a:r>
-              <a:rPr lang="de-DE" dirty="0"/>
-              <a:t> leicht besser, aber </a:t>
-            </a:r>
-            <a:r>
-              <a:rPr lang="de-DE" b="1" dirty="0"/>
-              <a:t>Entscheidung zugunsten </a:t>
-            </a:r>
-            <a:r>
-              <a:rPr lang="de-DE" b="1" dirty="0" err="1"/>
-              <a:t>XGBoost</a:t>
-            </a:r>
-            <a:r>
-              <a:rPr lang="de-DE" b="1" dirty="0"/>
-              <a:t> </a:t>
-            </a:r>
-            <a:r>
-              <a:rPr lang="de-DE" dirty="0"/>
-              <a:t>aus praktischen Gründen:</a:t>
-            </a:r>
-          </a:p>
-          <a:p>
-            <a:pPr lvl="1">
-              <a:defRPr/>
-            </a:pPr>
-            <a:r>
-              <a:rPr lang="de-DE" dirty="0"/>
-              <a:t>Starke Verbreitung</a:t>
-            </a:r>
-          </a:p>
-          <a:p>
-            <a:pPr lvl="1">
-              <a:defRPr/>
-            </a:pPr>
-            <a:r>
-              <a:rPr lang="de-DE" dirty="0"/>
-              <a:t>Gute Dokumentation</a:t>
-            </a:r>
-          </a:p>
-          <a:p>
-            <a:pPr lvl="1">
-              <a:defRPr/>
-            </a:pPr>
-            <a:r>
-              <a:rPr lang="de-DE" dirty="0"/>
-              <a:t>Effizientes Training</a:t>
-            </a:r>
-          </a:p>
-          <a:p>
-            <a:pPr lvl="1">
-              <a:defRPr/>
-            </a:pPr>
-            <a:r>
-              <a:rPr lang="de-DE" dirty="0"/>
-              <a:t>Besser wart- &amp; erweiterbar im operativen Einsatz</a:t>
-            </a:r>
-          </a:p>
-          <a:p>
-            <a:pPr>
-              <a:defRPr/>
-            </a:pPr>
-            <a:endParaRPr lang="de-DE" dirty="0"/>
-          </a:p>
-          <a:p>
-            <a:pPr>
-              <a:defRPr/>
-            </a:pPr>
-            <a:r>
-              <a:rPr lang="de-DE" b="1" dirty="0"/>
-              <a:t>Erfüllt alle Anforderungen</a:t>
-            </a:r>
-            <a:r>
-              <a:rPr lang="de-DE" dirty="0"/>
-              <a:t>: Verständlichkeit, Skalierbarkeit, Robustheit, Reproduzierbarkeit</a:t>
-            </a:r>
-            <a:endParaRPr dirty="0"/>
-          </a:p>
-        </p:txBody>
-      </p:sp>
-    </p:spTree>
-    <p:extLst>
-      <p:ext uri="{BB962C8B-B14F-4D97-AF65-F5344CB8AC3E}">
-        <p14:creationId xmlns:p14="http://schemas.microsoft.com/office/powerpoint/2010/main" val="3850368565"/>
-      </p:ext>
-    </p:extLst>
-  </p:cSld>
-  <p:clrMapOvr>
-    <a:masterClrMapping/>
-  </p:clrMapOvr>
-</p:sld>
-</file>
-
-<file path=ppt/slides/slide61.xml><?xml version="1.0" encoding="utf-8"?>
 <p:sld xmlns:a="http://schemas.openxmlformats.org/drawingml/2006/main" xmlns:r="http://schemas.openxmlformats.org/officeDocument/2006/relationships" xmlns:p="http://schemas.openxmlformats.org/presentationml/2006/main" showMasterPhAnim="0">
   <p:cSld>
     <p:spTree>
@@ -28442,7 +28335,7 @@
 </p:sld>
 </file>
 
-<file path=ppt/slides/slide62.xml><?xml version="1.0" encoding="utf-8"?>
+<file path=ppt/slides/slide61.xml><?xml version="1.0" encoding="utf-8"?>
 <p:sld xmlns:a="http://schemas.openxmlformats.org/drawingml/2006/main" xmlns:r="http://schemas.openxmlformats.org/officeDocument/2006/relationships" xmlns:p="http://schemas.openxmlformats.org/presentationml/2006/main" showMasterPhAnim="0">
   <p:cSld>
     <p:spTree>
@@ -28942,7 +28835,7 @@
 </p:sld>
 </file>
 
-<file path=ppt/slides/slide63.xml><?xml version="1.0" encoding="utf-8"?>
+<file path=ppt/slides/slide62.xml><?xml version="1.0" encoding="utf-8"?>
 <p:sld xmlns:a="http://schemas.openxmlformats.org/drawingml/2006/main" xmlns:r="http://schemas.openxmlformats.org/officeDocument/2006/relationships" xmlns:p="http://schemas.openxmlformats.org/presentationml/2006/main" showMasterPhAnim="0">
   <p:cSld>
     <p:spTree>
@@ -29401,7 +29294,7 @@
 </p:sld>
 </file>
 
-<file path=ppt/slides/slide64.xml><?xml version="1.0" encoding="utf-8"?>
+<file path=ppt/slides/slide63.xml><?xml version="1.0" encoding="utf-8"?>
 <p:sld xmlns:a="http://schemas.openxmlformats.org/drawingml/2006/main" xmlns:r="http://schemas.openxmlformats.org/officeDocument/2006/relationships" xmlns:p="http://schemas.openxmlformats.org/presentationml/2006/main" showMasterPhAnim="0">
   <p:cSld>
     <p:spTree>
@@ -29657,7 +29550,7 @@
 </p:sld>
 </file>
 
-<file path=ppt/slides/slide65.xml><?xml version="1.0" encoding="utf-8"?>
+<file path=ppt/slides/slide64.xml><?xml version="1.0" encoding="utf-8"?>
 <p:sld xmlns:a="http://schemas.openxmlformats.org/drawingml/2006/main" xmlns:r="http://schemas.openxmlformats.org/officeDocument/2006/relationships" xmlns:p="http://schemas.openxmlformats.org/presentationml/2006/main" showMasterPhAnim="0">
   <p:cSld>
     <p:spTree>
@@ -30185,7 +30078,7 @@
 </p:sld>
 </file>
 
-<file path=ppt/slides/slide66.xml><?xml version="1.0" encoding="utf-8"?>
+<file path=ppt/slides/slide65.xml><?xml version="1.0" encoding="utf-8"?>
 <p:sld xmlns:a="http://schemas.openxmlformats.org/drawingml/2006/main" xmlns:r="http://schemas.openxmlformats.org/officeDocument/2006/relationships" xmlns:p="http://schemas.openxmlformats.org/presentationml/2006/main" showMasterPhAnim="0">
   <p:cSld>
     <p:spTree>
@@ -30698,7 +30591,7 @@
 </p:sld>
 </file>
 
-<file path=ppt/slides/slide67.xml><?xml version="1.0" encoding="utf-8"?>
+<file path=ppt/slides/slide66.xml><?xml version="1.0" encoding="utf-8"?>
 <p:sld xmlns:a="http://schemas.openxmlformats.org/drawingml/2006/main" xmlns:r="http://schemas.openxmlformats.org/officeDocument/2006/relationships" xmlns:p="http://schemas.openxmlformats.org/presentationml/2006/main" showMasterPhAnim="0">
   <p:cSld>
     <p:spTree>
@@ -31146,7 +31039,7 @@
 </p:sld>
 </file>
 
-<file path=ppt/slides/slide68.xml><?xml version="1.0" encoding="utf-8"?>
+<file path=ppt/slides/slide67.xml><?xml version="1.0" encoding="utf-8"?>
 <p:sld xmlns:a="http://schemas.openxmlformats.org/drawingml/2006/main" xmlns:r="http://schemas.openxmlformats.org/officeDocument/2006/relationships" xmlns:p="http://schemas.openxmlformats.org/presentationml/2006/main" showMasterPhAnim="0">
   <p:cSld>
     <p:spTree>
@@ -31594,7 +31487,7 @@
 </p:sld>
 </file>
 
-<file path=ppt/slides/slide69.xml><?xml version="1.0" encoding="utf-8"?>
+<file path=ppt/slides/slide68.xml><?xml version="1.0" encoding="utf-8"?>
 <p:sld xmlns:a="http://schemas.openxmlformats.org/drawingml/2006/main" xmlns:r="http://schemas.openxmlformats.org/officeDocument/2006/relationships" xmlns:p="http://schemas.openxmlformats.org/presentationml/2006/main" showMasterPhAnim="0">
   <p:cSld>
     <p:spTree>
@@ -32111,131 +32004,7 @@
 </p:sld>
 </file>
 
-<file path=ppt/slides/slide7.xml><?xml version="1.0" encoding="utf-8"?>
-<p:sld xmlns:a="http://schemas.openxmlformats.org/drawingml/2006/main" xmlns:r="http://schemas.openxmlformats.org/officeDocument/2006/relationships" xmlns:p="http://schemas.openxmlformats.org/presentationml/2006/main">
-  <p:cSld>
-    <p:spTree>
-      <p:nvGrpSpPr>
-        <p:cNvPr id="1" name="">
-          <a:extLst>
-            <a:ext uri="{FF2B5EF4-FFF2-40B4-BE49-F238E27FC236}">
-              <a16:creationId xmlns:a16="http://schemas.microsoft.com/office/drawing/2014/main" id="{5CE2314C-9B89-9872-F854-56038D1AEEE2}"/>
-            </a:ext>
-          </a:extLst>
-        </p:cNvPr>
-        <p:cNvGrpSpPr/>
-        <p:nvPr/>
-      </p:nvGrpSpPr>
-      <p:grpSpPr>
-        <a:xfrm>
-          <a:off x="0" y="0"/>
-          <a:ext cx="0" cy="0"/>
-          <a:chOff x="0" y="0"/>
-          <a:chExt cx="0" cy="0"/>
-        </a:xfrm>
-      </p:grpSpPr>
-      <p:sp>
-        <p:nvSpPr>
-          <p:cNvPr id="2" name="Titel 1">
-            <a:extLst>
-              <a:ext uri="{FF2B5EF4-FFF2-40B4-BE49-F238E27FC236}">
-                <a16:creationId xmlns:a16="http://schemas.microsoft.com/office/drawing/2014/main" id="{8706C6E6-15D1-F9AD-4269-0A862883D6FB}"/>
-              </a:ext>
-            </a:extLst>
-          </p:cNvPr>
-          <p:cNvSpPr>
-            <a:spLocks noGrp="1"/>
-          </p:cNvSpPr>
-          <p:nvPr>
-            <p:ph type="title"/>
-          </p:nvPr>
-        </p:nvSpPr>
-        <p:spPr/>
-        <p:txBody>
-          <a:bodyPr/>
-          <a:lstStyle/>
-          <a:p>
-            <a:r>
-              <a:rPr lang="de-DE" dirty="0"/>
-              <a:t>Meilenstein 4: Dokumentation &amp; Übergabe</a:t>
-            </a:r>
-          </a:p>
-        </p:txBody>
-      </p:sp>
-      <p:sp>
-        <p:nvSpPr>
-          <p:cNvPr id="3" name="Inhaltsplatzhalter 2">
-            <a:extLst>
-              <a:ext uri="{FF2B5EF4-FFF2-40B4-BE49-F238E27FC236}">
-                <a16:creationId xmlns:a16="http://schemas.microsoft.com/office/drawing/2014/main" id="{966D9D40-DF89-E66F-5610-4A7D72833142}"/>
-              </a:ext>
-            </a:extLst>
-          </p:cNvPr>
-          <p:cNvSpPr>
-            <a:spLocks noGrp="1"/>
-          </p:cNvSpPr>
-          <p:nvPr>
-            <p:ph idx="1"/>
-          </p:nvPr>
-        </p:nvSpPr>
-        <p:spPr/>
-        <p:txBody>
-          <a:bodyPr>
-            <a:normAutofit/>
-          </a:bodyPr>
-          <a:lstStyle/>
-          <a:p>
-            <a:r>
-              <a:rPr lang="de-DE" dirty="0"/>
-              <a:t>Bereitstellung aller </a:t>
-            </a:r>
-            <a:r>
-              <a:rPr lang="de-DE" b="1" dirty="0"/>
-              <a:t>Skripte, Modellartefakte &amp; Visualisierungen</a:t>
-            </a:r>
-          </a:p>
-          <a:p>
-            <a:endParaRPr lang="de-DE" dirty="0"/>
-          </a:p>
-          <a:p>
-            <a:r>
-              <a:rPr lang="de-DE" dirty="0"/>
-              <a:t>Übergabe des </a:t>
-            </a:r>
-            <a:r>
-              <a:rPr lang="de-DE" b="1" dirty="0"/>
-              <a:t>Prototyps als Python-Paket</a:t>
-            </a:r>
-          </a:p>
-          <a:p>
-            <a:endParaRPr lang="de-DE" dirty="0"/>
-          </a:p>
-          <a:p>
-            <a:r>
-              <a:rPr lang="de-DE" b="1" dirty="0"/>
-              <a:t>Dokumentation der REST-Schnittstelle </a:t>
-            </a:r>
-            <a:r>
-              <a:rPr lang="de-DE" dirty="0"/>
-              <a:t>zur einfachen Integration</a:t>
-            </a:r>
-          </a:p>
-        </p:txBody>
-      </p:sp>
-    </p:spTree>
-    <p:extLst>
-      <p:ext uri="{BB962C8B-B14F-4D97-AF65-F5344CB8AC3E}">
-        <p14:creationId xmlns:p14="http://schemas.microsoft.com/office/powerpoint/2010/main" val="2603691343"/>
-      </p:ext>
-    </p:extLst>
-  </p:cSld>
-  <p:clrMapOvr>
-    <a:masterClrMapping/>
-  </p:clrMapOvr>
-</p:sld>
-</file>
-
-<file path=ppt/slides/slide70.xml><?xml version="1.0" encoding="utf-8"?>
+<file path=ppt/slides/slide69.xml><?xml version="1.0" encoding="utf-8"?>
 <p:sld xmlns:a="http://schemas.openxmlformats.org/drawingml/2006/main" xmlns:r="http://schemas.openxmlformats.org/officeDocument/2006/relationships" xmlns:p="http://schemas.openxmlformats.org/presentationml/2006/main" showMasterPhAnim="0">
   <p:cSld>
     <p:spTree>
@@ -32812,7 +32581,131 @@
 </p:sld>
 </file>
 
-<file path=ppt/slides/slide71.xml><?xml version="1.0" encoding="utf-8"?>
+<file path=ppt/slides/slide7.xml><?xml version="1.0" encoding="utf-8"?>
+<p:sld xmlns:a="http://schemas.openxmlformats.org/drawingml/2006/main" xmlns:r="http://schemas.openxmlformats.org/officeDocument/2006/relationships" xmlns:p="http://schemas.openxmlformats.org/presentationml/2006/main">
+  <p:cSld>
+    <p:spTree>
+      <p:nvGrpSpPr>
+        <p:cNvPr id="1" name="">
+          <a:extLst>
+            <a:ext uri="{FF2B5EF4-FFF2-40B4-BE49-F238E27FC236}">
+              <a16:creationId xmlns:a16="http://schemas.microsoft.com/office/drawing/2014/main" id="{5CE2314C-9B89-9872-F854-56038D1AEEE2}"/>
+            </a:ext>
+          </a:extLst>
+        </p:cNvPr>
+        <p:cNvGrpSpPr/>
+        <p:nvPr/>
+      </p:nvGrpSpPr>
+      <p:grpSpPr>
+        <a:xfrm>
+          <a:off x="0" y="0"/>
+          <a:ext cx="0" cy="0"/>
+          <a:chOff x="0" y="0"/>
+          <a:chExt cx="0" cy="0"/>
+        </a:xfrm>
+      </p:grpSpPr>
+      <p:sp>
+        <p:nvSpPr>
+          <p:cNvPr id="2" name="Titel 1">
+            <a:extLst>
+              <a:ext uri="{FF2B5EF4-FFF2-40B4-BE49-F238E27FC236}">
+                <a16:creationId xmlns:a16="http://schemas.microsoft.com/office/drawing/2014/main" id="{8706C6E6-15D1-F9AD-4269-0A862883D6FB}"/>
+              </a:ext>
+            </a:extLst>
+          </p:cNvPr>
+          <p:cNvSpPr>
+            <a:spLocks noGrp="1"/>
+          </p:cNvSpPr>
+          <p:nvPr>
+            <p:ph type="title"/>
+          </p:nvPr>
+        </p:nvSpPr>
+        <p:spPr/>
+        <p:txBody>
+          <a:bodyPr/>
+          <a:lstStyle/>
+          <a:p>
+            <a:r>
+              <a:rPr lang="de-DE" dirty="0"/>
+              <a:t>Meilenstein 4: Dokumentation &amp; Übergabe</a:t>
+            </a:r>
+          </a:p>
+        </p:txBody>
+      </p:sp>
+      <p:sp>
+        <p:nvSpPr>
+          <p:cNvPr id="3" name="Inhaltsplatzhalter 2">
+            <a:extLst>
+              <a:ext uri="{FF2B5EF4-FFF2-40B4-BE49-F238E27FC236}">
+                <a16:creationId xmlns:a16="http://schemas.microsoft.com/office/drawing/2014/main" id="{966D9D40-DF89-E66F-5610-4A7D72833142}"/>
+              </a:ext>
+            </a:extLst>
+          </p:cNvPr>
+          <p:cNvSpPr>
+            <a:spLocks noGrp="1"/>
+          </p:cNvSpPr>
+          <p:nvPr>
+            <p:ph idx="1"/>
+          </p:nvPr>
+        </p:nvSpPr>
+        <p:spPr/>
+        <p:txBody>
+          <a:bodyPr>
+            <a:normAutofit/>
+          </a:bodyPr>
+          <a:lstStyle/>
+          <a:p>
+            <a:r>
+              <a:rPr lang="de-DE" dirty="0"/>
+              <a:t>Bereitstellung aller </a:t>
+            </a:r>
+            <a:r>
+              <a:rPr lang="de-DE" b="1" dirty="0"/>
+              <a:t>Skripte, Modellartefakte &amp; Visualisierungen</a:t>
+            </a:r>
+          </a:p>
+          <a:p>
+            <a:endParaRPr lang="de-DE" dirty="0"/>
+          </a:p>
+          <a:p>
+            <a:r>
+              <a:rPr lang="de-DE" dirty="0"/>
+              <a:t>Übergabe des </a:t>
+            </a:r>
+            <a:r>
+              <a:rPr lang="de-DE" b="1" dirty="0"/>
+              <a:t>Prototyps als Python-Paket</a:t>
+            </a:r>
+          </a:p>
+          <a:p>
+            <a:endParaRPr lang="de-DE" dirty="0"/>
+          </a:p>
+          <a:p>
+            <a:r>
+              <a:rPr lang="de-DE" b="1" dirty="0"/>
+              <a:t>Dokumentation der REST-Schnittstelle </a:t>
+            </a:r>
+            <a:r>
+              <a:rPr lang="de-DE" dirty="0"/>
+              <a:t>zur einfachen Integration</a:t>
+            </a:r>
+          </a:p>
+        </p:txBody>
+      </p:sp>
+    </p:spTree>
+    <p:extLst>
+      <p:ext uri="{BB962C8B-B14F-4D97-AF65-F5344CB8AC3E}">
+        <p14:creationId xmlns:p14="http://schemas.microsoft.com/office/powerpoint/2010/main" val="2603691343"/>
+      </p:ext>
+    </p:extLst>
+  </p:cSld>
+  <p:clrMapOvr>
+    <a:masterClrMapping/>
+  </p:clrMapOvr>
+</p:sld>
+</file>
+
+<file path=ppt/slides/slide70.xml><?xml version="1.0" encoding="utf-8"?>
 <p:sld xmlns:a="http://schemas.openxmlformats.org/drawingml/2006/main" xmlns:r="http://schemas.openxmlformats.org/officeDocument/2006/relationships" xmlns:p="http://schemas.openxmlformats.org/presentationml/2006/main" showMasterPhAnim="0">
   <p:cSld>
     <p:spTree>
@@ -32983,7 +32876,7 @@
 </p:sld>
 </file>
 
-<file path=ppt/slides/slide72.xml><?xml version="1.0" encoding="utf-8"?>
+<file path=ppt/slides/slide71.xml><?xml version="1.0" encoding="utf-8"?>
 <p:sld xmlns:a="http://schemas.openxmlformats.org/drawingml/2006/main" xmlns:r="http://schemas.openxmlformats.org/officeDocument/2006/relationships" xmlns:p="http://schemas.openxmlformats.org/presentationml/2006/main" showMasterPhAnim="0">
   <p:cSld>
     <p:spTree>
@@ -33448,7 +33341,7 @@
 </p:sld>
 </file>
 
-<file path=ppt/slides/slide73.xml><?xml version="1.0" encoding="utf-8"?>
+<file path=ppt/slides/slide72.xml><?xml version="1.0" encoding="utf-8"?>
 <p:sld xmlns:a="http://schemas.openxmlformats.org/drawingml/2006/main" xmlns:r="http://schemas.openxmlformats.org/officeDocument/2006/relationships" xmlns:p="http://schemas.openxmlformats.org/presentationml/2006/main">
   <p:cSld>
     <p:bg>
@@ -33851,7 +33744,7 @@
 </p:sld>
 </file>
 
-<file path=ppt/slides/slide74.xml><?xml version="1.0" encoding="utf-8"?>
+<file path=ppt/slides/slide73.xml><?xml version="1.0" encoding="utf-8"?>
 <p:sld xmlns:a="http://schemas.openxmlformats.org/drawingml/2006/main" xmlns:r="http://schemas.openxmlformats.org/officeDocument/2006/relationships" xmlns:p="http://schemas.openxmlformats.org/presentationml/2006/main">
   <p:cSld>
     <p:spTree>
@@ -34057,7 +33950,7 @@
 </p:sld>
 </file>
 
-<file path=ppt/slides/slide75.xml><?xml version="1.0" encoding="utf-8"?>
+<file path=ppt/slides/slide74.xml><?xml version="1.0" encoding="utf-8"?>
 <p:sld xmlns:a="http://schemas.openxmlformats.org/drawingml/2006/main" xmlns:r="http://schemas.openxmlformats.org/officeDocument/2006/relationships" xmlns:p="http://schemas.openxmlformats.org/presentationml/2006/main">
   <p:cSld>
     <p:spTree>
@@ -34265,7 +34158,7 @@
 </p:sld>
 </file>
 
-<file path=ppt/slides/slide76.xml><?xml version="1.0" encoding="utf-8"?>
+<file path=ppt/slides/slide75.xml><?xml version="1.0" encoding="utf-8"?>
 <p:sld xmlns:a="http://schemas.openxmlformats.org/drawingml/2006/main" xmlns:r="http://schemas.openxmlformats.org/officeDocument/2006/relationships" xmlns:p="http://schemas.openxmlformats.org/presentationml/2006/main">
   <p:cSld>
     <p:bg>
@@ -34668,7 +34561,7 @@
 </p:sld>
 </file>
 
-<file path=ppt/slides/slide77.xml><?xml version="1.0" encoding="utf-8"?>
+<file path=ppt/slides/slide76.xml><?xml version="1.0" encoding="utf-8"?>
 <p:sld xmlns:a="http://schemas.openxmlformats.org/drawingml/2006/main" xmlns:r="http://schemas.openxmlformats.org/officeDocument/2006/relationships" xmlns:p="http://schemas.openxmlformats.org/presentationml/2006/main">
   <p:cSld>
     <p:spTree>
@@ -34954,7 +34847,7 @@
 </p:sld>
 </file>
 
-<file path=ppt/slides/slide78.xml><?xml version="1.0" encoding="utf-8"?>
+<file path=ppt/slides/slide77.xml><?xml version="1.0" encoding="utf-8"?>
 <p:sld xmlns:a="http://schemas.openxmlformats.org/drawingml/2006/main" xmlns:r="http://schemas.openxmlformats.org/officeDocument/2006/relationships" xmlns:p="http://schemas.openxmlformats.org/presentationml/2006/main">
   <p:cSld>
     <p:spTree>
@@ -35218,7 +35111,7 @@
 </p:sld>
 </file>
 
-<file path=ppt/slides/slide79.xml><?xml version="1.0" encoding="utf-8"?>
+<file path=ppt/slides/slide78.xml><?xml version="1.0" encoding="utf-8"?>
 <p:sld xmlns:a="http://schemas.openxmlformats.org/drawingml/2006/main" xmlns:r="http://schemas.openxmlformats.org/officeDocument/2006/relationships" xmlns:p="http://schemas.openxmlformats.org/presentationml/2006/main">
   <p:cSld>
     <p:spTree>

</xml_diff>